<commit_message>
updated with file reading example and loop
</commit_message>
<xml_diff>
--- a/slides/On-Campus/ReviewSessionUnit2_2021.pptx
+++ b/slides/On-Campus/ReviewSessionUnit2_2021.pptx
@@ -5,18 +5,19 @@
     <p:sldMasterId id="2147483648" r:id="rId4"/>
   </p:sldMasterIdLst>
   <p:notesMasterIdLst>
-    <p:notesMasterId r:id="rId11"/>
+    <p:notesMasterId r:id="rId12"/>
   </p:notesMasterIdLst>
   <p:handoutMasterIdLst>
-    <p:handoutMasterId r:id="rId12"/>
+    <p:handoutMasterId r:id="rId13"/>
   </p:handoutMasterIdLst>
   <p:sldIdLst>
     <p:sldId id="256" r:id="rId5"/>
     <p:sldId id="257" r:id="rId6"/>
-    <p:sldId id="258" r:id="rId7"/>
-    <p:sldId id="259" r:id="rId8"/>
-    <p:sldId id="260" r:id="rId9"/>
-    <p:sldId id="261" r:id="rId10"/>
+    <p:sldId id="259" r:id="rId7"/>
+    <p:sldId id="260" r:id="rId8"/>
+    <p:sldId id="261" r:id="rId9"/>
+    <p:sldId id="263" r:id="rId10"/>
+    <p:sldId id="262" r:id="rId11"/>
   </p:sldIdLst>
   <p:sldSz cx="13817600" cy="7772400"/>
   <p:notesSz cx="6858000" cy="9144000"/>
@@ -6951,101 +6952,6 @@
 </file>
 
 <file path=ppt/slides/slide3.xml><?xml version="1.0" encoding="utf-8"?>
-<p:sld xmlns:a="http://schemas.openxmlformats.org/drawingml/2006/main" xmlns:r="http://schemas.openxmlformats.org/officeDocument/2006/relationships" xmlns:p="http://schemas.openxmlformats.org/presentationml/2006/main">
-  <p:cSld>
-    <p:spTree>
-      <p:nvGrpSpPr>
-        <p:cNvPr id="1" name=""/>
-        <p:cNvGrpSpPr/>
-        <p:nvPr/>
-      </p:nvGrpSpPr>
-      <p:grpSpPr>
-        <a:xfrm>
-          <a:off x="0" y="0"/>
-          <a:ext cx="0" cy="0"/>
-          <a:chOff x="0" y="0"/>
-          <a:chExt cx="0" cy="0"/>
-        </a:xfrm>
-      </p:grpSpPr>
-      <p:sp>
-        <p:nvSpPr>
-          <p:cNvPr id="4" name="Title 3">
-            <a:extLst>
-              <a:ext uri="{FF2B5EF4-FFF2-40B4-BE49-F238E27FC236}">
-                <a16:creationId xmlns:a16="http://schemas.microsoft.com/office/drawing/2014/main" id="{2707AA96-5021-4C74-AD8D-CA3429E779DF}"/>
-              </a:ext>
-            </a:extLst>
-          </p:cNvPr>
-          <p:cNvSpPr>
-            <a:spLocks noGrp="1"/>
-          </p:cNvSpPr>
-          <p:nvPr>
-            <p:ph type="title"/>
-          </p:nvPr>
-        </p:nvSpPr>
-        <p:spPr/>
-        <p:txBody>
-          <a:bodyPr/>
-          <a:lstStyle/>
-          <a:p>
-            <a:r>
-              <a:rPr lang="en-US" dirty="0"/>
-              <a:t>Arrays</a:t>
-            </a:r>
-          </a:p>
-        </p:txBody>
-      </p:sp>
-      <p:sp>
-        <p:nvSpPr>
-          <p:cNvPr id="5" name="Text Placeholder 4">
-            <a:extLst>
-              <a:ext uri="{FF2B5EF4-FFF2-40B4-BE49-F238E27FC236}">
-                <a16:creationId xmlns:a16="http://schemas.microsoft.com/office/drawing/2014/main" id="{68B52F81-7497-4982-8B28-9E7DBBE5D5B8}"/>
-              </a:ext>
-            </a:extLst>
-          </p:cNvPr>
-          <p:cNvSpPr>
-            <a:spLocks noGrp="1"/>
-          </p:cNvSpPr>
-          <p:nvPr>
-            <p:ph type="body" sz="quarter" idx="10"/>
-          </p:nvPr>
-        </p:nvSpPr>
-        <p:spPr/>
-        <p:txBody>
-          <a:bodyPr/>
-          <a:lstStyle/>
-          <a:p>
-            <a:endParaRPr lang="en-US"/>
-          </a:p>
-        </p:txBody>
-      </p:sp>
-    </p:spTree>
-    <p:extLst>
-      <p:ext uri="{BB962C8B-B14F-4D97-AF65-F5344CB8AC3E}">
-        <p14:creationId xmlns:p14="http://schemas.microsoft.com/office/powerpoint/2010/main" val="1624463979"/>
-      </p:ext>
-    </p:extLst>
-  </p:cSld>
-  <p:clrMapOvr>
-    <a:masterClrMapping/>
-  </p:clrMapOvr>
-  <mc:AlternateContent xmlns:mc="http://schemas.openxmlformats.org/markup-compatibility/2006" xmlns:p14="http://schemas.microsoft.com/office/powerpoint/2010/main">
-    <mc:Choice Requires="p14">
-      <p:transition p14:dur="300">
-        <p:fade/>
-      </p:transition>
-    </mc:Choice>
-    <mc:Fallback xmlns="">
-      <p:transition>
-        <p:fade/>
-      </p:transition>
-    </mc:Fallback>
-  </mc:AlternateContent>
-</p:sld>
-</file>
-
-<file path=ppt/slides/slide4.xml><?xml version="1.0" encoding="utf-8"?>
 <p:sld xmlns:a="http://schemas.openxmlformats.org/drawingml/2006/main" xmlns:r="http://schemas.openxmlformats.org/officeDocument/2006/relationships" xmlns:p="http://schemas.openxmlformats.org/presentationml/2006/main">
   <p:cSld>
     <p:spTree>
@@ -8152,7 +8058,7 @@
 </p:sld>
 </file>
 
-<file path=ppt/slides/slide5.xml><?xml version="1.0" encoding="utf-8"?>
+<file path=ppt/slides/slide4.xml><?xml version="1.0" encoding="utf-8"?>
 <p:sld xmlns:a="http://schemas.openxmlformats.org/drawingml/2006/main" xmlns:r="http://schemas.openxmlformats.org/officeDocument/2006/relationships" xmlns:p="http://schemas.openxmlformats.org/presentationml/2006/main">
   <p:cSld>
     <p:spTree>
@@ -9115,7 +9021,7 @@
 </p:sld>
 </file>
 
-<file path=ppt/slides/slide6.xml><?xml version="1.0" encoding="utf-8"?>
+<file path=ppt/slides/slide5.xml><?xml version="1.0" encoding="utf-8"?>
 <p:sld xmlns:a="http://schemas.openxmlformats.org/drawingml/2006/main" xmlns:r="http://schemas.openxmlformats.org/officeDocument/2006/relationships" xmlns:p="http://schemas.openxmlformats.org/presentationml/2006/main">
   <p:cSld>
     <p:spTree>
@@ -11065,6 +10971,1462 @@
       <p:bldP spid="13" grpId="0"/>
     </p:bldLst>
   </p:timing>
+</p:sld>
+</file>
+
+<file path=ppt/slides/slide6.xml><?xml version="1.0" encoding="utf-8"?>
+<p:sld xmlns:a="http://schemas.openxmlformats.org/drawingml/2006/main" xmlns:r="http://schemas.openxmlformats.org/officeDocument/2006/relationships" xmlns:p="http://schemas.openxmlformats.org/presentationml/2006/main">
+  <p:cSld>
+    <p:spTree>
+      <p:nvGrpSpPr>
+        <p:cNvPr id="1" name=""/>
+        <p:cNvGrpSpPr/>
+        <p:nvPr/>
+      </p:nvGrpSpPr>
+      <p:grpSpPr>
+        <a:xfrm>
+          <a:off x="0" y="0"/>
+          <a:ext cx="0" cy="0"/>
+          <a:chOff x="0" y="0"/>
+          <a:chExt cx="0" cy="0"/>
+        </a:xfrm>
+      </p:grpSpPr>
+      <p:sp>
+        <p:nvSpPr>
+          <p:cNvPr id="2" name="Title 1">
+            <a:extLst>
+              <a:ext uri="{FF2B5EF4-FFF2-40B4-BE49-F238E27FC236}">
+                <a16:creationId xmlns:a16="http://schemas.microsoft.com/office/drawing/2014/main" id="{371206AE-EDA0-479F-A747-965DA907FEEF}"/>
+              </a:ext>
+            </a:extLst>
+          </p:cNvPr>
+          <p:cNvSpPr>
+            <a:spLocks noGrp="1"/>
+          </p:cNvSpPr>
+          <p:nvPr>
+            <p:ph type="title"/>
+          </p:nvPr>
+        </p:nvSpPr>
+        <p:spPr/>
+        <p:txBody>
+          <a:bodyPr/>
+          <a:lstStyle/>
+          <a:p>
+            <a:r>
+              <a:rPr lang="en-US" dirty="0"/>
+              <a:t>Loop Practice</a:t>
+            </a:r>
+          </a:p>
+        </p:txBody>
+      </p:sp>
+      <p:sp>
+        <p:nvSpPr>
+          <p:cNvPr id="3" name="Text Placeholder 2">
+            <a:extLst>
+              <a:ext uri="{FF2B5EF4-FFF2-40B4-BE49-F238E27FC236}">
+                <a16:creationId xmlns:a16="http://schemas.microsoft.com/office/drawing/2014/main" id="{986DA933-C729-40B5-AD39-06FA9FDEDF3A}"/>
+              </a:ext>
+            </a:extLst>
+          </p:cNvPr>
+          <p:cNvSpPr>
+            <a:spLocks noGrp="1"/>
+          </p:cNvSpPr>
+          <p:nvPr>
+            <p:ph type="body" sz="quarter" idx="10"/>
+          </p:nvPr>
+        </p:nvSpPr>
+        <p:spPr>
+          <a:xfrm>
+            <a:off x="628075" y="1776683"/>
+            <a:ext cx="12561453" cy="2943626"/>
+          </a:xfrm>
+        </p:spPr>
+        <p:txBody>
+          <a:bodyPr/>
+          <a:lstStyle/>
+          <a:p>
+            <a:r>
+              <a:rPr lang="en-US" dirty="0"/>
+              <a:t>Write a program that prints out all combinations of numbers for 0 to </a:t>
+            </a:r>
+            <a:r>
+              <a:rPr lang="en-US" dirty="0" err="1"/>
+              <a:t>i,j,k</a:t>
+            </a:r>
+            <a:endParaRPr lang="en-US" dirty="0"/>
+          </a:p>
+          <a:p>
+            <a:r>
+              <a:rPr lang="en-US" dirty="0"/>
+              <a:t>Example</a:t>
+            </a:r>
+          </a:p>
+          <a:p>
+            <a:pPr lvl="1"/>
+            <a:r>
+              <a:rPr lang="en-US" dirty="0" err="1"/>
+              <a:t>loopPractice</a:t>
+            </a:r>
+            <a:r>
+              <a:rPr lang="en-US" dirty="0"/>
+              <a:t>(1, 1, 2) – returns    000, 001, 002, 010, 011, 012, 100, 101, 102, 110, 111, 112</a:t>
+            </a:r>
+          </a:p>
+          <a:p>
+            <a:pPr lvl="1"/>
+            <a:endParaRPr lang="en-US" dirty="0"/>
+          </a:p>
+          <a:p>
+            <a:pPr lvl="1"/>
+            <a:r>
+              <a:rPr lang="en-US" dirty="0"/>
+              <a:t>Hint – It will be three loops, try just building one loop, and then focus on inner loop and then inner most loop</a:t>
+            </a:r>
+          </a:p>
+          <a:p>
+            <a:pPr lvl="1"/>
+            <a:endParaRPr lang="en-US" dirty="0"/>
+          </a:p>
+          <a:p>
+            <a:r>
+              <a:rPr lang="en-US" dirty="0"/>
+              <a:t>Pro-tip: Draw out </a:t>
+            </a:r>
+            <a:r>
+              <a:rPr lang="en-US"/>
+              <a:t>a table </a:t>
+            </a:r>
+            <a:r>
+              <a:rPr lang="en-US" dirty="0"/>
+              <a:t>to track variables! </a:t>
+            </a:r>
+          </a:p>
+        </p:txBody>
+      </p:sp>
+    </p:spTree>
+    <p:extLst>
+      <p:ext uri="{BB962C8B-B14F-4D97-AF65-F5344CB8AC3E}">
+        <p14:creationId xmlns:p14="http://schemas.microsoft.com/office/powerpoint/2010/main" val="2299069814"/>
+      </p:ext>
+    </p:extLst>
+  </p:cSld>
+  <p:clrMapOvr>
+    <a:masterClrMapping/>
+  </p:clrMapOvr>
+  <mc:AlternateContent xmlns:mc="http://schemas.openxmlformats.org/markup-compatibility/2006" xmlns:p14="http://schemas.microsoft.com/office/powerpoint/2010/main">
+    <mc:Choice Requires="p14">
+      <p:transition p14:dur="300">
+        <p:fade/>
+      </p:transition>
+    </mc:Choice>
+    <mc:Fallback xmlns="">
+      <p:transition>
+        <p:fade/>
+      </p:transition>
+    </mc:Fallback>
+  </mc:AlternateContent>
+</p:sld>
+</file>
+
+<file path=ppt/slides/slide7.xml><?xml version="1.0" encoding="utf-8"?>
+<p:sld xmlns:a="http://schemas.openxmlformats.org/drawingml/2006/main" xmlns:r="http://schemas.openxmlformats.org/officeDocument/2006/relationships" xmlns:p="http://schemas.openxmlformats.org/presentationml/2006/main">
+  <p:cSld>
+    <p:spTree>
+      <p:nvGrpSpPr>
+        <p:cNvPr id="1" name=""/>
+        <p:cNvGrpSpPr/>
+        <p:nvPr/>
+      </p:nvGrpSpPr>
+      <p:grpSpPr>
+        <a:xfrm>
+          <a:off x="0" y="0"/>
+          <a:ext cx="0" cy="0"/>
+          <a:chOff x="0" y="0"/>
+          <a:chExt cx="0" cy="0"/>
+        </a:xfrm>
+      </p:grpSpPr>
+      <p:sp>
+        <p:nvSpPr>
+          <p:cNvPr id="2" name="Title 1">
+            <a:extLst>
+              <a:ext uri="{FF2B5EF4-FFF2-40B4-BE49-F238E27FC236}">
+                <a16:creationId xmlns:a16="http://schemas.microsoft.com/office/drawing/2014/main" id="{8BF5251E-27D9-48BA-A729-15C71F6E94E2}"/>
+              </a:ext>
+            </a:extLst>
+          </p:cNvPr>
+          <p:cNvSpPr>
+            <a:spLocks noGrp="1"/>
+          </p:cNvSpPr>
+          <p:nvPr>
+            <p:ph type="title"/>
+          </p:nvPr>
+        </p:nvSpPr>
+        <p:spPr/>
+        <p:txBody>
+          <a:bodyPr/>
+          <a:lstStyle/>
+          <a:p>
+            <a:r>
+              <a:rPr lang="en-US" dirty="0"/>
+              <a:t>File Reading (harder one)</a:t>
+            </a:r>
+          </a:p>
+        </p:txBody>
+      </p:sp>
+      <p:sp>
+        <p:nvSpPr>
+          <p:cNvPr id="4" name="Rectangle 1">
+            <a:extLst>
+              <a:ext uri="{FF2B5EF4-FFF2-40B4-BE49-F238E27FC236}">
+                <a16:creationId xmlns:a16="http://schemas.microsoft.com/office/drawing/2014/main" id="{01F1D2EB-CA8D-4F6D-9983-4F884AEB267A}"/>
+              </a:ext>
+            </a:extLst>
+          </p:cNvPr>
+          <p:cNvSpPr>
+            <a:spLocks noGrp="1" noChangeArrowheads="1"/>
+          </p:cNvSpPr>
+          <p:nvPr>
+            <p:ph type="body" sz="quarter" idx="10"/>
+          </p:nvPr>
+        </p:nvSpPr>
+        <p:spPr bwMode="auto">
+          <a:xfrm>
+            <a:off x="628072" y="1463722"/>
+            <a:ext cx="7659586" cy="4524315"/>
+          </a:xfrm>
+          <a:prstGeom prst="rect">
+            <a:avLst/>
+          </a:prstGeom>
+          <a:solidFill>
+            <a:srgbClr val="FFFFFF"/>
+          </a:solidFill>
+          <a:ln>
+            <a:noFill/>
+          </a:ln>
+          <a:effectLst/>
+          <a:extLst>
+            <a:ext uri="{91240B29-F687-4F45-9708-019B960494DF}">
+              <a14:hiddenLine xmlns:a14="http://schemas.microsoft.com/office/drawing/2010/main" w="9525">
+                <a:solidFill>
+                  <a:schemeClr val="tx1"/>
+                </a:solidFill>
+                <a:miter lim="800000"/>
+                <a:headEnd/>
+                <a:tailEnd/>
+              </a14:hiddenLine>
+            </a:ext>
+            <a:ext uri="{AF507438-7753-43E0-B8FC-AC1667EBCBE1}">
+              <a14:hiddenEffects xmlns:a14="http://schemas.microsoft.com/office/drawing/2010/main">
+                <a:effectLst>
+                  <a:outerShdw dist="35921" dir="2700000" algn="ctr" rotWithShape="0">
+                    <a:schemeClr val="bg2"/>
+                  </a:outerShdw>
+                </a:effectLst>
+              </a14:hiddenEffects>
+            </a:ext>
+          </a:extLst>
+        </p:spPr>
+        <p:txBody>
+          <a:bodyPr vert="horz" wrap="square" lIns="91440" tIns="45720" rIns="91440" bIns="45720" numCol="1" anchor="ctr" anchorCtr="0" compatLnSpc="1">
+            <a:prstTxWarp prst="textNoShape">
+              <a:avLst/>
+            </a:prstTxWarp>
+            <a:spAutoFit/>
+          </a:bodyPr>
+          <a:lstStyle/>
+          <a:p>
+            <a:pPr marL="0" marR="0" lvl="0" indent="0" algn="l" defTabSz="914400" rtl="0" eaLnBrk="0" fontAlgn="base" latinLnBrk="0" hangingPunct="0">
+              <a:lnSpc>
+                <a:spcPct val="100000"/>
+              </a:lnSpc>
+              <a:spcBef>
+                <a:spcPct val="0"/>
+              </a:spcBef>
+              <a:spcAft>
+                <a:spcPct val="0"/>
+              </a:spcAft>
+              <a:buClrTx/>
+              <a:buSzTx/>
+              <a:buFontTx/>
+              <a:buNone/>
+              <a:tabLst/>
+            </a:pPr>
+            <a:r>
+              <a:rPr kumimoji="0" lang="en-US" altLang="en-US" sz="2400" b="1" i="0" u="none" strike="noStrike" cap="none" normalizeH="0" baseline="0" dirty="0">
+                <a:ln>
+                  <a:noFill/>
+                </a:ln>
+                <a:solidFill>
+                  <a:srgbClr val="000080"/>
+                </a:solidFill>
+                <a:effectLst/>
+                <a:latin typeface="JetBrains Mono"/>
+              </a:rPr>
+              <a:t>public static void </a:t>
+            </a:r>
+            <a:r>
+              <a:rPr kumimoji="0" lang="en-US" altLang="en-US" sz="2400" b="0" i="0" u="none" strike="noStrike" cap="none" normalizeH="0" baseline="0" dirty="0" err="1">
+                <a:ln>
+                  <a:noFill/>
+                </a:ln>
+                <a:solidFill>
+                  <a:srgbClr val="000000"/>
+                </a:solidFill>
+                <a:effectLst/>
+                <a:latin typeface="JetBrains Mono"/>
+              </a:rPr>
+              <a:t>scannerTest</a:t>
+            </a:r>
+            <a:r>
+              <a:rPr kumimoji="0" lang="en-US" altLang="en-US" sz="2400" b="0" i="0" u="none" strike="noStrike" cap="none" normalizeH="0" baseline="0" dirty="0">
+                <a:ln>
+                  <a:noFill/>
+                </a:ln>
+                <a:solidFill>
+                  <a:srgbClr val="000000"/>
+                </a:solidFill>
+                <a:effectLst/>
+                <a:latin typeface="JetBrains Mono"/>
+              </a:rPr>
+              <a:t>()  {</a:t>
+            </a:r>
+            <a:br>
+              <a:rPr kumimoji="0" lang="en-US" altLang="en-US" sz="2400" b="0" i="0" u="none" strike="noStrike" cap="none" normalizeH="0" baseline="0" dirty="0">
+                <a:ln>
+                  <a:noFill/>
+                </a:ln>
+                <a:solidFill>
+                  <a:srgbClr val="000000"/>
+                </a:solidFill>
+                <a:effectLst/>
+                <a:latin typeface="JetBrains Mono"/>
+              </a:rPr>
+            </a:br>
+            <a:r>
+              <a:rPr kumimoji="0" lang="en-US" altLang="en-US" sz="2400" b="0" i="0" u="none" strike="noStrike" cap="none" normalizeH="0" baseline="0" dirty="0">
+                <a:ln>
+                  <a:noFill/>
+                </a:ln>
+                <a:solidFill>
+                  <a:srgbClr val="000000"/>
+                </a:solidFill>
+                <a:effectLst/>
+                <a:latin typeface="JetBrains Mono"/>
+              </a:rPr>
+              <a:t>    </a:t>
+            </a:r>
+            <a:r>
+              <a:rPr kumimoji="0" lang="en-US" altLang="en-US" sz="2400" b="1" i="0" u="none" strike="noStrike" cap="none" normalizeH="0" baseline="0" dirty="0">
+                <a:ln>
+                  <a:noFill/>
+                </a:ln>
+                <a:solidFill>
+                  <a:srgbClr val="000080"/>
+                </a:solidFill>
+                <a:effectLst/>
+                <a:latin typeface="JetBrains Mono"/>
+              </a:rPr>
+              <a:t>try </a:t>
+            </a:r>
+            <a:r>
+              <a:rPr kumimoji="0" lang="en-US" altLang="en-US" sz="2400" b="0" i="0" u="none" strike="noStrike" cap="none" normalizeH="0" baseline="0" dirty="0">
+                <a:ln>
+                  <a:noFill/>
+                </a:ln>
+                <a:solidFill>
+                  <a:srgbClr val="000000"/>
+                </a:solidFill>
+                <a:effectLst/>
+                <a:latin typeface="JetBrains Mono"/>
+              </a:rPr>
+              <a:t>{</a:t>
+            </a:r>
+            <a:br>
+              <a:rPr kumimoji="0" lang="en-US" altLang="en-US" sz="2400" b="0" i="0" u="none" strike="noStrike" cap="none" normalizeH="0" baseline="0" dirty="0">
+                <a:ln>
+                  <a:noFill/>
+                </a:ln>
+                <a:solidFill>
+                  <a:srgbClr val="000000"/>
+                </a:solidFill>
+                <a:effectLst/>
+                <a:latin typeface="JetBrains Mono"/>
+              </a:rPr>
+            </a:br>
+            <a:r>
+              <a:rPr kumimoji="0" lang="en-US" altLang="en-US" sz="2400" b="0" i="0" u="none" strike="noStrike" cap="none" normalizeH="0" baseline="0" dirty="0">
+                <a:ln>
+                  <a:noFill/>
+                </a:ln>
+                <a:solidFill>
+                  <a:srgbClr val="000000"/>
+                </a:solidFill>
+                <a:effectLst/>
+                <a:latin typeface="JetBrains Mono"/>
+              </a:rPr>
+              <a:t>        Scanner </a:t>
+            </a:r>
+            <a:r>
+              <a:rPr kumimoji="0" lang="en-US" altLang="en-US" sz="2400" b="0" i="0" u="none" strike="noStrike" cap="none" normalizeH="0" baseline="0" dirty="0" err="1">
+                <a:ln>
+                  <a:noFill/>
+                </a:ln>
+                <a:solidFill>
+                  <a:srgbClr val="000000"/>
+                </a:solidFill>
+                <a:effectLst/>
+                <a:latin typeface="JetBrains Mono"/>
+              </a:rPr>
+              <a:t>scanner</a:t>
+            </a:r>
+            <a:r>
+              <a:rPr kumimoji="0" lang="en-US" altLang="en-US" sz="2400" b="0" i="0" u="none" strike="noStrike" cap="none" normalizeH="0" baseline="0" dirty="0">
+                <a:ln>
+                  <a:noFill/>
+                </a:ln>
+                <a:solidFill>
+                  <a:srgbClr val="000000"/>
+                </a:solidFill>
+                <a:effectLst/>
+                <a:latin typeface="JetBrains Mono"/>
+              </a:rPr>
+              <a:t> = </a:t>
+            </a:r>
+            <a:r>
+              <a:rPr kumimoji="0" lang="en-US" altLang="en-US" sz="2400" b="1" i="0" u="none" strike="noStrike" cap="none" normalizeH="0" baseline="0" dirty="0">
+                <a:ln>
+                  <a:noFill/>
+                </a:ln>
+                <a:solidFill>
+                  <a:srgbClr val="000080"/>
+                </a:solidFill>
+                <a:effectLst/>
+                <a:latin typeface="JetBrains Mono"/>
+              </a:rPr>
+              <a:t>new </a:t>
+            </a:r>
+            <a:r>
+              <a:rPr kumimoji="0" lang="en-US" altLang="en-US" sz="2400" b="0" i="0" u="none" strike="noStrike" cap="none" normalizeH="0" baseline="0" dirty="0">
+                <a:ln>
+                  <a:noFill/>
+                </a:ln>
+                <a:solidFill>
+                  <a:srgbClr val="000000"/>
+                </a:solidFill>
+                <a:effectLst/>
+                <a:latin typeface="JetBrains Mono"/>
+              </a:rPr>
+              <a:t>Scanner(</a:t>
+            </a:r>
+            <a:r>
+              <a:rPr kumimoji="0" lang="en-US" altLang="en-US" sz="2400" b="1" i="0" u="none" strike="noStrike" cap="none" normalizeH="0" baseline="0" dirty="0">
+                <a:ln>
+                  <a:noFill/>
+                </a:ln>
+                <a:solidFill>
+                  <a:srgbClr val="000080"/>
+                </a:solidFill>
+                <a:effectLst/>
+                <a:latin typeface="JetBrains Mono"/>
+              </a:rPr>
+              <a:t>new </a:t>
+            </a:r>
+            <a:r>
+              <a:rPr kumimoji="0" lang="en-US" altLang="en-US" sz="2400" b="0" i="0" u="none" strike="noStrike" cap="none" normalizeH="0" baseline="0" dirty="0">
+                <a:ln>
+                  <a:noFill/>
+                </a:ln>
+                <a:solidFill>
+                  <a:srgbClr val="000000"/>
+                </a:solidFill>
+                <a:effectLst/>
+                <a:latin typeface="JetBrains Mono"/>
+              </a:rPr>
+              <a:t>File(</a:t>
+            </a:r>
+            <a:r>
+              <a:rPr kumimoji="0" lang="en-US" altLang="en-US" sz="2400" b="1" i="0" u="none" strike="noStrike" cap="none" normalizeH="0" baseline="0" dirty="0">
+                <a:ln>
+                  <a:noFill/>
+                </a:ln>
+                <a:solidFill>
+                  <a:srgbClr val="008000"/>
+                </a:solidFill>
+                <a:effectLst/>
+                <a:latin typeface="JetBrains Mono"/>
+              </a:rPr>
+              <a:t>"input.txt"</a:t>
+            </a:r>
+            <a:r>
+              <a:rPr kumimoji="0" lang="en-US" altLang="en-US" sz="2400" b="0" i="0" u="none" strike="noStrike" cap="none" normalizeH="0" baseline="0" dirty="0">
+                <a:ln>
+                  <a:noFill/>
+                </a:ln>
+                <a:solidFill>
+                  <a:srgbClr val="000000"/>
+                </a:solidFill>
+                <a:effectLst/>
+                <a:latin typeface="JetBrains Mono"/>
+              </a:rPr>
+              <a:t>));</a:t>
+            </a:r>
+            <a:br>
+              <a:rPr kumimoji="0" lang="en-US" altLang="en-US" sz="2400" b="0" i="0" u="none" strike="noStrike" cap="none" normalizeH="0" baseline="0" dirty="0">
+                <a:ln>
+                  <a:noFill/>
+                </a:ln>
+                <a:solidFill>
+                  <a:srgbClr val="000000"/>
+                </a:solidFill>
+                <a:effectLst/>
+                <a:latin typeface="JetBrains Mono"/>
+              </a:rPr>
+            </a:br>
+            <a:r>
+              <a:rPr kumimoji="0" lang="en-US" altLang="en-US" sz="2400" b="0" i="0" u="none" strike="noStrike" cap="none" normalizeH="0" baseline="0" dirty="0">
+                <a:ln>
+                  <a:noFill/>
+                </a:ln>
+                <a:solidFill>
+                  <a:srgbClr val="000000"/>
+                </a:solidFill>
+                <a:effectLst/>
+                <a:latin typeface="JetBrains Mono"/>
+              </a:rPr>
+              <a:t>        String[] line = </a:t>
+            </a:r>
+            <a:r>
+              <a:rPr kumimoji="0" lang="en-US" altLang="en-US" sz="2400" b="0" i="0" u="none" strike="noStrike" cap="none" normalizeH="0" baseline="0" dirty="0" err="1">
+                <a:ln>
+                  <a:noFill/>
+                </a:ln>
+                <a:solidFill>
+                  <a:srgbClr val="000000"/>
+                </a:solidFill>
+                <a:effectLst/>
+                <a:latin typeface="JetBrains Mono"/>
+              </a:rPr>
+              <a:t>scanner.nextLine</a:t>
+            </a:r>
+            <a:r>
+              <a:rPr kumimoji="0" lang="en-US" altLang="en-US" sz="2400" b="0" i="0" u="none" strike="noStrike" cap="none" normalizeH="0" baseline="0" dirty="0">
+                <a:ln>
+                  <a:noFill/>
+                </a:ln>
+                <a:solidFill>
+                  <a:srgbClr val="000000"/>
+                </a:solidFill>
+                <a:effectLst/>
+                <a:latin typeface="JetBrains Mono"/>
+              </a:rPr>
+              <a:t>().split(</a:t>
+            </a:r>
+            <a:r>
+              <a:rPr kumimoji="0" lang="en-US" altLang="en-US" sz="2400" b="1" i="0" u="none" strike="noStrike" cap="none" normalizeH="0" baseline="0" dirty="0">
+                <a:ln>
+                  <a:noFill/>
+                </a:ln>
+                <a:solidFill>
+                  <a:srgbClr val="008000"/>
+                </a:solidFill>
+                <a:effectLst/>
+                <a:latin typeface="JetBrains Mono"/>
+              </a:rPr>
+              <a:t>","</a:t>
+            </a:r>
+            <a:r>
+              <a:rPr kumimoji="0" lang="en-US" altLang="en-US" sz="2400" b="0" i="0" u="none" strike="noStrike" cap="none" normalizeH="0" baseline="0" dirty="0">
+                <a:ln>
+                  <a:noFill/>
+                </a:ln>
+                <a:solidFill>
+                  <a:srgbClr val="000000"/>
+                </a:solidFill>
+                <a:effectLst/>
+                <a:latin typeface="JetBrains Mono"/>
+              </a:rPr>
+              <a:t>);</a:t>
+            </a:r>
+            <a:br>
+              <a:rPr kumimoji="0" lang="en-US" altLang="en-US" sz="2400" b="0" i="0" u="none" strike="noStrike" cap="none" normalizeH="0" baseline="0" dirty="0">
+                <a:ln>
+                  <a:noFill/>
+                </a:ln>
+                <a:solidFill>
+                  <a:srgbClr val="000000"/>
+                </a:solidFill>
+                <a:effectLst/>
+                <a:latin typeface="JetBrains Mono"/>
+              </a:rPr>
+            </a:br>
+            <a:r>
+              <a:rPr kumimoji="0" lang="en-US" altLang="en-US" sz="2400" b="0" i="0" u="none" strike="noStrike" cap="none" normalizeH="0" baseline="0" dirty="0">
+                <a:ln>
+                  <a:noFill/>
+                </a:ln>
+                <a:solidFill>
+                  <a:srgbClr val="000000"/>
+                </a:solidFill>
+                <a:effectLst/>
+                <a:latin typeface="JetBrains Mono"/>
+              </a:rPr>
+              <a:t>        </a:t>
+            </a:r>
+            <a:r>
+              <a:rPr kumimoji="0" lang="en-US" altLang="en-US" sz="2400" b="0" i="0" u="none" strike="noStrike" cap="none" normalizeH="0" baseline="0" dirty="0" err="1">
+                <a:ln>
+                  <a:noFill/>
+                </a:ln>
+                <a:solidFill>
+                  <a:srgbClr val="000000"/>
+                </a:solidFill>
+                <a:effectLst/>
+                <a:latin typeface="JetBrains Mono"/>
+              </a:rPr>
+              <a:t>System.</a:t>
+            </a:r>
+            <a:r>
+              <a:rPr kumimoji="0" lang="en-US" altLang="en-US" sz="2400" b="1" i="1" u="none" strike="noStrike" cap="none" normalizeH="0" baseline="0" dirty="0" err="1">
+                <a:ln>
+                  <a:noFill/>
+                </a:ln>
+                <a:solidFill>
+                  <a:srgbClr val="660E7A"/>
+                </a:solidFill>
+                <a:effectLst/>
+                <a:latin typeface="JetBrains Mono"/>
+              </a:rPr>
+              <a:t>out</a:t>
+            </a:r>
+            <a:r>
+              <a:rPr kumimoji="0" lang="en-US" altLang="en-US" sz="2400" b="0" i="0" u="none" strike="noStrike" cap="none" normalizeH="0" baseline="0" dirty="0" err="1">
+                <a:ln>
+                  <a:noFill/>
+                </a:ln>
+                <a:solidFill>
+                  <a:srgbClr val="000000"/>
+                </a:solidFill>
+                <a:effectLst/>
+                <a:latin typeface="JetBrains Mono"/>
+              </a:rPr>
+              <a:t>.println</a:t>
+            </a:r>
+            <a:r>
+              <a:rPr kumimoji="0" lang="en-US" altLang="en-US" sz="2400" b="0" i="0" u="none" strike="noStrike" cap="none" normalizeH="0" baseline="0" dirty="0">
+                <a:ln>
+                  <a:noFill/>
+                </a:ln>
+                <a:solidFill>
+                  <a:srgbClr val="000000"/>
+                </a:solidFill>
+                <a:effectLst/>
+                <a:latin typeface="JetBrains Mono"/>
+              </a:rPr>
+              <a:t>(line[ </a:t>
+            </a:r>
+            <a:r>
+              <a:rPr kumimoji="0" lang="en-US" altLang="en-US" sz="2400" b="0" i="0" u="none" strike="noStrike" cap="none" normalizeH="0" baseline="0" dirty="0">
+                <a:ln>
+                  <a:noFill/>
+                </a:ln>
+                <a:solidFill>
+                  <a:srgbClr val="0000FF"/>
+                </a:solidFill>
+                <a:effectLst/>
+                <a:latin typeface="JetBrains Mono"/>
+              </a:rPr>
+              <a:t>1 </a:t>
+            </a:r>
+            <a:r>
+              <a:rPr kumimoji="0" lang="en-US" altLang="en-US" sz="2400" b="0" i="0" u="none" strike="noStrike" cap="none" normalizeH="0" baseline="0" dirty="0">
+                <a:ln>
+                  <a:noFill/>
+                </a:ln>
+                <a:solidFill>
+                  <a:srgbClr val="000000"/>
+                </a:solidFill>
+                <a:effectLst/>
+                <a:latin typeface="JetBrains Mono"/>
+              </a:rPr>
+              <a:t>]);</a:t>
+            </a:r>
+            <a:br>
+              <a:rPr kumimoji="0" lang="en-US" altLang="en-US" sz="2400" b="0" i="0" u="none" strike="noStrike" cap="none" normalizeH="0" baseline="0" dirty="0">
+                <a:ln>
+                  <a:noFill/>
+                </a:ln>
+                <a:solidFill>
+                  <a:srgbClr val="000000"/>
+                </a:solidFill>
+                <a:effectLst/>
+                <a:latin typeface="JetBrains Mono"/>
+              </a:rPr>
+            </a:br>
+            <a:r>
+              <a:rPr kumimoji="0" lang="en-US" altLang="en-US" sz="2400" b="0" i="0" u="none" strike="noStrike" cap="none" normalizeH="0" baseline="0" dirty="0">
+                <a:ln>
+                  <a:noFill/>
+                </a:ln>
+                <a:solidFill>
+                  <a:srgbClr val="000000"/>
+                </a:solidFill>
+                <a:effectLst/>
+                <a:latin typeface="JetBrains Mono"/>
+              </a:rPr>
+              <a:t>        </a:t>
+            </a:r>
+            <a:r>
+              <a:rPr kumimoji="0" lang="en-US" altLang="en-US" sz="2400" b="0" i="0" u="none" strike="noStrike" cap="none" normalizeH="0" baseline="0" dirty="0" err="1">
+                <a:ln>
+                  <a:noFill/>
+                </a:ln>
+                <a:solidFill>
+                  <a:srgbClr val="000000"/>
+                </a:solidFill>
+                <a:effectLst/>
+                <a:latin typeface="JetBrains Mono"/>
+              </a:rPr>
+              <a:t>System.</a:t>
+            </a:r>
+            <a:r>
+              <a:rPr kumimoji="0" lang="en-US" altLang="en-US" sz="2400" b="1" i="1" u="none" strike="noStrike" cap="none" normalizeH="0" baseline="0" dirty="0" err="1">
+                <a:ln>
+                  <a:noFill/>
+                </a:ln>
+                <a:solidFill>
+                  <a:srgbClr val="660E7A"/>
+                </a:solidFill>
+                <a:effectLst/>
+                <a:latin typeface="JetBrains Mono"/>
+              </a:rPr>
+              <a:t>out</a:t>
+            </a:r>
+            <a:r>
+              <a:rPr kumimoji="0" lang="en-US" altLang="en-US" sz="2400" b="0" i="0" u="none" strike="noStrike" cap="none" normalizeH="0" baseline="0" dirty="0" err="1">
+                <a:ln>
+                  <a:noFill/>
+                </a:ln>
+                <a:solidFill>
+                  <a:srgbClr val="000000"/>
+                </a:solidFill>
+                <a:effectLst/>
+                <a:latin typeface="JetBrains Mono"/>
+              </a:rPr>
+              <a:t>.println</a:t>
+            </a:r>
+            <a:r>
+              <a:rPr kumimoji="0" lang="en-US" altLang="en-US" sz="2400" b="0" i="0" u="none" strike="noStrike" cap="none" normalizeH="0" baseline="0" dirty="0">
+                <a:ln>
+                  <a:noFill/>
+                </a:ln>
+                <a:solidFill>
+                  <a:srgbClr val="000000"/>
+                </a:solidFill>
+                <a:effectLst/>
+                <a:latin typeface="JetBrains Mono"/>
+              </a:rPr>
+              <a:t>(</a:t>
+            </a:r>
+            <a:r>
+              <a:rPr kumimoji="0" lang="en-US" altLang="en-US" sz="2400" b="0" i="0" u="none" strike="noStrike" cap="none" normalizeH="0" baseline="0" dirty="0" err="1">
+                <a:ln>
+                  <a:noFill/>
+                </a:ln>
+                <a:solidFill>
+                  <a:srgbClr val="000000"/>
+                </a:solidFill>
+                <a:effectLst/>
+                <a:latin typeface="JetBrains Mono"/>
+              </a:rPr>
+              <a:t>scanner.next</a:t>
+            </a:r>
+            <a:r>
+              <a:rPr kumimoji="0" lang="en-US" altLang="en-US" sz="2400" b="0" i="0" u="none" strike="noStrike" cap="none" normalizeH="0" baseline="0" dirty="0">
+                <a:ln>
+                  <a:noFill/>
+                </a:ln>
+                <a:solidFill>
+                  <a:srgbClr val="000000"/>
+                </a:solidFill>
+                <a:effectLst/>
+                <a:latin typeface="JetBrains Mono"/>
+              </a:rPr>
+              <a:t>());</a:t>
+            </a:r>
+            <a:br>
+              <a:rPr kumimoji="0" lang="en-US" altLang="en-US" sz="2400" b="0" i="0" u="none" strike="noStrike" cap="none" normalizeH="0" baseline="0" dirty="0">
+                <a:ln>
+                  <a:noFill/>
+                </a:ln>
+                <a:solidFill>
+                  <a:srgbClr val="000000"/>
+                </a:solidFill>
+                <a:effectLst/>
+                <a:latin typeface="JetBrains Mono"/>
+              </a:rPr>
+            </a:br>
+            <a:r>
+              <a:rPr kumimoji="0" lang="en-US" altLang="en-US" sz="2400" b="0" i="0" u="none" strike="noStrike" cap="none" normalizeH="0" baseline="0" dirty="0">
+                <a:ln>
+                  <a:noFill/>
+                </a:ln>
+                <a:solidFill>
+                  <a:srgbClr val="000000"/>
+                </a:solidFill>
+                <a:effectLst/>
+                <a:latin typeface="JetBrains Mono"/>
+              </a:rPr>
+              <a:t>        </a:t>
+            </a:r>
+            <a:r>
+              <a:rPr kumimoji="0" lang="en-US" altLang="en-US" sz="2400" b="0" i="0" u="none" strike="noStrike" cap="none" normalizeH="0" baseline="0" dirty="0" err="1">
+                <a:ln>
+                  <a:noFill/>
+                </a:ln>
+                <a:solidFill>
+                  <a:srgbClr val="000000"/>
+                </a:solidFill>
+                <a:effectLst/>
+                <a:latin typeface="JetBrains Mono"/>
+              </a:rPr>
+              <a:t>scanner.nextLine</a:t>
+            </a:r>
+            <a:r>
+              <a:rPr kumimoji="0" lang="en-US" altLang="en-US" sz="2400" b="0" i="0" u="none" strike="noStrike" cap="none" normalizeH="0" baseline="0" dirty="0">
+                <a:ln>
+                  <a:noFill/>
+                </a:ln>
+                <a:solidFill>
+                  <a:srgbClr val="000000"/>
+                </a:solidFill>
+                <a:effectLst/>
+                <a:latin typeface="JetBrains Mono"/>
+              </a:rPr>
+              <a:t>();</a:t>
+            </a:r>
+            <a:br>
+              <a:rPr kumimoji="0" lang="en-US" altLang="en-US" sz="2400" b="0" i="0" u="none" strike="noStrike" cap="none" normalizeH="0" baseline="0" dirty="0">
+                <a:ln>
+                  <a:noFill/>
+                </a:ln>
+                <a:solidFill>
+                  <a:srgbClr val="000000"/>
+                </a:solidFill>
+                <a:effectLst/>
+                <a:latin typeface="JetBrains Mono"/>
+              </a:rPr>
+            </a:br>
+            <a:r>
+              <a:rPr kumimoji="0" lang="en-US" altLang="en-US" sz="2400" b="0" i="0" u="none" strike="noStrike" cap="none" normalizeH="0" baseline="0" dirty="0">
+                <a:ln>
+                  <a:noFill/>
+                </a:ln>
+                <a:solidFill>
+                  <a:srgbClr val="000000"/>
+                </a:solidFill>
+                <a:effectLst/>
+                <a:latin typeface="JetBrains Mono"/>
+              </a:rPr>
+              <a:t>        </a:t>
+            </a:r>
+            <a:r>
+              <a:rPr kumimoji="0" lang="en-US" altLang="en-US" sz="2400" b="0" i="0" u="none" strike="noStrike" cap="none" normalizeH="0" baseline="0" dirty="0" err="1">
+                <a:ln>
+                  <a:noFill/>
+                </a:ln>
+                <a:solidFill>
+                  <a:srgbClr val="000000"/>
+                </a:solidFill>
+                <a:effectLst/>
+                <a:latin typeface="JetBrains Mono"/>
+              </a:rPr>
+              <a:t>System.</a:t>
+            </a:r>
+            <a:r>
+              <a:rPr kumimoji="0" lang="en-US" altLang="en-US" sz="2400" b="1" i="1" u="none" strike="noStrike" cap="none" normalizeH="0" baseline="0" dirty="0" err="1">
+                <a:ln>
+                  <a:noFill/>
+                </a:ln>
+                <a:solidFill>
+                  <a:srgbClr val="660E7A"/>
+                </a:solidFill>
+                <a:effectLst/>
+                <a:latin typeface="JetBrains Mono"/>
+              </a:rPr>
+              <a:t>out</a:t>
+            </a:r>
+            <a:r>
+              <a:rPr kumimoji="0" lang="en-US" altLang="en-US" sz="2400" b="0" i="0" u="none" strike="noStrike" cap="none" normalizeH="0" baseline="0" dirty="0" err="1">
+                <a:ln>
+                  <a:noFill/>
+                </a:ln>
+                <a:solidFill>
+                  <a:srgbClr val="000000"/>
+                </a:solidFill>
+                <a:effectLst/>
+                <a:latin typeface="JetBrains Mono"/>
+              </a:rPr>
+              <a:t>.println</a:t>
+            </a:r>
+            <a:r>
+              <a:rPr kumimoji="0" lang="en-US" altLang="en-US" sz="2400" b="0" i="0" u="none" strike="noStrike" cap="none" normalizeH="0" baseline="0" dirty="0">
+                <a:ln>
+                  <a:noFill/>
+                </a:ln>
+                <a:solidFill>
+                  <a:srgbClr val="000000"/>
+                </a:solidFill>
+                <a:effectLst/>
+                <a:latin typeface="JetBrains Mono"/>
+              </a:rPr>
+              <a:t>(</a:t>
+            </a:r>
+            <a:r>
+              <a:rPr kumimoji="0" lang="en-US" altLang="en-US" sz="2400" b="0" i="0" u="none" strike="noStrike" cap="none" normalizeH="0" baseline="0" dirty="0" err="1">
+                <a:ln>
+                  <a:noFill/>
+                </a:ln>
+                <a:solidFill>
+                  <a:srgbClr val="000000"/>
+                </a:solidFill>
+                <a:effectLst/>
+                <a:latin typeface="JetBrains Mono"/>
+              </a:rPr>
+              <a:t>scanner.nextLine</a:t>
+            </a:r>
+            <a:r>
+              <a:rPr kumimoji="0" lang="en-US" altLang="en-US" sz="2400" b="0" i="0" u="none" strike="noStrike" cap="none" normalizeH="0" baseline="0" dirty="0">
+                <a:ln>
+                  <a:noFill/>
+                </a:ln>
+                <a:solidFill>
+                  <a:srgbClr val="000000"/>
+                </a:solidFill>
+                <a:effectLst/>
+                <a:latin typeface="JetBrains Mono"/>
+              </a:rPr>
+              <a:t>().split(</a:t>
+            </a:r>
+            <a:r>
+              <a:rPr kumimoji="0" lang="en-US" altLang="en-US" sz="2400" b="1" i="0" u="none" strike="noStrike" cap="none" normalizeH="0" baseline="0" dirty="0">
+                <a:ln>
+                  <a:noFill/>
+                </a:ln>
+                <a:solidFill>
+                  <a:srgbClr val="008000"/>
+                </a:solidFill>
+                <a:effectLst/>
+                <a:latin typeface="JetBrains Mono"/>
+              </a:rPr>
+              <a:t>","</a:t>
+            </a:r>
+            <a:r>
+              <a:rPr kumimoji="0" lang="en-US" altLang="en-US" sz="2400" b="0" i="0" u="none" strike="noStrike" cap="none" normalizeH="0" baseline="0" dirty="0">
+                <a:ln>
+                  <a:noFill/>
+                </a:ln>
+                <a:solidFill>
+                  <a:srgbClr val="000000"/>
+                </a:solidFill>
+                <a:effectLst/>
+                <a:latin typeface="JetBrains Mono"/>
+              </a:rPr>
+              <a:t>)[ </a:t>
+            </a:r>
+            <a:r>
+              <a:rPr kumimoji="0" lang="en-US" altLang="en-US" sz="2400" b="0" i="0" u="none" strike="noStrike" cap="none" normalizeH="0" baseline="0" dirty="0">
+                <a:ln>
+                  <a:noFill/>
+                </a:ln>
+                <a:solidFill>
+                  <a:srgbClr val="0000FF"/>
+                </a:solidFill>
+                <a:effectLst/>
+                <a:latin typeface="JetBrains Mono"/>
+              </a:rPr>
+              <a:t>0 </a:t>
+            </a:r>
+            <a:r>
+              <a:rPr kumimoji="0" lang="en-US" altLang="en-US" sz="2400" b="0" i="0" u="none" strike="noStrike" cap="none" normalizeH="0" baseline="0" dirty="0">
+                <a:ln>
+                  <a:noFill/>
+                </a:ln>
+                <a:solidFill>
+                  <a:srgbClr val="000000"/>
+                </a:solidFill>
+                <a:effectLst/>
+                <a:latin typeface="JetBrains Mono"/>
+              </a:rPr>
+              <a:t>]);</a:t>
+            </a:r>
+            <a:br>
+              <a:rPr kumimoji="0" lang="en-US" altLang="en-US" sz="2400" b="0" i="0" u="none" strike="noStrike" cap="none" normalizeH="0" baseline="0" dirty="0">
+                <a:ln>
+                  <a:noFill/>
+                </a:ln>
+                <a:solidFill>
+                  <a:srgbClr val="000000"/>
+                </a:solidFill>
+                <a:effectLst/>
+                <a:latin typeface="JetBrains Mono"/>
+              </a:rPr>
+            </a:br>
+            <a:r>
+              <a:rPr kumimoji="0" lang="en-US" altLang="en-US" sz="2400" b="0" i="0" u="none" strike="noStrike" cap="none" normalizeH="0" baseline="0" dirty="0">
+                <a:ln>
+                  <a:noFill/>
+                </a:ln>
+                <a:solidFill>
+                  <a:srgbClr val="000000"/>
+                </a:solidFill>
+                <a:effectLst/>
+                <a:latin typeface="JetBrains Mono"/>
+              </a:rPr>
+              <a:t>    }</a:t>
+            </a:r>
+            <a:r>
+              <a:rPr kumimoji="0" lang="en-US" altLang="en-US" sz="2400" b="1" i="0" u="none" strike="noStrike" cap="none" normalizeH="0" baseline="0" dirty="0">
+                <a:ln>
+                  <a:noFill/>
+                </a:ln>
+                <a:solidFill>
+                  <a:srgbClr val="000080"/>
+                </a:solidFill>
+                <a:effectLst/>
+                <a:latin typeface="JetBrains Mono"/>
+              </a:rPr>
+              <a:t>catch</a:t>
+            </a:r>
+            <a:r>
+              <a:rPr kumimoji="0" lang="en-US" altLang="en-US" sz="2400" b="0" i="0" u="none" strike="noStrike" cap="none" normalizeH="0" baseline="0" dirty="0">
+                <a:ln>
+                  <a:noFill/>
+                </a:ln>
+                <a:solidFill>
+                  <a:srgbClr val="000000"/>
+                </a:solidFill>
+                <a:effectLst/>
+                <a:latin typeface="JetBrains Mono"/>
+              </a:rPr>
+              <a:t>(Exception ex) {</a:t>
+            </a:r>
+            <a:br>
+              <a:rPr kumimoji="0" lang="en-US" altLang="en-US" sz="2400" b="0" i="0" u="none" strike="noStrike" cap="none" normalizeH="0" baseline="0" dirty="0">
+                <a:ln>
+                  <a:noFill/>
+                </a:ln>
+                <a:solidFill>
+                  <a:srgbClr val="000000"/>
+                </a:solidFill>
+                <a:effectLst/>
+                <a:latin typeface="JetBrains Mono"/>
+              </a:rPr>
+            </a:br>
+            <a:r>
+              <a:rPr kumimoji="0" lang="en-US" altLang="en-US" sz="2400" b="0" i="0" u="none" strike="noStrike" cap="none" normalizeH="0" baseline="0" dirty="0">
+                <a:ln>
+                  <a:noFill/>
+                </a:ln>
+                <a:solidFill>
+                  <a:srgbClr val="000000"/>
+                </a:solidFill>
+                <a:effectLst/>
+                <a:latin typeface="JetBrains Mono"/>
+              </a:rPr>
+              <a:t>        </a:t>
+            </a:r>
+            <a:r>
+              <a:rPr kumimoji="0" lang="en-US" altLang="en-US" sz="2400" b="0" i="0" u="none" strike="noStrike" cap="none" normalizeH="0" baseline="0" dirty="0" err="1">
+                <a:ln>
+                  <a:noFill/>
+                </a:ln>
+                <a:solidFill>
+                  <a:srgbClr val="000000"/>
+                </a:solidFill>
+                <a:effectLst/>
+                <a:latin typeface="JetBrains Mono"/>
+              </a:rPr>
+              <a:t>System.</a:t>
+            </a:r>
+            <a:r>
+              <a:rPr kumimoji="0" lang="en-US" altLang="en-US" sz="2400" b="1" i="1" u="none" strike="noStrike" cap="none" normalizeH="0" baseline="0" dirty="0" err="1">
+                <a:ln>
+                  <a:noFill/>
+                </a:ln>
+                <a:solidFill>
+                  <a:srgbClr val="660E7A"/>
+                </a:solidFill>
+                <a:effectLst/>
+                <a:latin typeface="JetBrains Mono"/>
+              </a:rPr>
+              <a:t>out</a:t>
+            </a:r>
+            <a:r>
+              <a:rPr kumimoji="0" lang="en-US" altLang="en-US" sz="2400" b="0" i="0" u="none" strike="noStrike" cap="none" normalizeH="0" baseline="0" dirty="0" err="1">
+                <a:ln>
+                  <a:noFill/>
+                </a:ln>
+                <a:solidFill>
+                  <a:srgbClr val="000000"/>
+                </a:solidFill>
+                <a:effectLst/>
+                <a:latin typeface="JetBrains Mono"/>
+              </a:rPr>
+              <a:t>.println</a:t>
+            </a:r>
+            <a:r>
+              <a:rPr kumimoji="0" lang="en-US" altLang="en-US" sz="2400" b="0" i="0" u="none" strike="noStrike" cap="none" normalizeH="0" baseline="0" dirty="0">
+                <a:ln>
+                  <a:noFill/>
+                </a:ln>
+                <a:solidFill>
+                  <a:srgbClr val="000000"/>
+                </a:solidFill>
+                <a:effectLst/>
+                <a:latin typeface="JetBrains Mono"/>
+              </a:rPr>
+              <a:t>(</a:t>
+            </a:r>
+            <a:r>
+              <a:rPr kumimoji="0" lang="en-US" altLang="en-US" sz="2400" b="1" i="0" u="none" strike="noStrike" cap="none" normalizeH="0" baseline="0" dirty="0">
+                <a:ln>
+                  <a:noFill/>
+                </a:ln>
+                <a:solidFill>
+                  <a:srgbClr val="008000"/>
+                </a:solidFill>
+                <a:effectLst/>
+                <a:latin typeface="JetBrains Mono"/>
+              </a:rPr>
+              <a:t>"Exception!"</a:t>
+            </a:r>
+            <a:r>
+              <a:rPr kumimoji="0" lang="en-US" altLang="en-US" sz="2400" b="0" i="0" u="none" strike="noStrike" cap="none" normalizeH="0" baseline="0" dirty="0">
+                <a:ln>
+                  <a:noFill/>
+                </a:ln>
+                <a:solidFill>
+                  <a:srgbClr val="000000"/>
+                </a:solidFill>
+                <a:effectLst/>
+                <a:latin typeface="JetBrains Mono"/>
+              </a:rPr>
+              <a:t>);</a:t>
+            </a:r>
+            <a:br>
+              <a:rPr kumimoji="0" lang="en-US" altLang="en-US" sz="2400" b="0" i="0" u="none" strike="noStrike" cap="none" normalizeH="0" baseline="0" dirty="0">
+                <a:ln>
+                  <a:noFill/>
+                </a:ln>
+                <a:solidFill>
+                  <a:srgbClr val="000000"/>
+                </a:solidFill>
+                <a:effectLst/>
+                <a:latin typeface="JetBrains Mono"/>
+              </a:rPr>
+            </a:br>
+            <a:r>
+              <a:rPr kumimoji="0" lang="en-US" altLang="en-US" sz="2400" b="0" i="0" u="none" strike="noStrike" cap="none" normalizeH="0" baseline="0" dirty="0">
+                <a:ln>
+                  <a:noFill/>
+                </a:ln>
+                <a:solidFill>
+                  <a:srgbClr val="000000"/>
+                </a:solidFill>
+                <a:effectLst/>
+                <a:latin typeface="JetBrains Mono"/>
+              </a:rPr>
+              <a:t>    }</a:t>
+            </a:r>
+            <a:br>
+              <a:rPr kumimoji="0" lang="en-US" altLang="en-US" sz="2400" b="0" i="0" u="none" strike="noStrike" cap="none" normalizeH="0" baseline="0" dirty="0">
+                <a:ln>
+                  <a:noFill/>
+                </a:ln>
+                <a:solidFill>
+                  <a:srgbClr val="000000"/>
+                </a:solidFill>
+                <a:effectLst/>
+                <a:latin typeface="JetBrains Mono"/>
+              </a:rPr>
+            </a:br>
+            <a:r>
+              <a:rPr kumimoji="0" lang="en-US" altLang="en-US" sz="2400" b="0" i="0" u="none" strike="noStrike" cap="none" normalizeH="0" baseline="0" dirty="0">
+                <a:ln>
+                  <a:noFill/>
+                </a:ln>
+                <a:solidFill>
+                  <a:srgbClr val="000000"/>
+                </a:solidFill>
+                <a:effectLst/>
+                <a:latin typeface="JetBrains Mono"/>
+              </a:rPr>
+              <a:t>}</a:t>
+            </a:r>
+            <a:endParaRPr kumimoji="0" lang="en-US" altLang="en-US" sz="2400" b="0" i="0" u="none" strike="noStrike" cap="none" normalizeH="0" baseline="0" dirty="0">
+              <a:ln>
+                <a:noFill/>
+              </a:ln>
+              <a:solidFill>
+                <a:schemeClr val="tx1"/>
+              </a:solidFill>
+              <a:effectLst/>
+              <a:latin typeface="Arial" panose="020B0604020202020204" pitchFamily="34" charset="0"/>
+            </a:endParaRPr>
+          </a:p>
+        </p:txBody>
+      </p:sp>
+      <p:sp>
+        <p:nvSpPr>
+          <p:cNvPr id="5" name="Rectangle 2">
+            <a:extLst>
+              <a:ext uri="{FF2B5EF4-FFF2-40B4-BE49-F238E27FC236}">
+                <a16:creationId xmlns:a16="http://schemas.microsoft.com/office/drawing/2014/main" id="{27F608D9-9D8F-46E9-8B1E-99872F156543}"/>
+              </a:ext>
+            </a:extLst>
+          </p:cNvPr>
+          <p:cNvSpPr>
+            <a:spLocks noChangeArrowheads="1"/>
+          </p:cNvSpPr>
+          <p:nvPr/>
+        </p:nvSpPr>
+        <p:spPr bwMode="auto">
+          <a:xfrm>
+            <a:off x="9840686" y="1094389"/>
+            <a:ext cx="3033485" cy="1200329"/>
+          </a:xfrm>
+          <a:prstGeom prst="rect">
+            <a:avLst/>
+          </a:prstGeom>
+          <a:solidFill>
+            <a:srgbClr val="FFFFFF"/>
+          </a:solidFill>
+          <a:ln>
+            <a:noFill/>
+          </a:ln>
+          <a:effectLst/>
+          <a:extLst>
+            <a:ext uri="{91240B29-F687-4F45-9708-019B960494DF}">
+              <a14:hiddenLine xmlns:a14="http://schemas.microsoft.com/office/drawing/2010/main" w="9525">
+                <a:solidFill>
+                  <a:schemeClr val="tx1"/>
+                </a:solidFill>
+                <a:miter lim="800000"/>
+                <a:headEnd/>
+                <a:tailEnd/>
+              </a14:hiddenLine>
+            </a:ext>
+            <a:ext uri="{AF507438-7753-43E0-B8FC-AC1667EBCBE1}">
+              <a14:hiddenEffects xmlns:a14="http://schemas.microsoft.com/office/drawing/2010/main">
+                <a:effectLst>
+                  <a:outerShdw dist="35921" dir="2700000" algn="ctr" rotWithShape="0">
+                    <a:schemeClr val="bg2"/>
+                  </a:outerShdw>
+                </a:effectLst>
+              </a14:hiddenEffects>
+            </a:ext>
+          </a:extLst>
+        </p:spPr>
+        <p:txBody>
+          <a:bodyPr vert="horz" wrap="square" lIns="91440" tIns="45720" rIns="91440" bIns="45720" numCol="1" anchor="ctr" anchorCtr="0" compatLnSpc="1">
+            <a:prstTxWarp prst="textNoShape">
+              <a:avLst/>
+            </a:prstTxWarp>
+            <a:spAutoFit/>
+          </a:bodyPr>
+          <a:lstStyle/>
+          <a:p>
+            <a:pPr marL="0" marR="0" lvl="0" indent="0" algn="l" defTabSz="914400" rtl="0" eaLnBrk="0" fontAlgn="base" latinLnBrk="0" hangingPunct="0">
+              <a:lnSpc>
+                <a:spcPct val="100000"/>
+              </a:lnSpc>
+              <a:spcBef>
+                <a:spcPct val="0"/>
+              </a:spcBef>
+              <a:spcAft>
+                <a:spcPct val="0"/>
+              </a:spcAft>
+              <a:buClrTx/>
+              <a:buSzTx/>
+              <a:buFontTx/>
+              <a:buNone/>
+              <a:tabLst/>
+            </a:pPr>
+            <a:r>
+              <a:rPr kumimoji="0" lang="en-US" altLang="en-US" sz="1800" b="0" i="0" u="none" strike="noStrike" cap="none" normalizeH="0" baseline="0">
+                <a:ln>
+                  <a:noFill/>
+                </a:ln>
+                <a:solidFill>
+                  <a:srgbClr val="000000"/>
+                </a:solidFill>
+                <a:effectLst/>
+                <a:latin typeface="JetBrains Mono"/>
+              </a:rPr>
+              <a:t>Data,Row1,Row2,Row3</a:t>
+            </a:r>
+            <a:br>
+              <a:rPr kumimoji="0" lang="en-US" altLang="en-US" sz="1800" b="0" i="0" u="none" strike="noStrike" cap="none" normalizeH="0" baseline="0">
+                <a:ln>
+                  <a:noFill/>
+                </a:ln>
+                <a:solidFill>
+                  <a:srgbClr val="000000"/>
+                </a:solidFill>
+                <a:effectLst/>
+                <a:latin typeface="JetBrains Mono"/>
+              </a:rPr>
+            </a:br>
+            <a:r>
+              <a:rPr kumimoji="0" lang="en-US" altLang="en-US" sz="1800" b="0" i="0" u="none" strike="noStrike" cap="none" normalizeH="0" baseline="0">
+                <a:ln>
+                  <a:noFill/>
+                </a:ln>
+                <a:solidFill>
+                  <a:srgbClr val="000000"/>
+                </a:solidFill>
+                <a:effectLst/>
+                <a:latin typeface="JetBrains Mono"/>
+              </a:rPr>
+              <a:t>avery,20,30,40</a:t>
+            </a:r>
+            <a:br>
+              <a:rPr kumimoji="0" lang="en-US" altLang="en-US" sz="1800" b="0" i="0" u="none" strike="noStrike" cap="none" normalizeH="0" baseline="0">
+                <a:ln>
+                  <a:noFill/>
+                </a:ln>
+                <a:solidFill>
+                  <a:srgbClr val="000000"/>
+                </a:solidFill>
+                <a:effectLst/>
+                <a:latin typeface="JetBrains Mono"/>
+              </a:rPr>
+            </a:br>
+            <a:r>
+              <a:rPr kumimoji="0" lang="en-US" altLang="en-US" sz="1800" b="0" i="0" u="none" strike="noStrike" cap="none" normalizeH="0" baseline="0">
+                <a:ln>
+                  <a:noFill/>
+                </a:ln>
+                <a:solidFill>
+                  <a:srgbClr val="000000"/>
+                </a:solidFill>
+                <a:effectLst/>
+                <a:latin typeface="JetBrains Mono"/>
+              </a:rPr>
+              <a:t>alice,15,20,30</a:t>
+            </a:r>
+            <a:br>
+              <a:rPr kumimoji="0" lang="en-US" altLang="en-US" sz="1800" b="0" i="0" u="none" strike="noStrike" cap="none" normalizeH="0" baseline="0">
+                <a:ln>
+                  <a:noFill/>
+                </a:ln>
+                <a:solidFill>
+                  <a:srgbClr val="000000"/>
+                </a:solidFill>
+                <a:effectLst/>
+                <a:latin typeface="JetBrains Mono"/>
+              </a:rPr>
+            </a:br>
+            <a:r>
+              <a:rPr kumimoji="0" lang="en-US" altLang="en-US" sz="1800" b="0" i="0" u="none" strike="noStrike" cap="none" normalizeH="0" baseline="0">
+                <a:ln>
+                  <a:noFill/>
+                </a:ln>
+                <a:solidFill>
+                  <a:srgbClr val="000000"/>
+                </a:solidFill>
+                <a:effectLst/>
+                <a:latin typeface="JetBrains Mono"/>
+              </a:rPr>
+              <a:t>hatter,29,19,21</a:t>
+            </a:r>
+            <a:endParaRPr kumimoji="0" lang="en-US" altLang="en-US" sz="1800" b="0" i="0" u="none" strike="noStrike" cap="none" normalizeH="0" baseline="0">
+              <a:ln>
+                <a:noFill/>
+              </a:ln>
+              <a:solidFill>
+                <a:schemeClr val="tx1"/>
+              </a:solidFill>
+              <a:effectLst/>
+              <a:latin typeface="Arial" panose="020B0604020202020204" pitchFamily="34" charset="0"/>
+            </a:endParaRPr>
+          </a:p>
+        </p:txBody>
+      </p:sp>
+      <p:sp>
+        <p:nvSpPr>
+          <p:cNvPr id="6" name="TextBox 5">
+            <a:extLst>
+              <a:ext uri="{FF2B5EF4-FFF2-40B4-BE49-F238E27FC236}">
+                <a16:creationId xmlns:a16="http://schemas.microsoft.com/office/drawing/2014/main" id="{8E0FCA84-7FAB-421C-875B-8D881DB865B1}"/>
+              </a:ext>
+            </a:extLst>
+          </p:cNvPr>
+          <p:cNvSpPr txBox="1"/>
+          <p:nvPr/>
+        </p:nvSpPr>
+        <p:spPr>
+          <a:xfrm>
+            <a:off x="9739086" y="2959584"/>
+            <a:ext cx="3570514" cy="1631216"/>
+          </a:xfrm>
+          <a:prstGeom prst="rect">
+            <a:avLst/>
+          </a:prstGeom>
+          <a:noFill/>
+        </p:spPr>
+        <p:txBody>
+          <a:bodyPr wrap="square" rtlCol="0">
+            <a:spAutoFit/>
+          </a:bodyPr>
+          <a:lstStyle/>
+          <a:p>
+            <a:r>
+              <a:rPr lang="en-US" dirty="0"/>
+              <a:t>Are there ‘invisible’ characters we aren’t seeing?</a:t>
+            </a:r>
+          </a:p>
+          <a:p>
+            <a:endParaRPr lang="en-US" dirty="0"/>
+          </a:p>
+          <a:p>
+            <a:r>
+              <a:rPr lang="en-US" dirty="0"/>
+              <a:t>How does .next()/.</a:t>
+            </a:r>
+            <a:r>
+              <a:rPr lang="en-US" dirty="0" err="1"/>
+              <a:t>nextLine</a:t>
+            </a:r>
+            <a:r>
+              <a:rPr lang="en-US" dirty="0"/>
+              <a:t>() handle them?</a:t>
+            </a:r>
+          </a:p>
+        </p:txBody>
+      </p:sp>
+    </p:spTree>
+    <p:extLst>
+      <p:ext uri="{BB962C8B-B14F-4D97-AF65-F5344CB8AC3E}">
+        <p14:creationId xmlns:p14="http://schemas.microsoft.com/office/powerpoint/2010/main" val="3476578939"/>
+      </p:ext>
+    </p:extLst>
+  </p:cSld>
+  <p:clrMapOvr>
+    <a:masterClrMapping/>
+  </p:clrMapOvr>
+  <mc:AlternateContent xmlns:mc="http://schemas.openxmlformats.org/markup-compatibility/2006" xmlns:p14="http://schemas.microsoft.com/office/powerpoint/2010/main">
+    <mc:Choice Requires="p14">
+      <p:transition p14:dur="300">
+        <p:fade/>
+      </p:transition>
+    </mc:Choice>
+    <mc:Fallback xmlns="">
+      <p:transition>
+        <p:fade/>
+      </p:transition>
+    </mc:Fallback>
+  </mc:AlternateContent>
 </p:sld>
 </file>
 

</xml_diff>

<commit_message>
just updating minor changes from lecture
</commit_message>
<xml_diff>
--- a/slides/On-Campus/ReviewSessionUnit2_2021.pptx
+++ b/slides/On-Campus/ReviewSessionUnit2_2021.pptx
@@ -5,10 +5,10 @@
     <p:sldMasterId id="2147483648" r:id="rId4"/>
   </p:sldMasterIdLst>
   <p:notesMasterIdLst>
-    <p:notesMasterId r:id="rId15"/>
+    <p:notesMasterId r:id="rId17"/>
   </p:notesMasterIdLst>
   <p:handoutMasterIdLst>
-    <p:handoutMasterId r:id="rId16"/>
+    <p:handoutMasterId r:id="rId18"/>
   </p:handoutMasterIdLst>
   <p:sldIdLst>
     <p:sldId id="256" r:id="rId5"/>
@@ -21,6 +21,8 @@
     <p:sldId id="263" r:id="rId12"/>
     <p:sldId id="266" r:id="rId13"/>
     <p:sldId id="262" r:id="rId14"/>
+    <p:sldId id="267" r:id="rId15"/>
+    <p:sldId id="268" r:id="rId16"/>
   </p:sldIdLst>
   <p:sldSz cx="13817600" cy="7772400"/>
   <p:notesSz cx="6858000" cy="9144000"/>
@@ -223,7 +225,7 @@
           <a:p>
             <a:fld id="{4D7E51A5-B478-1E40-8CBB-0DAA8831E99D}" type="datetimeFigureOut">
               <a:rPr lang="en-US" smtClean="0"/>
-              <a:t>10/10/2021</a:t>
+              <a:t>10/11/21</a:t>
             </a:fld>
             <a:endParaRPr lang="en-US"/>
           </a:p>
@@ -387,6 +389,186 @@
 </inkml:ink>
 </file>
 
+<file path=ppt/ink/ink4.xml><?xml version="1.0" encoding="utf-8"?>
+<inkml:ink xmlns:inkml="http://www.w3.org/2003/InkML">
+  <inkml:definitions>
+    <inkml:context xml:id="ctx0">
+      <inkml:inkSource xml:id="inkSrc0">
+        <inkml:traceFormat>
+          <inkml:channel name="X" type="integer" min="-2.14748E9" max="2.14748E9" units="cm"/>
+          <inkml:channel name="Y" type="integer" min="-2.14748E9" max="2.14748E9" units="cm"/>
+          <inkml:channel name="F" type="integer" max="32767" units="dev"/>
+        </inkml:traceFormat>
+        <inkml:channelProperties>
+          <inkml:channelProperty channel="X" name="resolution" value="1000" units="1/cm"/>
+          <inkml:channelProperty channel="Y" name="resolution" value="1000" units="1/cm"/>
+          <inkml:channelProperty channel="F" name="resolution" value="0" units="1/dev"/>
+        </inkml:channelProperties>
+      </inkml:inkSource>
+      <inkml:timestamp xml:id="ts0" timeString="2021-10-11T14:55:31.398"/>
+    </inkml:context>
+    <inkml:brush xml:id="br0">
+      <inkml:brushProperty name="width" value="0.3" units="cm"/>
+      <inkml:brushProperty name="height" value="0.6" units="cm"/>
+      <inkml:brushProperty name="color" value="#FFFC00"/>
+      <inkml:brushProperty name="tip" value="rectangle"/>
+      <inkml:brushProperty name="rasterOp" value="maskPen"/>
+    </inkml:brush>
+  </inkml:definitions>
+  <inkml:trace contextRef="#ctx0" brushRef="#br0">0 293 16383,'97'4'0,"-1"0"0,1 0 0,-1-1 0,1 1 0,-1 0 0,0 0 0,1-1 0,-1 1 0,1 0 0,-1 0 0,1-1 0,-1 1 0,0 0 0,1 0 0,-1-1 0,1 1 0,5 0 0,6-1 0,5-1 0,1 1 0,2-1 0,-2 0 0,-4 1 0,-4-1 0,-7 2 0,-9 0 0,-11 0 0,-12 2 0,-15 1 0,-16 1 0,4 19 0,-23-14 0,45-3 0,5-19 0,-5-2 0,13-4 0,-2 0 0,4-3 0,11-1 0,-23 7 0,11-1 0,8-1 0,6 0 0,4 1 0,0 1 0,-3 1 0,-5 3 0,1 1 0,0 0 0,2 2 0,1 0 0,3 0 0,4 1 0,3-2 0,-10 2 0,4-1 0,4 1 0,3-1 0,2 1 0,1-1 0,0 1 0,1 0 0,-2 0 0,-2 1 0,-3-1 0,-3 1 0,2 1 0,-1-1 0,-2 1 0,-1 0 0,-1 1 0,-2-1 0,0 1 0,-1 0 0,-1 0 0,-1 0 0,12 1 0,1-1 0,0 1 0,-3 1 0,-1-1 0,-5 0 0,-4 0 0,-7 0 0,25 0 0,-10-1 0,-6 1 0,-8 1 0,22 5 0,-7-1 0,-19-4 0,2-1 0,-5 2 0,7 8 0,-8-1 0,20-7 0,-36 5 0,29-7 0,-25-5 0,8-1 0,-4 5 0,5 1 0,3-1 0,14-3 0,3 0 0,2 1 0,2 2 0,1 1 0,2 1 0,-22-1 0,-1 0 0,4 0 0,8 0 0,-8 0 0,8 0 0,6 0 0,1 0 0,0 0 0,-4 0 0,-7 0 0,20 0 0,-10 0 0,1 0 0,11 0 0,-21 0 0,7 0 0,7 0 0,2 0 0,-1 0 0,-4 0 0,-8 0 0,-10 0 0,26 0 0,-15 0 0,5 0 0,-14 0 0,6 0 0,1 0 0,-3 0 0,-9 0 0,4 0 0,-8 0 0,1 0 0,7 0 0,0 0 0,-4 0 0,7 0 0,-7 0 0,27 0 0,-48 0 0,15 0 0,-14 0 0,45 0 0,-48 0 0,0 0 0,7 0 0,1 0 0,5 0 0,3 0 0,14 0 0,4 0 0,7 0 0,4 0 0,-23 0 0,2 0 0,1 0 0,-2 0 0,0 0 0,1 0 0,0 0 0,1 0 0,-1 0 0,-4 0 0,-1 0 0,-3 0 0,14 0 0,-2 0 0,2 0 0,-4 0 0,-23 0 0,-2 0 0,8 0 0,-2 0 0,30-7 0,-32 0 0,-19-19 0,-10 16 0,46-8 0,8 18 0,-18-3 0,2-2 0,-12 1 0,-2-2 0,1-2 0,-3-2 0,17-5 0,-4 5 0,-21-1 0,10 2 0,2-5 0,-1 5 0,-2 2 0,-17 2 0,7 4 0,-14-4 0,13 5 0,-5 0 0,16 0 0,-6 0 0,15 0 0,-15 0 0,15 0 0,-6 0 0,20 0 0,-8 0 0,8 0 0,-11 0 0,-9 0 0,6 0 0,-16 0 0,7 0 0,-9 0 0,18 12 0,-20-9 0,18 15 0,-37-17 0,10 10 0,-12-9 0,0 3 0,3-5 0,-3 0 0,-2 0 0,11 0 0,-14 0 0,14 0 0,-15 0 0,11 0 0,-5 0 0,0 4 0,5-3 0,-5 9 0,6-4 0,0 0 0,0 5 0,0-10 0,0 4 0,0-5 0,0 5 0,8-4 0,-6 5 0,6-1 0,-8 1 0,0 1 0,0 3 0,0-4 0,0 6 0,-5 4 0,4-3 0,-9 9 0,8 0 0,-9 2 0,3-2 0,-9-7 0,-1 1 0,-5-1 0,0 2 0,0 1 0,0-3 0,4 0 0,4 2 0,6-12 0,4 3 0,-3-8 0,3 0 0,-3 0 0,0 0 0,2 0 0,-3 0 0</inkml:trace>
+</inkml:ink>
+</file>
+
+<file path=ppt/ink/ink5.xml><?xml version="1.0" encoding="utf-8"?>
+<inkml:ink xmlns:inkml="http://www.w3.org/2003/InkML">
+  <inkml:definitions>
+    <inkml:context xml:id="ctx0">
+      <inkml:inkSource xml:id="inkSrc0">
+        <inkml:traceFormat>
+          <inkml:channel name="X" type="integer" min="-2.14748E9" max="2.14748E9" units="cm"/>
+          <inkml:channel name="Y" type="integer" min="-2.14748E9" max="2.14748E9" units="cm"/>
+          <inkml:channel name="F" type="integer" max="32767" units="dev"/>
+        </inkml:traceFormat>
+        <inkml:channelProperties>
+          <inkml:channelProperty channel="X" name="resolution" value="1000" units="1/cm"/>
+          <inkml:channelProperty channel="Y" name="resolution" value="1000" units="1/cm"/>
+          <inkml:channelProperty channel="F" name="resolution" value="0" units="1/dev"/>
+        </inkml:channelProperties>
+      </inkml:inkSource>
+      <inkml:timestamp xml:id="ts0" timeString="2021-10-11T14:55:41.139"/>
+    </inkml:context>
+    <inkml:brush xml:id="br0">
+      <inkml:brushProperty name="width" value="0.3" units="cm"/>
+      <inkml:brushProperty name="height" value="0.6" units="cm"/>
+      <inkml:brushProperty name="color" value="#FFFC00"/>
+      <inkml:brushProperty name="tip" value="rectangle"/>
+      <inkml:brushProperty name="rasterOp" value="maskPen"/>
+    </inkml:brush>
+  </inkml:definitions>
+  <inkml:trace contextRef="#ctx0" brushRef="#br0">0 145 16383,'47'0'0,"-6"0"0,-11 0 0,11 0 0,-1 0 0,9 0 0,0 0 0,-8 0 0,17 0 0,-25 0 0,21 0 0,-20 0 0,22 0 0,-8 0 0,13 0 0,19 0 0,-24 0 0,25 0 0,-2 0 0,-20 6 0,-5-1 0,1 0 0,9 3 0,21 0 0,-13-1 0,-9-6 0,0 6 0,-3-7 0,-11 6 0,6-5 0,-13 11 0,3-5 0,-13 6 0,5 0 0,-13-2 0,14 2 0,-14-2 0,7 2 0,-8-2 0,-1 0 0,1-4 0,0 3 0,7-9 0,-6 9 0,6-8 0,0 3 0,-5 0 0,12-4 0,-5 4 0,8-5 0,0 0 0,0 0 0,-1 0 0,11 0 0,11 0 0,2 0 0,-3 0 0,-1 0 0,-16 0 0,16 0 0,-16 0 0,15 0 0,-15 0 0,16 0 0,-7 0 0,9 0 0,0 0 0,-9 0 0,6 0 0,-7 0 0,9 0 0,-1 0 0,-7 0 0,6 0 0,3 0 0,-15 0 0,9 0 0,-30 0 0,4 0 0,2 0 0,-7 0 0,6 0 0,-8 0 0,1 0 0,0 0 0,7 0 0,-6 0 0,7 0 0,-2 0 0,-4 0 0,11 0 0,-3 0 0,23 0 0,-3 0 0,6 0 0,-3 0 0,-15 0 0,15 0 0,-4 0 0,-2-5 0,8-3 0,-8-6 0,2 5 0,-4-3 0,1 11 0,-8-4 0,1-1 0,-4 5 0,-14-9 0,7 9 0,-8-4 0,0 5 0,-6 0 0,4 0 0,-4 0 0,0 0 0,15 0 0,-18 0 0,17 0 0,-14 0 0,6 0 0,0 0 0,0 0 0,8 0 0,1 0 0,8-6 0,8 4 0,3-11 0,-1 6 0,9-2 0,-7-3 0,9 3 0,0 1 0,0-6 0,0 5 0,1 1 0,-1-6 0,0 6 0,18-7 0,-13 0 0,13 1 0,-27 5 0,-2-4 0,-1 12 0,-6-11 0,6 11 0,-9-5 0,-1 6 0,1 0 0,-1 0 0,1 0 0,-7 0 0,4 0 0,-5 0 0,18 0 0,-8 0 0,-5 0 0,-14 0 0,-3 0 0,15 0 0,24 0 0,15 0 0,18 0 0,-17 0 0,-10 0 0,0 0 0,9 0 0,18 0 0,0 0 0,-13 0 0,-16 1 0,11 0 0,-7-3 0,-8-8 0,-1 1 0,31 7 0,-1-1 0,-34-6 0,-1 0 0,14 8 0,0 2 0,26-9 0,-30 7 0,1 0 0,-13-4 0,-1 1 0,5 4 0,-1 0 0,36-7 0,7 5 0,-23-6 0,8 8 0,-28 0 0,15 0 0,1 0 0,-22 0 0,17 0 0,-33 0 0,8 0 0,0 0 0,0 0 0,0 0 0,9 0 0,-6 0 0,15 0 0,-6 0 0,-1 0 0,8 0 0,-7 0 0,9 0 0,0 0 0,0 0 0,1 7 0,-11-5 0,8 4 0,-16-6 0,-1 0 0,-11 0 0,-10 0 0,-5 0 0,11 0 0,5 0 0,19 0 0,19 0 0,4 0 0,-22 0 0,0 0 0,26 0 0,2 0 0,1 0 0,4 7 0,-7-6 0,2 0 0,17 5 0,-47-5 0,1-2 0,47 1 0,-17 0 0,4 8 0,-15-6 0,2 6 0,-22-8 0,8 6 0,-17-4 0,9 11 0,-11-12 0,1 11 0,0-10 0,10 10 0,-8-10 0,7 11 0,-9-12 0,0 11 0,0-4 0,-7-1 0,5 5 0,5-5 0,-1 6 0,1-7 0,-13 0 0,0-6 0,-5 0 0,14 0 0,-15 0 0,7 0 0,0 0 0,-6 0 0,6 0 0,-1 0 0,-5 0 0,13 0 0,-5 0 0,7 0 0,0 0 0,0 0 0,10 0 0,-7 0 0,16 0 0,4 0 0,0 0 0,-8 0 0,1 0 0,14 0 0,30-7 0,-39-1 0,-9-7 0,-3 1 0,-9 7 0,1-5 0,-1 10 0,0-10 0,-7 11 0,-3-5 0,0 6 0,-6 0 0,6 0 0,-7 0 0,0 0 0,0 0 0,4 0 0,-9 0 0,2 4 0,-11 2 0,5 7 0,1-2 0,-4 3 0,-2-5 0</inkml:trace>
+</inkml:ink>
+</file>
+
+<file path=ppt/ink/ink6.xml><?xml version="1.0" encoding="utf-8"?>
+<inkml:ink xmlns:inkml="http://www.w3.org/2003/InkML">
+  <inkml:definitions>
+    <inkml:context xml:id="ctx0">
+      <inkml:inkSource xml:id="inkSrc0">
+        <inkml:traceFormat>
+          <inkml:channel name="X" type="integer" min="-2.14748E9" max="2.14748E9" units="cm"/>
+          <inkml:channel name="Y" type="integer" min="-2.14748E9" max="2.14748E9" units="cm"/>
+          <inkml:channel name="F" type="integer" max="32767" units="dev"/>
+        </inkml:traceFormat>
+        <inkml:channelProperties>
+          <inkml:channelProperty channel="X" name="resolution" value="1000" units="1/cm"/>
+          <inkml:channelProperty channel="Y" name="resolution" value="1000" units="1/cm"/>
+          <inkml:channelProperty channel="F" name="resolution" value="0" units="1/dev"/>
+        </inkml:channelProperties>
+      </inkml:inkSource>
+      <inkml:timestamp xml:id="ts0" timeString="2021-10-11T14:55:46.112"/>
+    </inkml:context>
+    <inkml:brush xml:id="br0">
+      <inkml:brushProperty name="width" value="0.3" units="cm"/>
+      <inkml:brushProperty name="height" value="0.6" units="cm"/>
+      <inkml:brushProperty name="color" value="#FFFC00"/>
+      <inkml:brushProperty name="tip" value="rectangle"/>
+      <inkml:brushProperty name="rasterOp" value="maskPen"/>
+    </inkml:brush>
+  </inkml:definitions>
+  <inkml:trace contextRef="#ctx0" brushRef="#br0">0 36 16383,'71'4'0,"-2"0"0,4-4 0,2 0 0,-24 4 0,2 0 0,5 2 0,2 0 0,9 4 0,1 0 0,4-4 0,-2-1 0,-16 0 0,-3 0 0,3-1 0,-3-1 0,30-1 0,4 6 0,-4-8 0,-20 0 0,-14 0 0,-16 0 0,-9 0 0,2 0 0,30 0 0,8 0 0,-11 0 0,3 0 0,-6 0 0,1 0 0,5 0 0,3 0 0,18 0 0,5 0 0,3 0 0,3 0 0,-16-3 0,2-2 0,-1 2 0,-3 2 0,-1 0 0,-2 0 0,13-5 0,-3 1 0,2 4 0,-2 2 0,-17-1 0,-1 0 0,7 0 0,1 0 0,-2 0 0,-1 0 0,-12 0 0,-2 0 0,37 0 0,-15 0 0,-10-7 0,-1 5 0,-9-10 0,8 5 0,-18-6 0,1 6 0,-12-4 0,-8 5 0,0-1 0,-6-2 0,-1 8 0,-2-8 0,7 8 0,36-3 0,6 4 0,29 0 0,-29 4 0,3 2 0,11 5 0,3 3 0,-14-3 0,2 1 0,-3 1 0,15 4 0,1 1 0,-2-3 0,6 2 0,-7-1 0,1 1 0,-3 0 0,17 2 0,1-1 0,-14-1 0,-7-2 0,22 2 0,-34-10 0,0-2 0,28 3 0,-12-8 0,-25 0 0,-10 0 0,-18 0 0,38 0 0,20 0 0,-25 0 0,4 0 0,4 0 0,-1 0 0,-6 0 0,-2 0 0,-5 0 0,0 0 0,4 0 0,2 0 0,8 1 0,2-2 0,1-3 0,1-1 0,-2 4 0,1 0 0,3-4 0,-1 0 0,-10 5 0,-1 0 0,8-3 0,-1-2 0,-9 1 0,-1-1 0,1-4 0,-3-1 0,21-6 0,10-8 0,-41 4 0,-9-7 0,-18-3 0,8 15 0,24-3 0,5 18 0,29 0 0,-10 0 0,1 0 0,-21 0 0,2 0 0,-1 5 0,1-1 0,4-2 0,2-1 0,8 3 0,-2 1 0,-14 0 0,-1-1 0,11-3 0,-1 0 0,-10 3 0,-2 0 0,49-4 0,-26 0 0,-10 0 0,-22 0 0,-11 0 0,-17-4 0,1 3 0,14-3 0,0 4 0,22 0 0,-10 0 0,1 0 0,-9-5 0,6-2 0,-6 0 0,8-5 0,-13 6 0,-4-1 0,-13-1 0,4 7 0,-4-15 0,4 2 0</inkml:trace>
+</inkml:ink>
+</file>
+
+<file path=ppt/ink/ink7.xml><?xml version="1.0" encoding="utf-8"?>
+<inkml:ink xmlns:inkml="http://www.w3.org/2003/InkML">
+  <inkml:definitions>
+    <inkml:context xml:id="ctx0">
+      <inkml:inkSource xml:id="inkSrc0">
+        <inkml:traceFormat>
+          <inkml:channel name="X" type="integer" min="-2.14748E9" max="2.14748E9" units="cm"/>
+          <inkml:channel name="Y" type="integer" min="-2.14748E9" max="2.14748E9" units="cm"/>
+          <inkml:channel name="F" type="integer" max="32767" units="dev"/>
+        </inkml:traceFormat>
+        <inkml:channelProperties>
+          <inkml:channelProperty channel="X" name="resolution" value="1000" units="1/cm"/>
+          <inkml:channelProperty channel="Y" name="resolution" value="1000" units="1/cm"/>
+          <inkml:channelProperty channel="F" name="resolution" value="0" units="1/dev"/>
+        </inkml:channelProperties>
+      </inkml:inkSource>
+      <inkml:timestamp xml:id="ts0" timeString="2021-10-11T14:55:50.203"/>
+    </inkml:context>
+    <inkml:brush xml:id="br0">
+      <inkml:brushProperty name="width" value="0.3" units="cm"/>
+      <inkml:brushProperty name="height" value="0.6" units="cm"/>
+      <inkml:brushProperty name="color" value="#FFFC00"/>
+      <inkml:brushProperty name="tip" value="rectangle"/>
+      <inkml:brushProperty name="rasterOp" value="maskPen"/>
+    </inkml:brush>
+  </inkml:definitions>
+  <inkml:trace contextRef="#ctx0" brushRef="#br0">1 77 16383,'54'0'0,"0"0"0,-2 0 0,-1 0 0,47 0 0,-41 0 0,2 0 0,6 0 0,2 0 0,22 0 0,3 0 0,-7 0 0,2 0 0,-16 0 0,3 0 0,-1 0 0,-4 0 0,-1 0 0,0 0 0,2 0 0,-1 0 0,-2 0 0,13 0 0,-3 0 0,3 0 0,-3 0 0,-24 0 0,-1 0 0,13 0 0,-1 0 0,27 0 0,-16 0 0,-33 0 0,-18 0 0,15 0 0,21 0 0,-10 0 0,5 0 0,10 0 0,2 0 0,-2 0 0,3 0 0,18 0 0,5 0 0,5-1 0,3 2 0,-25 1 0,2 2 0,2 1 0,9 2 0,2 2 0,-3 2 0,-8 0 0,-2 3 0,-2 0 0,25 4 0,-4 1 0,-4 0 0,-5-4 0,-18-9 0,-3-1 0,-3 0 0,-4-1 0,20-4 0,-1 0 0,2 0 0,-22 0 0,6 0 0,8 0 0,4 0 0,6 0 0,1 0 0,-1-5 0,4 0 0,-8 4 0,5 2 0,1-4 0,1-7 0,1-4 0,2 3 0,5 4 0,3 3 0,-1-2 0,3-7 0,1-1 0,-8 1 0,-1 1 0,-4 2 0,-14 3 0,1-1 0,-5-1 0,-4 0 0,-2-1 0,14-1 0,-2 1 0,-18 5 0,-5-2 0,18-11 0,-34 11 0,-1-4 0,42 6 0,-23 5 0,4 0 0,16 0 0,4 0 0,-1 0 0,0 0 0,-1 0 0,-1 0 0,0 0 0,1 0 0,17 0 0,-1 0 0,-20 0 0,1 0 0,24 0 0,1 0 0,-19 0 0,-2 0 0,0 0 0,0 0 0,-1 0 0,-3 0 0,-18 0 0,-4 0 0,37 0 0,-23 0 0,-28 0 0,-12 0 0,-14 0 0,47 0 0,25 0 0,-10 0 0,6 0 0,5 0 0,3 0 0,6 0 0,1 0 0,-8 0 0,-1 0 0,-3 4 0,3 2 0,-17-2 0,2 1 0,2-1 0,1 0 0,1 0 0,-1 0 0,24 6 0,0-1 0,-18-8 0,2-2 0,-8 3 0,-5 6 0,-4 1 0,17-8 0,-4 0 0,18 8 0,-36-9 0,-1 0 0,5 0 0,10 0 0,1 0 0,-11 0 0,-9 0 0,-11 0 0,7 0 0,-14 0 0,7-5 0,-11-1 0,-7-5 0,-6 5 0,-2 1 0,-5 5 0</inkml:trace>
+</inkml:ink>
+</file>
+
+<file path=ppt/ink/ink8.xml><?xml version="1.0" encoding="utf-8"?>
+<inkml:ink xmlns:inkml="http://www.w3.org/2003/InkML">
+  <inkml:definitions>
+    <inkml:context xml:id="ctx0">
+      <inkml:inkSource xml:id="inkSrc0">
+        <inkml:traceFormat>
+          <inkml:channel name="X" type="integer" min="-2.14748E9" max="2.14748E9" units="cm"/>
+          <inkml:channel name="Y" type="integer" min="-2.14748E9" max="2.14748E9" units="cm"/>
+          <inkml:channel name="F" type="integer" max="32767" units="dev"/>
+        </inkml:traceFormat>
+        <inkml:channelProperties>
+          <inkml:channelProperty channel="X" name="resolution" value="1000" units="1/cm"/>
+          <inkml:channelProperty channel="Y" name="resolution" value="1000" units="1/cm"/>
+          <inkml:channelProperty channel="F" name="resolution" value="0" units="1/dev"/>
+        </inkml:channelProperties>
+      </inkml:inkSource>
+      <inkml:timestamp xml:id="ts0" timeString="2021-10-11T14:55:53.424"/>
+    </inkml:context>
+    <inkml:brush xml:id="br0">
+      <inkml:brushProperty name="width" value="0.3" units="cm"/>
+      <inkml:brushProperty name="height" value="0.6" units="cm"/>
+      <inkml:brushProperty name="color" value="#FFFC00"/>
+      <inkml:brushProperty name="tip" value="rectangle"/>
+      <inkml:brushProperty name="rasterOp" value="maskPen"/>
+    </inkml:brush>
+  </inkml:definitions>
+  <inkml:trace contextRef="#ctx0" brushRef="#br0">1 141 16383,'79'0'0,"14"0"0,-43 0 0,1 0 0,10 0 0,2 0 0,9 0 0,3 0 0,5 0 0,1 0 0,10 0 0,2 0 0,-2 0 0,1 0 0,-26 0 0,1 0 0,0 0 0,1 0 0,0 0 0,2 0 0,11 0 0,2 0 0,-5 0 0,7 0 0,-3 0 0,17 0 0,-4 0 0,-34 0 0,-3 0 0,9 0 0,-2 0 0,-12 0 0,-1 0 0,44 0 0,-49 0 0,-2 0 0,-8 0 0,55 0 0,-23 1 0,7-2 0,21-4 0,4 0 0,-33 4 0,0 0 0,-1 0 0,31-4 0,-2 0 0,-6 4 0,3 2 0,-8-1 0,5 0 0,-1 0 0,-2 0 0,0 0 0,0 0 0,-4 0 0,-1 0 0,0 0 0,-1 1 0,-1-1 0,-9-1 0,-8-3 0,-4 0 0,8 0 0,-2-2 0,-12-6 0,-7-2 0,7-8 0,-10 5 0,-11 6 0,16 11 0,26 0 0,12 0 0,-23-5 0,3 0 0,-5 4 0,2 0 0,25-5 0,3 1 0,-7 5 0,-1 0 0,6 0 0,-3 0 0,-17 0 0,0 0 0,15 0 0,-3 0 0,-26 0 0,-1 0 0,13 0 0,-2 0 0,23 0 0,-25 0 0,-21 0 0,-22 0 0,-10 0 0</inkml:trace>
+</inkml:ink>
+</file>
+
+<file path=ppt/ink/ink9.xml><?xml version="1.0" encoding="utf-8"?>
+<inkml:ink xmlns:inkml="http://www.w3.org/2003/InkML">
+  <inkml:definitions>
+    <inkml:context xml:id="ctx0">
+      <inkml:inkSource xml:id="inkSrc0">
+        <inkml:traceFormat>
+          <inkml:channel name="X" type="integer" min="-2.14748E9" max="2.14748E9" units="cm"/>
+          <inkml:channel name="Y" type="integer" min="-2.14748E9" max="2.14748E9" units="cm"/>
+          <inkml:channel name="F" type="integer" max="32767" units="dev"/>
+        </inkml:traceFormat>
+        <inkml:channelProperties>
+          <inkml:channelProperty channel="X" name="resolution" value="1000" units="1/cm"/>
+          <inkml:channelProperty channel="Y" name="resolution" value="1000" units="1/cm"/>
+          <inkml:channelProperty channel="F" name="resolution" value="0" units="1/dev"/>
+        </inkml:channelProperties>
+      </inkml:inkSource>
+      <inkml:timestamp xml:id="ts0" timeString="2021-10-11T14:56:04.461"/>
+    </inkml:context>
+    <inkml:brush xml:id="br0">
+      <inkml:brushProperty name="width" value="0.3" units="cm"/>
+      <inkml:brushProperty name="height" value="0.6" units="cm"/>
+      <inkml:brushProperty name="color" value="#FFFC00"/>
+      <inkml:brushProperty name="tip" value="rectangle"/>
+      <inkml:brushProperty name="rasterOp" value="maskPen"/>
+    </inkml:brush>
+  </inkml:definitions>
+  <inkml:trace contextRef="#ctx0" brushRef="#br0">0 71 16383,'50'0'0,"22"0"0,-26 0 0,37 0 0,-9 0 0,-11 0 0,3 0 0,-5 0 0,2 0 0,23 0 0,3 0 0,-6-5 0,0-1 0,8 5 0,-2 0 0,-24-4 0,-1 0 0,22 3 0,-3 4 0,16 6 0,-33-7 0,0 0 0,22 8 0,-16-9 0,-28 0 0,-11 0 0,-17 0 0,-7 0 0,35 0 0,20 0 0,-15-1 0,4 2 0,3 2 0,2 2 0,1 0 0,4 1 0,26 4 0,6 2 0,-28-5 0,2 1 0,2 0 0,10 4 0,2 0 0,1 1 0,3 0 0,1 0 0,-2 2 0,-8 1 0,-2 2 0,-3-2 0,19 3 0,-3-1 0,7 0 0,-2-2 0,-24-6 0,-1 0 0,11 1 0,0-1 0,-5 0 0,-3 1 0,-16-2 0,-3 0 0,46 1 0,-24-2 0,-13-8 0,-20 0 0,-13-4 0,-16-2 0,-1 1 0,15 1 0,1 4 0,30 0 0,18 0 0,-9 0 0,-14 0 0,3 0 0,33 0 0,-39 3 0,1 1 0,4-3 0,-1 0 0,35 14 0,-33-13 0,0-2 0,33 8 0,-34-7 0,1-2 0,33 1 0,9 0 0,-12 0 0,0 0 0,0 0 0,-11 0 0,-12-6 0,-4 5 0,-16-11 0,6 10 0,-16-4 0,5 6 0,-19 0 0,9 0 0,-18 0 0,14 0 0,22 0 0,5 0 0,42 0 0,-42 0 0,3 0 0,16 0 0,5 0 0,16 0 0,3 0 0,1 0 0,-3 0 0,-12 0 0,-2 0 0,1 0 0,-4 0 0,-22 0 0,-1 0 0,18 0 0,1 0 0,-18 0 0,-1 0 0,12 0 0,-2 0 0,16 0 0,17 0 0,-32 0 0,-1 0 0,-13 0 0,-9 0 0,1 0 0,-9 0 0,-1 0 0,-14-4 0,-1-1 0,-7-15 0,0 12 0,24-7 0,4 15 0,35-7 0,23-4 0,-30 7 0,4-1 0,9-5 0,4 1 0,8 7 0,2 2 0,1-6 0,-3 2 0,-20 3 0,0 2 0,17-1 0,-2 0 0,-27 0 0,-1 0 0,23 0 0,1 0 0,-19 0 0,-1 0 0,11 0 0,-1 0 0,-12 0 0,-1 0 0,2 0 0,-3 0 0,27-6 0,-12-3 0,-23-5 0,0 0 0,-22 2 0,2 0 0,-18-2 0,4 7 0,27-1 0,10 8 0,0 0 0,8 0 0,6 0 0,4 0 0,11 0 0,5 0 0,12 0 0,2 0 0,-32-1 0,0 1 0,1 1 0,3 1 0,2 2 0,0 1 0,6-1 0,2 0 0,-1 2 0,-5 2 0,0 1 0,0-1 0,0-2 0,0-2 0,-4 1 0,8 1 0,-2-1 0,10-4 0,-4-2 0,-28 1 0,-2 0 0,19 0 0,-1 0 0,-19 0 0,-4 0 0,29 0 0,-17-6 0,-29-6 0,-6-7 0,3 7 0,19 1 0,45 11 0,-20-4 0,7-3 0,5 2 0,5-2 0,-12 0 0,3-1 0,-1-2 0,-9-1 0,-1-1 0,3 0 0,12 2 0,3 0 0,-1 1 0,-4 1 0,-1-1 0,0 1 0,0 0 0,-1 1 0,-3 0 0,14 2 0,-4 0 0,8 0 0,-6-2 0,-35-2 0,-1 1 0,20 7 0,-3 0 0,20-7 0,-23 8 0,-28 0 0,-23 0 0,-3 0 0,19 0 0,4 0 0,36-8 0,-11 6 0,9-5 0,-21 7 0,-1 0 0,-8 0 0,-9 0 0,-1 0 0,-9 0 0,1 0 0,-6 0 0,-1 0 0,4 0 0,-8 0 0,13 4 0,-8 3 0,5 4 0,2 1 0,-1 4 0,7-2 0,3 10 0,-1-11 0,-1 6 0,-1-7 0,-5-1 0,5 2 0,-7-2 0,0-5 0,-1 4 0,1-9 0,-6 5 0,5-6 0,-11 0 0,9 0 0,-6 0 0,1 0 0,2 0 0,-4 0 0,5 0 0</inkml:trace>
+</inkml:ink>
+</file>
+
 <file path=ppt/notesMasters/notesMaster1.xml><?xml version="1.0" encoding="utf-8"?>
 <p:notesMaster xmlns:a="http://schemas.openxmlformats.org/drawingml/2006/main" xmlns:r="http://schemas.openxmlformats.org/officeDocument/2006/relationships" xmlns:p="http://schemas.openxmlformats.org/presentationml/2006/main">
   <p:cSld>
@@ -469,7 +651,7 @@
           <a:p>
             <a:fld id="{D0ED587F-861E-6740-9643-E3DDAE89B8D6}" type="datetimeFigureOut">
               <a:rPr lang="en-US" smtClean="0"/>
-              <a:t>10/10/2021</a:t>
+              <a:t>10/11/21</a:t>
             </a:fld>
             <a:endParaRPr lang="en-US"/>
           </a:p>
@@ -8152,6 +8334,2518 @@
     <p:extLst>
       <p:ext uri="{BB962C8B-B14F-4D97-AF65-F5344CB8AC3E}">
         <p14:creationId xmlns:p14="http://schemas.microsoft.com/office/powerpoint/2010/main" val="3476578939"/>
+      </p:ext>
+    </p:extLst>
+  </p:cSld>
+  <p:clrMapOvr>
+    <a:masterClrMapping/>
+  </p:clrMapOvr>
+  <mc:AlternateContent xmlns:mc="http://schemas.openxmlformats.org/markup-compatibility/2006" xmlns:p14="http://schemas.microsoft.com/office/powerpoint/2010/main">
+    <mc:Choice Requires="p14">
+      <p:transition p14:dur="300">
+        <p:fade/>
+      </p:transition>
+    </mc:Choice>
+    <mc:Fallback xmlns="">
+      <p:transition>
+        <p:fade/>
+      </p:transition>
+    </mc:Fallback>
+  </mc:AlternateContent>
+</p:sld>
+</file>
+
+<file path=ppt/slides/slide11.xml><?xml version="1.0" encoding="utf-8"?>
+<p:sld xmlns:a="http://schemas.openxmlformats.org/drawingml/2006/main" xmlns:r="http://schemas.openxmlformats.org/officeDocument/2006/relationships" xmlns:p="http://schemas.openxmlformats.org/presentationml/2006/main">
+  <p:cSld>
+    <p:spTree>
+      <p:nvGrpSpPr>
+        <p:cNvPr id="1" name=""/>
+        <p:cNvGrpSpPr/>
+        <p:nvPr/>
+      </p:nvGrpSpPr>
+      <p:grpSpPr>
+        <a:xfrm>
+          <a:off x="0" y="0"/>
+          <a:ext cx="0" cy="0"/>
+          <a:chOff x="0" y="0"/>
+          <a:chExt cx="0" cy="0"/>
+        </a:xfrm>
+      </p:grpSpPr>
+      <p:sp>
+        <p:nvSpPr>
+          <p:cNvPr id="2" name="Title 1">
+            <a:extLst>
+              <a:ext uri="{FF2B5EF4-FFF2-40B4-BE49-F238E27FC236}">
+                <a16:creationId xmlns:a16="http://schemas.microsoft.com/office/drawing/2014/main" id="{5CF1D48A-273E-F447-8E6E-AC0679D9AF5D}"/>
+              </a:ext>
+            </a:extLst>
+          </p:cNvPr>
+          <p:cNvSpPr>
+            <a:spLocks noGrp="1"/>
+          </p:cNvSpPr>
+          <p:nvPr>
+            <p:ph type="title"/>
+          </p:nvPr>
+        </p:nvSpPr>
+        <p:spPr/>
+        <p:txBody>
+          <a:bodyPr/>
+          <a:lstStyle/>
+          <a:p>
+            <a:r>
+              <a:rPr lang="en-US" dirty="0"/>
+              <a:t>Let’s work through  it</a:t>
+            </a:r>
+          </a:p>
+        </p:txBody>
+      </p:sp>
+      <p:sp>
+        <p:nvSpPr>
+          <p:cNvPr id="3" name="Text Placeholder 2">
+            <a:extLst>
+              <a:ext uri="{FF2B5EF4-FFF2-40B4-BE49-F238E27FC236}">
+                <a16:creationId xmlns:a16="http://schemas.microsoft.com/office/drawing/2014/main" id="{AE0194FE-B111-B542-B2AD-67C09C835CD2}"/>
+              </a:ext>
+            </a:extLst>
+          </p:cNvPr>
+          <p:cNvSpPr>
+            <a:spLocks noGrp="1"/>
+          </p:cNvSpPr>
+          <p:nvPr>
+            <p:ph type="body" sz="quarter" idx="10"/>
+          </p:nvPr>
+        </p:nvSpPr>
+        <p:spPr>
+          <a:xfrm>
+            <a:off x="466537" y="1739706"/>
+            <a:ext cx="5628851" cy="4888774"/>
+          </a:xfrm>
+        </p:spPr>
+        <p:txBody>
+          <a:bodyPr/>
+          <a:lstStyle/>
+          <a:p>
+            <a:r>
+              <a:rPr lang="en-US" dirty="0"/>
+              <a:t>Load the file</a:t>
+            </a:r>
+          </a:p>
+          <a:p>
+            <a:r>
+              <a:rPr lang="en-US" dirty="0"/>
+              <a:t>Reads characters until \n, removes \n</a:t>
+            </a:r>
+          </a:p>
+          <a:p>
+            <a:pPr lvl="1"/>
+            <a:r>
+              <a:rPr lang="en-US" dirty="0"/>
+              <a:t>Splits into an array by “,” (like </a:t>
+            </a:r>
+            <a:r>
+              <a:rPr lang="en-US" dirty="0" err="1"/>
+              <a:t>CSVReader</a:t>
+            </a:r>
+            <a:r>
+              <a:rPr lang="en-US" dirty="0"/>
+              <a:t>)</a:t>
+            </a:r>
+          </a:p>
+          <a:p>
+            <a:r>
+              <a:rPr lang="en-US" dirty="0"/>
+              <a:t>Prints second element (1 index) of the array.</a:t>
+            </a:r>
+          </a:p>
+          <a:p>
+            <a:r>
+              <a:rPr lang="en-US" dirty="0"/>
+              <a:t>Grabs next element </a:t>
+            </a:r>
+            <a:r>
+              <a:rPr lang="en-US" b="1" dirty="0"/>
+              <a:t>up to </a:t>
+            </a:r>
+            <a:r>
+              <a:rPr lang="en-US" dirty="0"/>
+              <a:t>the whitespace(\n!)</a:t>
+            </a:r>
+          </a:p>
+          <a:p>
+            <a:r>
+              <a:rPr lang="en-US" dirty="0"/>
+              <a:t>Grabs everything to the \n, removes \n</a:t>
+            </a:r>
+          </a:p>
+          <a:p>
+            <a:pPr lvl="1"/>
+            <a:r>
+              <a:rPr lang="en-US" dirty="0"/>
+              <a:t>yes, this is nothing!</a:t>
+            </a:r>
+          </a:p>
+          <a:p>
+            <a:r>
+              <a:rPr lang="en-US" dirty="0"/>
+              <a:t>Grabs the set of characters until \n, removes \n</a:t>
+            </a:r>
+          </a:p>
+          <a:p>
+            <a:pPr lvl="1"/>
+            <a:r>
+              <a:rPr lang="en-US" dirty="0"/>
+              <a:t>splits into array</a:t>
+            </a:r>
+          </a:p>
+          <a:p>
+            <a:pPr lvl="1"/>
+            <a:r>
+              <a:rPr lang="en-US" dirty="0"/>
+              <a:t>grabs the first item (index 0)</a:t>
+            </a:r>
+          </a:p>
+          <a:p>
+            <a:endParaRPr lang="en-US" dirty="0"/>
+          </a:p>
+        </p:txBody>
+      </p:sp>
+      <p:sp>
+        <p:nvSpPr>
+          <p:cNvPr id="6" name="Rectangle 1">
+            <a:extLst>
+              <a:ext uri="{FF2B5EF4-FFF2-40B4-BE49-F238E27FC236}">
+                <a16:creationId xmlns:a16="http://schemas.microsoft.com/office/drawing/2014/main" id="{B9D90765-D36F-354F-BA4F-4887599F0A0A}"/>
+              </a:ext>
+            </a:extLst>
+          </p:cNvPr>
+          <p:cNvSpPr txBox="1">
+            <a:spLocks noChangeArrowheads="1"/>
+          </p:cNvSpPr>
+          <p:nvPr/>
+        </p:nvSpPr>
+        <p:spPr bwMode="auto">
+          <a:xfrm>
+            <a:off x="5933849" y="1305678"/>
+            <a:ext cx="7659586" cy="4524315"/>
+          </a:xfrm>
+          <a:prstGeom prst="rect">
+            <a:avLst/>
+          </a:prstGeom>
+          <a:solidFill>
+            <a:srgbClr val="FFFFFF"/>
+          </a:solidFill>
+          <a:ln>
+            <a:noFill/>
+          </a:ln>
+          <a:effectLst/>
+          <a:extLst>
+            <a:ext uri="{91240B29-F687-4F45-9708-019B960494DF}">
+              <a14:hiddenLine xmlns:a14="http://schemas.microsoft.com/office/drawing/2010/main" w="9525">
+                <a:solidFill>
+                  <a:schemeClr val="tx1"/>
+                </a:solidFill>
+                <a:miter lim="800000"/>
+                <a:headEnd/>
+                <a:tailEnd/>
+              </a14:hiddenLine>
+            </a:ext>
+            <a:ext uri="{AF507438-7753-43E0-B8FC-AC1667EBCBE1}">
+              <a14:hiddenEffects xmlns:a14="http://schemas.microsoft.com/office/drawing/2010/main">
+                <a:effectLst>
+                  <a:outerShdw dist="35921" dir="2700000" algn="ctr" rotWithShape="0">
+                    <a:schemeClr val="bg2"/>
+                  </a:outerShdw>
+                </a:effectLst>
+              </a14:hiddenEffects>
+            </a:ext>
+          </a:extLst>
+        </p:spPr>
+        <p:txBody>
+          <a:bodyPr vert="horz" wrap="square" lIns="91440" tIns="45720" rIns="91440" bIns="45720" numCol="1" rtlCol="0" anchor="ctr" anchorCtr="0" compatLnSpc="1">
+            <a:prstTxWarp prst="textNoShape">
+              <a:avLst/>
+            </a:prstTxWarp>
+            <a:spAutoFit/>
+          </a:bodyPr>
+          <a:lstStyle>
+            <a:lvl1pPr marL="524712" indent="-524712" algn="l" defTabSz="699614" rtl="0" eaLnBrk="1" latinLnBrk="0" hangingPunct="1">
+              <a:lnSpc>
+                <a:spcPct val="120000"/>
+              </a:lnSpc>
+              <a:spcBef>
+                <a:spcPts val="600"/>
+              </a:spcBef>
+              <a:spcAft>
+                <a:spcPts val="600"/>
+              </a:spcAft>
+              <a:buFont typeface="Arial"/>
+              <a:buChar char="•"/>
+              <a:defRPr sz="1800" b="0" i="0" kern="1200">
+                <a:solidFill>
+                  <a:srgbClr val="092529"/>
+                </a:solidFill>
+                <a:latin typeface="Proxima Nova" charset="0"/>
+                <a:ea typeface="Proxima Nova" charset="0"/>
+                <a:cs typeface="Proxima Nova" charset="0"/>
+              </a:defRPr>
+            </a:lvl1pPr>
+            <a:lvl2pPr marL="1136875" indent="-437261" algn="l" defTabSz="699614" rtl="0" eaLnBrk="1" latinLnBrk="0" hangingPunct="1">
+              <a:lnSpc>
+                <a:spcPct val="120000"/>
+              </a:lnSpc>
+              <a:spcBef>
+                <a:spcPts val="0"/>
+              </a:spcBef>
+              <a:spcAft>
+                <a:spcPts val="600"/>
+              </a:spcAft>
+              <a:buFont typeface="Arial"/>
+              <a:buChar char="–"/>
+              <a:defRPr sz="1600" b="0" i="0" kern="1200">
+                <a:solidFill>
+                  <a:srgbClr val="092529"/>
+                </a:solidFill>
+                <a:latin typeface="Proxima Nova" charset="0"/>
+                <a:ea typeface="Proxima Nova" charset="0"/>
+                <a:cs typeface="Proxima Nova" charset="0"/>
+              </a:defRPr>
+            </a:lvl2pPr>
+            <a:lvl3pPr marL="1749040" indent="-349807" algn="l" defTabSz="699614" rtl="0" eaLnBrk="1" latinLnBrk="0" hangingPunct="1">
+              <a:lnSpc>
+                <a:spcPct val="120000"/>
+              </a:lnSpc>
+              <a:spcBef>
+                <a:spcPts val="0"/>
+              </a:spcBef>
+              <a:spcAft>
+                <a:spcPts val="600"/>
+              </a:spcAft>
+              <a:buFont typeface="Arial"/>
+              <a:buChar char="•"/>
+              <a:defRPr sz="1600" b="0" i="0" kern="1200">
+                <a:solidFill>
+                  <a:srgbClr val="092529"/>
+                </a:solidFill>
+                <a:latin typeface="Proxima Nova" charset="0"/>
+                <a:ea typeface="Proxima Nova" charset="0"/>
+                <a:cs typeface="Proxima Nova" charset="0"/>
+              </a:defRPr>
+            </a:lvl3pPr>
+            <a:lvl4pPr marL="2448655" indent="-349807" algn="l" defTabSz="699614" rtl="0" eaLnBrk="1" latinLnBrk="0" hangingPunct="1">
+              <a:lnSpc>
+                <a:spcPct val="120000"/>
+              </a:lnSpc>
+              <a:spcBef>
+                <a:spcPts val="0"/>
+              </a:spcBef>
+              <a:spcAft>
+                <a:spcPts val="600"/>
+              </a:spcAft>
+              <a:buFont typeface="Arial"/>
+              <a:buChar char="–"/>
+              <a:defRPr sz="1600" b="0" i="0" kern="1200">
+                <a:solidFill>
+                  <a:srgbClr val="092529"/>
+                </a:solidFill>
+                <a:latin typeface="Proxima Nova" charset="0"/>
+                <a:ea typeface="Proxima Nova" charset="0"/>
+                <a:cs typeface="Proxima Nova" charset="0"/>
+              </a:defRPr>
+            </a:lvl4pPr>
+            <a:lvl5pPr marL="3148272" indent="-349807" algn="l" defTabSz="699614" rtl="0" eaLnBrk="1" latinLnBrk="0" hangingPunct="1">
+              <a:spcBef>
+                <a:spcPct val="20000"/>
+              </a:spcBef>
+              <a:buFont typeface="Arial"/>
+              <a:buChar char="»"/>
+              <a:defRPr sz="1648" b="0" kern="1200">
+                <a:solidFill>
+                  <a:srgbClr val="092529"/>
+                </a:solidFill>
+                <a:latin typeface="Franklin Gothic Book" charset="0"/>
+                <a:ea typeface="Franklin Gothic Book" charset="0"/>
+                <a:cs typeface="Franklin Gothic Book" charset="0"/>
+              </a:defRPr>
+            </a:lvl5pPr>
+            <a:lvl6pPr marL="3847888" indent="-349807" algn="l" defTabSz="699614" rtl="0" eaLnBrk="1" latinLnBrk="0" hangingPunct="1">
+              <a:spcBef>
+                <a:spcPct val="20000"/>
+              </a:spcBef>
+              <a:buFont typeface="Arial"/>
+              <a:buChar char="•"/>
+              <a:defRPr sz="3022" kern="1200">
+                <a:solidFill>
+                  <a:schemeClr val="tx1"/>
+                </a:solidFill>
+                <a:latin typeface="+mn-lt"/>
+                <a:ea typeface="+mn-ea"/>
+                <a:cs typeface="+mn-cs"/>
+              </a:defRPr>
+            </a:lvl6pPr>
+            <a:lvl7pPr marL="4547505" indent="-349807" algn="l" defTabSz="699614" rtl="0" eaLnBrk="1" latinLnBrk="0" hangingPunct="1">
+              <a:spcBef>
+                <a:spcPct val="20000"/>
+              </a:spcBef>
+              <a:buFont typeface="Arial"/>
+              <a:buChar char="•"/>
+              <a:defRPr sz="3022" kern="1200">
+                <a:solidFill>
+                  <a:schemeClr val="tx1"/>
+                </a:solidFill>
+                <a:latin typeface="+mn-lt"/>
+                <a:ea typeface="+mn-ea"/>
+                <a:cs typeface="+mn-cs"/>
+              </a:defRPr>
+            </a:lvl7pPr>
+            <a:lvl8pPr marL="5247119" indent="-349807" algn="l" defTabSz="699614" rtl="0" eaLnBrk="1" latinLnBrk="0" hangingPunct="1">
+              <a:spcBef>
+                <a:spcPct val="20000"/>
+              </a:spcBef>
+              <a:buFont typeface="Arial"/>
+              <a:buChar char="•"/>
+              <a:defRPr sz="3022" kern="1200">
+                <a:solidFill>
+                  <a:schemeClr val="tx1"/>
+                </a:solidFill>
+                <a:latin typeface="+mn-lt"/>
+                <a:ea typeface="+mn-ea"/>
+                <a:cs typeface="+mn-cs"/>
+              </a:defRPr>
+            </a:lvl8pPr>
+            <a:lvl9pPr marL="5946736" indent="-349807" algn="l" defTabSz="699614" rtl="0" eaLnBrk="1" latinLnBrk="0" hangingPunct="1">
+              <a:spcBef>
+                <a:spcPct val="20000"/>
+              </a:spcBef>
+              <a:buFont typeface="Arial"/>
+              <a:buChar char="•"/>
+              <a:defRPr sz="3022" kern="1200">
+                <a:solidFill>
+                  <a:schemeClr val="tx1"/>
+                </a:solidFill>
+                <a:latin typeface="+mn-lt"/>
+                <a:ea typeface="+mn-ea"/>
+                <a:cs typeface="+mn-cs"/>
+              </a:defRPr>
+            </a:lvl9pPr>
+          </a:lstStyle>
+          <a:p>
+            <a:pPr marL="0" indent="0" defTabSz="914400" eaLnBrk="0" fontAlgn="base" hangingPunct="0">
+              <a:lnSpc>
+                <a:spcPct val="100000"/>
+              </a:lnSpc>
+              <a:spcBef>
+                <a:spcPct val="0"/>
+              </a:spcBef>
+              <a:spcAft>
+                <a:spcPct val="0"/>
+              </a:spcAft>
+              <a:buFontTx/>
+              <a:buNone/>
+            </a:pPr>
+            <a:r>
+              <a:rPr lang="en-US" altLang="en-US" sz="2400" b="1" dirty="0">
+                <a:solidFill>
+                  <a:srgbClr val="000080"/>
+                </a:solidFill>
+                <a:latin typeface="JetBrains Mono"/>
+              </a:rPr>
+              <a:t>public static void </a:t>
+            </a:r>
+            <a:r>
+              <a:rPr lang="en-US" altLang="en-US" sz="2400" dirty="0" err="1">
+                <a:solidFill>
+                  <a:srgbClr val="000000"/>
+                </a:solidFill>
+                <a:latin typeface="JetBrains Mono"/>
+              </a:rPr>
+              <a:t>scannerTest</a:t>
+            </a:r>
+            <a:r>
+              <a:rPr lang="en-US" altLang="en-US" sz="2400" dirty="0">
+                <a:solidFill>
+                  <a:srgbClr val="000000"/>
+                </a:solidFill>
+                <a:latin typeface="JetBrains Mono"/>
+              </a:rPr>
+              <a:t>()  {</a:t>
+            </a:r>
+            <a:br>
+              <a:rPr lang="en-US" altLang="en-US" sz="2400" dirty="0">
+                <a:solidFill>
+                  <a:srgbClr val="000000"/>
+                </a:solidFill>
+                <a:latin typeface="JetBrains Mono"/>
+              </a:rPr>
+            </a:br>
+            <a:r>
+              <a:rPr lang="en-US" altLang="en-US" sz="2400" dirty="0">
+                <a:solidFill>
+                  <a:srgbClr val="000000"/>
+                </a:solidFill>
+                <a:latin typeface="JetBrains Mono"/>
+              </a:rPr>
+              <a:t>    </a:t>
+            </a:r>
+            <a:r>
+              <a:rPr lang="en-US" altLang="en-US" sz="2400" b="1" dirty="0">
+                <a:solidFill>
+                  <a:srgbClr val="000080"/>
+                </a:solidFill>
+                <a:latin typeface="JetBrains Mono"/>
+              </a:rPr>
+              <a:t>try </a:t>
+            </a:r>
+            <a:r>
+              <a:rPr lang="en-US" altLang="en-US" sz="2400" dirty="0">
+                <a:solidFill>
+                  <a:srgbClr val="000000"/>
+                </a:solidFill>
+                <a:latin typeface="JetBrains Mono"/>
+              </a:rPr>
+              <a:t>{</a:t>
+            </a:r>
+            <a:br>
+              <a:rPr lang="en-US" altLang="en-US" sz="2400" dirty="0">
+                <a:solidFill>
+                  <a:srgbClr val="000000"/>
+                </a:solidFill>
+                <a:latin typeface="JetBrains Mono"/>
+              </a:rPr>
+            </a:br>
+            <a:r>
+              <a:rPr lang="en-US" altLang="en-US" sz="2400" dirty="0">
+                <a:solidFill>
+                  <a:srgbClr val="000000"/>
+                </a:solidFill>
+                <a:latin typeface="JetBrains Mono"/>
+              </a:rPr>
+              <a:t>        Scanner scanner = </a:t>
+            </a:r>
+            <a:r>
+              <a:rPr lang="en-US" altLang="en-US" sz="2400" b="1" dirty="0">
+                <a:solidFill>
+                  <a:srgbClr val="000080"/>
+                </a:solidFill>
+                <a:latin typeface="JetBrains Mono"/>
+              </a:rPr>
+              <a:t>new </a:t>
+            </a:r>
+            <a:r>
+              <a:rPr lang="en-US" altLang="en-US" sz="2400" dirty="0">
+                <a:solidFill>
+                  <a:srgbClr val="000000"/>
+                </a:solidFill>
+                <a:latin typeface="JetBrains Mono"/>
+              </a:rPr>
+              <a:t>Scanner(</a:t>
+            </a:r>
+            <a:r>
+              <a:rPr lang="en-US" altLang="en-US" sz="2400" b="1" dirty="0">
+                <a:solidFill>
+                  <a:srgbClr val="000080"/>
+                </a:solidFill>
+                <a:latin typeface="JetBrains Mono"/>
+              </a:rPr>
+              <a:t>new </a:t>
+            </a:r>
+            <a:r>
+              <a:rPr lang="en-US" altLang="en-US" sz="2400" dirty="0">
+                <a:solidFill>
+                  <a:srgbClr val="000000"/>
+                </a:solidFill>
+                <a:latin typeface="JetBrains Mono"/>
+              </a:rPr>
+              <a:t>File(</a:t>
+            </a:r>
+            <a:r>
+              <a:rPr lang="en-US" altLang="en-US" sz="2400" b="1" dirty="0">
+                <a:solidFill>
+                  <a:srgbClr val="008000"/>
+                </a:solidFill>
+                <a:latin typeface="JetBrains Mono"/>
+              </a:rPr>
+              <a:t>"</a:t>
+            </a:r>
+            <a:r>
+              <a:rPr lang="en-US" altLang="en-US" sz="2400" b="1" dirty="0" err="1">
+                <a:solidFill>
+                  <a:srgbClr val="008000"/>
+                </a:solidFill>
+                <a:latin typeface="JetBrains Mono"/>
+              </a:rPr>
+              <a:t>input.txt</a:t>
+            </a:r>
+            <a:r>
+              <a:rPr lang="en-US" altLang="en-US" sz="2400" b="1" dirty="0">
+                <a:solidFill>
+                  <a:srgbClr val="008000"/>
+                </a:solidFill>
+                <a:latin typeface="JetBrains Mono"/>
+              </a:rPr>
+              <a:t>"</a:t>
+            </a:r>
+            <a:r>
+              <a:rPr lang="en-US" altLang="en-US" sz="2400" dirty="0">
+                <a:solidFill>
+                  <a:srgbClr val="000000"/>
+                </a:solidFill>
+                <a:latin typeface="JetBrains Mono"/>
+              </a:rPr>
+              <a:t>));</a:t>
+            </a:r>
+            <a:br>
+              <a:rPr lang="en-US" altLang="en-US" sz="2400" dirty="0">
+                <a:solidFill>
+                  <a:srgbClr val="000000"/>
+                </a:solidFill>
+                <a:latin typeface="JetBrains Mono"/>
+              </a:rPr>
+            </a:br>
+            <a:r>
+              <a:rPr lang="en-US" altLang="en-US" sz="2400" dirty="0">
+                <a:solidFill>
+                  <a:srgbClr val="000000"/>
+                </a:solidFill>
+                <a:latin typeface="JetBrains Mono"/>
+              </a:rPr>
+              <a:t>        String[] line = </a:t>
+            </a:r>
+            <a:r>
+              <a:rPr lang="en-US" altLang="en-US" sz="2400" dirty="0" err="1">
+                <a:solidFill>
+                  <a:srgbClr val="000000"/>
+                </a:solidFill>
+                <a:latin typeface="JetBrains Mono"/>
+              </a:rPr>
+              <a:t>scanner.nextLine</a:t>
+            </a:r>
+            <a:r>
+              <a:rPr lang="en-US" altLang="en-US" sz="2400" dirty="0">
+                <a:solidFill>
+                  <a:srgbClr val="000000"/>
+                </a:solidFill>
+                <a:latin typeface="JetBrains Mono"/>
+              </a:rPr>
+              <a:t>().split(</a:t>
+            </a:r>
+            <a:r>
+              <a:rPr lang="en-US" altLang="en-US" sz="2400" b="1" dirty="0">
+                <a:solidFill>
+                  <a:srgbClr val="008000"/>
+                </a:solidFill>
+                <a:latin typeface="JetBrains Mono"/>
+              </a:rPr>
+              <a:t>","</a:t>
+            </a:r>
+            <a:r>
+              <a:rPr lang="en-US" altLang="en-US" sz="2400" dirty="0">
+                <a:solidFill>
+                  <a:srgbClr val="000000"/>
+                </a:solidFill>
+                <a:latin typeface="JetBrains Mono"/>
+              </a:rPr>
+              <a:t>);</a:t>
+            </a:r>
+            <a:br>
+              <a:rPr lang="en-US" altLang="en-US" sz="2400" dirty="0">
+                <a:solidFill>
+                  <a:srgbClr val="000000"/>
+                </a:solidFill>
+                <a:latin typeface="JetBrains Mono"/>
+              </a:rPr>
+            </a:br>
+            <a:r>
+              <a:rPr lang="en-US" altLang="en-US" sz="2400" dirty="0">
+                <a:solidFill>
+                  <a:srgbClr val="000000"/>
+                </a:solidFill>
+                <a:latin typeface="JetBrains Mono"/>
+              </a:rPr>
+              <a:t>        </a:t>
+            </a:r>
+            <a:r>
+              <a:rPr lang="en-US" altLang="en-US" sz="2400" dirty="0" err="1">
+                <a:solidFill>
+                  <a:srgbClr val="000000"/>
+                </a:solidFill>
+                <a:latin typeface="JetBrains Mono"/>
+              </a:rPr>
+              <a:t>System.</a:t>
+            </a:r>
+            <a:r>
+              <a:rPr lang="en-US" altLang="en-US" sz="2400" b="1" i="1" dirty="0" err="1">
+                <a:solidFill>
+                  <a:srgbClr val="660E7A"/>
+                </a:solidFill>
+                <a:latin typeface="JetBrains Mono"/>
+              </a:rPr>
+              <a:t>out</a:t>
+            </a:r>
+            <a:r>
+              <a:rPr lang="en-US" altLang="en-US" sz="2400" dirty="0" err="1">
+                <a:solidFill>
+                  <a:srgbClr val="000000"/>
+                </a:solidFill>
+                <a:latin typeface="JetBrains Mono"/>
+              </a:rPr>
+              <a:t>.println</a:t>
+            </a:r>
+            <a:r>
+              <a:rPr lang="en-US" altLang="en-US" sz="2400" dirty="0">
+                <a:solidFill>
+                  <a:srgbClr val="000000"/>
+                </a:solidFill>
+                <a:latin typeface="JetBrains Mono"/>
+              </a:rPr>
+              <a:t>(line[ </a:t>
+            </a:r>
+            <a:r>
+              <a:rPr lang="en-US" altLang="en-US" sz="2400" dirty="0">
+                <a:solidFill>
+                  <a:srgbClr val="0000FF"/>
+                </a:solidFill>
+                <a:latin typeface="JetBrains Mono"/>
+              </a:rPr>
+              <a:t>1 </a:t>
+            </a:r>
+            <a:r>
+              <a:rPr lang="en-US" altLang="en-US" sz="2400" dirty="0">
+                <a:solidFill>
+                  <a:srgbClr val="000000"/>
+                </a:solidFill>
+                <a:latin typeface="JetBrains Mono"/>
+              </a:rPr>
+              <a:t>]);</a:t>
+            </a:r>
+            <a:br>
+              <a:rPr lang="en-US" altLang="en-US" sz="2400" dirty="0">
+                <a:solidFill>
+                  <a:srgbClr val="000000"/>
+                </a:solidFill>
+                <a:latin typeface="JetBrains Mono"/>
+              </a:rPr>
+            </a:br>
+            <a:r>
+              <a:rPr lang="en-US" altLang="en-US" sz="2400" dirty="0">
+                <a:solidFill>
+                  <a:srgbClr val="000000"/>
+                </a:solidFill>
+                <a:latin typeface="JetBrains Mono"/>
+              </a:rPr>
+              <a:t>        </a:t>
+            </a:r>
+            <a:r>
+              <a:rPr lang="en-US" altLang="en-US" sz="2400" dirty="0" err="1">
+                <a:solidFill>
+                  <a:srgbClr val="000000"/>
+                </a:solidFill>
+                <a:latin typeface="JetBrains Mono"/>
+              </a:rPr>
+              <a:t>System.</a:t>
+            </a:r>
+            <a:r>
+              <a:rPr lang="en-US" altLang="en-US" sz="2400" b="1" i="1" dirty="0" err="1">
+                <a:solidFill>
+                  <a:srgbClr val="660E7A"/>
+                </a:solidFill>
+                <a:latin typeface="JetBrains Mono"/>
+              </a:rPr>
+              <a:t>out</a:t>
+            </a:r>
+            <a:r>
+              <a:rPr lang="en-US" altLang="en-US" sz="2400" dirty="0" err="1">
+                <a:solidFill>
+                  <a:srgbClr val="000000"/>
+                </a:solidFill>
+                <a:latin typeface="JetBrains Mono"/>
+              </a:rPr>
+              <a:t>.println</a:t>
+            </a:r>
+            <a:r>
+              <a:rPr lang="en-US" altLang="en-US" sz="2400" dirty="0">
+                <a:solidFill>
+                  <a:srgbClr val="000000"/>
+                </a:solidFill>
+                <a:latin typeface="JetBrains Mono"/>
+              </a:rPr>
+              <a:t>(</a:t>
+            </a:r>
+            <a:r>
+              <a:rPr lang="en-US" altLang="en-US" sz="2400" dirty="0" err="1">
+                <a:solidFill>
+                  <a:srgbClr val="000000"/>
+                </a:solidFill>
+                <a:latin typeface="JetBrains Mono"/>
+              </a:rPr>
+              <a:t>scanner.next</a:t>
+            </a:r>
+            <a:r>
+              <a:rPr lang="en-US" altLang="en-US" sz="2400" dirty="0">
+                <a:solidFill>
+                  <a:srgbClr val="000000"/>
+                </a:solidFill>
+                <a:latin typeface="JetBrains Mono"/>
+              </a:rPr>
+              <a:t>());</a:t>
+            </a:r>
+            <a:br>
+              <a:rPr lang="en-US" altLang="en-US" sz="2400" dirty="0">
+                <a:solidFill>
+                  <a:srgbClr val="000000"/>
+                </a:solidFill>
+                <a:latin typeface="JetBrains Mono"/>
+              </a:rPr>
+            </a:br>
+            <a:r>
+              <a:rPr lang="en-US" altLang="en-US" sz="2400" dirty="0">
+                <a:solidFill>
+                  <a:srgbClr val="000000"/>
+                </a:solidFill>
+                <a:latin typeface="JetBrains Mono"/>
+              </a:rPr>
+              <a:t>        </a:t>
+            </a:r>
+            <a:r>
+              <a:rPr lang="en-US" altLang="en-US" sz="2400" dirty="0" err="1">
+                <a:solidFill>
+                  <a:srgbClr val="000000"/>
+                </a:solidFill>
+                <a:latin typeface="JetBrains Mono"/>
+              </a:rPr>
+              <a:t>scanner.nextLine</a:t>
+            </a:r>
+            <a:r>
+              <a:rPr lang="en-US" altLang="en-US" sz="2400" dirty="0">
+                <a:solidFill>
+                  <a:srgbClr val="000000"/>
+                </a:solidFill>
+                <a:latin typeface="JetBrains Mono"/>
+              </a:rPr>
+              <a:t>();</a:t>
+            </a:r>
+            <a:br>
+              <a:rPr lang="en-US" altLang="en-US" sz="2400" dirty="0">
+                <a:solidFill>
+                  <a:srgbClr val="000000"/>
+                </a:solidFill>
+                <a:latin typeface="JetBrains Mono"/>
+              </a:rPr>
+            </a:br>
+            <a:r>
+              <a:rPr lang="en-US" altLang="en-US" sz="2400" dirty="0">
+                <a:solidFill>
+                  <a:srgbClr val="000000"/>
+                </a:solidFill>
+                <a:latin typeface="JetBrains Mono"/>
+              </a:rPr>
+              <a:t>        </a:t>
+            </a:r>
+            <a:r>
+              <a:rPr lang="en-US" altLang="en-US" sz="2400" dirty="0" err="1">
+                <a:solidFill>
+                  <a:srgbClr val="000000"/>
+                </a:solidFill>
+                <a:latin typeface="JetBrains Mono"/>
+              </a:rPr>
+              <a:t>System.</a:t>
+            </a:r>
+            <a:r>
+              <a:rPr lang="en-US" altLang="en-US" sz="2400" b="1" i="1" dirty="0" err="1">
+                <a:solidFill>
+                  <a:srgbClr val="660E7A"/>
+                </a:solidFill>
+                <a:latin typeface="JetBrains Mono"/>
+              </a:rPr>
+              <a:t>out</a:t>
+            </a:r>
+            <a:r>
+              <a:rPr lang="en-US" altLang="en-US" sz="2400" dirty="0" err="1">
+                <a:solidFill>
+                  <a:srgbClr val="000000"/>
+                </a:solidFill>
+                <a:latin typeface="JetBrains Mono"/>
+              </a:rPr>
+              <a:t>.println</a:t>
+            </a:r>
+            <a:r>
+              <a:rPr lang="en-US" altLang="en-US" sz="2400" dirty="0">
+                <a:solidFill>
+                  <a:srgbClr val="000000"/>
+                </a:solidFill>
+                <a:latin typeface="JetBrains Mono"/>
+              </a:rPr>
+              <a:t>(</a:t>
+            </a:r>
+            <a:r>
+              <a:rPr lang="en-US" altLang="en-US" sz="2400" dirty="0" err="1">
+                <a:solidFill>
+                  <a:srgbClr val="000000"/>
+                </a:solidFill>
+                <a:latin typeface="JetBrains Mono"/>
+              </a:rPr>
+              <a:t>scanner.nextLine</a:t>
+            </a:r>
+            <a:r>
+              <a:rPr lang="en-US" altLang="en-US" sz="2400" dirty="0">
+                <a:solidFill>
+                  <a:srgbClr val="000000"/>
+                </a:solidFill>
+                <a:latin typeface="JetBrains Mono"/>
+              </a:rPr>
+              <a:t>().split(</a:t>
+            </a:r>
+            <a:r>
+              <a:rPr lang="en-US" altLang="en-US" sz="2400" b="1" dirty="0">
+                <a:solidFill>
+                  <a:srgbClr val="008000"/>
+                </a:solidFill>
+                <a:latin typeface="JetBrains Mono"/>
+              </a:rPr>
+              <a:t>","</a:t>
+            </a:r>
+            <a:r>
+              <a:rPr lang="en-US" altLang="en-US" sz="2400" dirty="0">
+                <a:solidFill>
+                  <a:srgbClr val="000000"/>
+                </a:solidFill>
+                <a:latin typeface="JetBrains Mono"/>
+              </a:rPr>
+              <a:t>)[ </a:t>
+            </a:r>
+            <a:r>
+              <a:rPr lang="en-US" altLang="en-US" sz="2400" dirty="0">
+                <a:solidFill>
+                  <a:srgbClr val="0000FF"/>
+                </a:solidFill>
+                <a:latin typeface="JetBrains Mono"/>
+              </a:rPr>
+              <a:t>0 </a:t>
+            </a:r>
+            <a:r>
+              <a:rPr lang="en-US" altLang="en-US" sz="2400" dirty="0">
+                <a:solidFill>
+                  <a:srgbClr val="000000"/>
+                </a:solidFill>
+                <a:latin typeface="JetBrains Mono"/>
+              </a:rPr>
+              <a:t>]);</a:t>
+            </a:r>
+            <a:br>
+              <a:rPr lang="en-US" altLang="en-US" sz="2400" dirty="0">
+                <a:solidFill>
+                  <a:srgbClr val="000000"/>
+                </a:solidFill>
+                <a:latin typeface="JetBrains Mono"/>
+              </a:rPr>
+            </a:br>
+            <a:r>
+              <a:rPr lang="en-US" altLang="en-US" sz="2400" dirty="0">
+                <a:solidFill>
+                  <a:srgbClr val="000000"/>
+                </a:solidFill>
+                <a:latin typeface="JetBrains Mono"/>
+              </a:rPr>
+              <a:t>    }</a:t>
+            </a:r>
+            <a:r>
+              <a:rPr lang="en-US" altLang="en-US" sz="2400" b="1" dirty="0">
+                <a:solidFill>
+                  <a:srgbClr val="000080"/>
+                </a:solidFill>
+                <a:latin typeface="JetBrains Mono"/>
+              </a:rPr>
+              <a:t>catch</a:t>
+            </a:r>
+            <a:r>
+              <a:rPr lang="en-US" altLang="en-US" sz="2400" dirty="0">
+                <a:solidFill>
+                  <a:srgbClr val="000000"/>
+                </a:solidFill>
+                <a:latin typeface="JetBrains Mono"/>
+              </a:rPr>
+              <a:t>(Exception ex) {</a:t>
+            </a:r>
+            <a:br>
+              <a:rPr lang="en-US" altLang="en-US" sz="2400" dirty="0">
+                <a:solidFill>
+                  <a:srgbClr val="000000"/>
+                </a:solidFill>
+                <a:latin typeface="JetBrains Mono"/>
+              </a:rPr>
+            </a:br>
+            <a:r>
+              <a:rPr lang="en-US" altLang="en-US" sz="2400" dirty="0">
+                <a:solidFill>
+                  <a:srgbClr val="000000"/>
+                </a:solidFill>
+                <a:latin typeface="JetBrains Mono"/>
+              </a:rPr>
+              <a:t>        </a:t>
+            </a:r>
+            <a:r>
+              <a:rPr lang="en-US" altLang="en-US" sz="2400" dirty="0" err="1">
+                <a:solidFill>
+                  <a:srgbClr val="000000"/>
+                </a:solidFill>
+                <a:latin typeface="JetBrains Mono"/>
+              </a:rPr>
+              <a:t>System.</a:t>
+            </a:r>
+            <a:r>
+              <a:rPr lang="en-US" altLang="en-US" sz="2400" b="1" i="1" dirty="0" err="1">
+                <a:solidFill>
+                  <a:srgbClr val="660E7A"/>
+                </a:solidFill>
+                <a:latin typeface="JetBrains Mono"/>
+              </a:rPr>
+              <a:t>out</a:t>
+            </a:r>
+            <a:r>
+              <a:rPr lang="en-US" altLang="en-US" sz="2400" dirty="0" err="1">
+                <a:solidFill>
+                  <a:srgbClr val="000000"/>
+                </a:solidFill>
+                <a:latin typeface="JetBrains Mono"/>
+              </a:rPr>
+              <a:t>.println</a:t>
+            </a:r>
+            <a:r>
+              <a:rPr lang="en-US" altLang="en-US" sz="2400" dirty="0">
+                <a:solidFill>
+                  <a:srgbClr val="000000"/>
+                </a:solidFill>
+                <a:latin typeface="JetBrains Mono"/>
+              </a:rPr>
+              <a:t>(</a:t>
+            </a:r>
+            <a:r>
+              <a:rPr lang="en-US" altLang="en-US" sz="2400" b="1" dirty="0">
+                <a:solidFill>
+                  <a:srgbClr val="008000"/>
+                </a:solidFill>
+                <a:latin typeface="JetBrains Mono"/>
+              </a:rPr>
+              <a:t>"Exception!"</a:t>
+            </a:r>
+            <a:r>
+              <a:rPr lang="en-US" altLang="en-US" sz="2400" dirty="0">
+                <a:solidFill>
+                  <a:srgbClr val="000000"/>
+                </a:solidFill>
+                <a:latin typeface="JetBrains Mono"/>
+              </a:rPr>
+              <a:t>);</a:t>
+            </a:r>
+            <a:br>
+              <a:rPr lang="en-US" altLang="en-US" sz="2400" dirty="0">
+                <a:solidFill>
+                  <a:srgbClr val="000000"/>
+                </a:solidFill>
+                <a:latin typeface="JetBrains Mono"/>
+              </a:rPr>
+            </a:br>
+            <a:r>
+              <a:rPr lang="en-US" altLang="en-US" sz="2400" dirty="0">
+                <a:solidFill>
+                  <a:srgbClr val="000000"/>
+                </a:solidFill>
+                <a:latin typeface="JetBrains Mono"/>
+              </a:rPr>
+              <a:t>    }</a:t>
+            </a:r>
+            <a:br>
+              <a:rPr lang="en-US" altLang="en-US" sz="2400" dirty="0">
+                <a:solidFill>
+                  <a:srgbClr val="000000"/>
+                </a:solidFill>
+                <a:latin typeface="JetBrains Mono"/>
+              </a:rPr>
+            </a:br>
+            <a:r>
+              <a:rPr lang="en-US" altLang="en-US" sz="2400" dirty="0">
+                <a:solidFill>
+                  <a:srgbClr val="000000"/>
+                </a:solidFill>
+                <a:latin typeface="JetBrains Mono"/>
+              </a:rPr>
+              <a:t>}</a:t>
+            </a:r>
+            <a:endParaRPr lang="en-US" altLang="en-US" sz="2400" dirty="0">
+              <a:solidFill>
+                <a:schemeClr val="tx1"/>
+              </a:solidFill>
+              <a:latin typeface="Arial" panose="020B0604020202020204" pitchFamily="34" charset="0"/>
+            </a:endParaRPr>
+          </a:p>
+        </p:txBody>
+      </p:sp>
+      <mc:AlternateContent xmlns:mc="http://schemas.openxmlformats.org/markup-compatibility/2006">
+        <mc:Choice xmlns:p14="http://schemas.microsoft.com/office/powerpoint/2010/main" Requires="p14">
+          <p:contentPart p14:bwMode="auto" r:id="rId2">
+            <p14:nvContentPartPr>
+              <p14:cNvPr id="7" name="Ink 6">
+                <a:extLst>
+                  <a:ext uri="{FF2B5EF4-FFF2-40B4-BE49-F238E27FC236}">
+                    <a16:creationId xmlns:a16="http://schemas.microsoft.com/office/drawing/2014/main" id="{3AA11BC2-1153-1645-9F5D-99EF9C2D203F}"/>
+                  </a:ext>
+                </a:extLst>
+              </p14:cNvPr>
+              <p14:cNvContentPartPr/>
+              <p14:nvPr/>
+            </p14:nvContentPartPr>
+            <p14:xfrm>
+              <a:off x="6566380" y="2160020"/>
+              <a:ext cx="6717600" cy="165960"/>
+            </p14:xfrm>
+          </p:contentPart>
+        </mc:Choice>
+        <mc:Fallback>
+          <p:pic>
+            <p:nvPicPr>
+              <p:cNvPr id="7" name="Ink 6">
+                <a:extLst>
+                  <a:ext uri="{FF2B5EF4-FFF2-40B4-BE49-F238E27FC236}">
+                    <a16:creationId xmlns:a16="http://schemas.microsoft.com/office/drawing/2014/main" id="{3AA11BC2-1153-1645-9F5D-99EF9C2D203F}"/>
+                  </a:ext>
+                </a:extLst>
+              </p:cNvPr>
+              <p:cNvPicPr/>
+              <p:nvPr/>
+            </p:nvPicPr>
+            <p:blipFill>
+              <a:blip r:embed="rId3"/>
+              <a:stretch>
+                <a:fillRect/>
+              </a:stretch>
+            </p:blipFill>
+            <p:spPr>
+              <a:xfrm>
+                <a:off x="6512380" y="2052380"/>
+                <a:ext cx="6825240" cy="381600"/>
+              </a:xfrm>
+              <a:prstGeom prst="rect">
+                <a:avLst/>
+              </a:prstGeom>
+            </p:spPr>
+          </p:pic>
+        </mc:Fallback>
+      </mc:AlternateContent>
+      <mc:AlternateContent xmlns:mc="http://schemas.openxmlformats.org/markup-compatibility/2006">
+        <mc:Choice xmlns:p14="http://schemas.microsoft.com/office/powerpoint/2010/main" Requires="p14">
+          <p:contentPart p14:bwMode="auto" r:id="rId4">
+            <p14:nvContentPartPr>
+              <p14:cNvPr id="9" name="Ink 8">
+                <a:extLst>
+                  <a:ext uri="{FF2B5EF4-FFF2-40B4-BE49-F238E27FC236}">
+                    <a16:creationId xmlns:a16="http://schemas.microsoft.com/office/drawing/2014/main" id="{E3DE6A22-D69D-A344-84A9-5B71884C36D2}"/>
+                  </a:ext>
+                </a:extLst>
+              </p14:cNvPr>
+              <p14:cNvContentPartPr/>
+              <p14:nvPr/>
+            </p14:nvContentPartPr>
+            <p14:xfrm>
+              <a:off x="6577540" y="2634860"/>
+              <a:ext cx="5267880" cy="129960"/>
+            </p14:xfrm>
+          </p:contentPart>
+        </mc:Choice>
+        <mc:Fallback>
+          <p:pic>
+            <p:nvPicPr>
+              <p:cNvPr id="9" name="Ink 8">
+                <a:extLst>
+                  <a:ext uri="{FF2B5EF4-FFF2-40B4-BE49-F238E27FC236}">
+                    <a16:creationId xmlns:a16="http://schemas.microsoft.com/office/drawing/2014/main" id="{E3DE6A22-D69D-A344-84A9-5B71884C36D2}"/>
+                  </a:ext>
+                </a:extLst>
+              </p:cNvPr>
+              <p:cNvPicPr/>
+              <p:nvPr/>
+            </p:nvPicPr>
+            <p:blipFill>
+              <a:blip r:embed="rId5"/>
+              <a:stretch>
+                <a:fillRect/>
+              </a:stretch>
+            </p:blipFill>
+            <p:spPr>
+              <a:xfrm>
+                <a:off x="6523540" y="2526860"/>
+                <a:ext cx="5375520" cy="345600"/>
+              </a:xfrm>
+              <a:prstGeom prst="rect">
+                <a:avLst/>
+              </a:prstGeom>
+            </p:spPr>
+          </p:pic>
+        </mc:Fallback>
+      </mc:AlternateContent>
+      <mc:AlternateContent xmlns:mc="http://schemas.openxmlformats.org/markup-compatibility/2006">
+        <mc:Choice xmlns:p14="http://schemas.microsoft.com/office/powerpoint/2010/main" Requires="p14">
+          <p:contentPart p14:bwMode="auto" r:id="rId6">
+            <p14:nvContentPartPr>
+              <p14:cNvPr id="10" name="Ink 9">
+                <a:extLst>
+                  <a:ext uri="{FF2B5EF4-FFF2-40B4-BE49-F238E27FC236}">
+                    <a16:creationId xmlns:a16="http://schemas.microsoft.com/office/drawing/2014/main" id="{C58EB705-4331-494E-8863-B7B3F6EF85F8}"/>
+                  </a:ext>
+                </a:extLst>
+              </p14:cNvPr>
+              <p14:cNvContentPartPr/>
+              <p14:nvPr/>
+            </p14:nvContentPartPr>
+            <p14:xfrm>
+              <a:off x="6587620" y="3010700"/>
+              <a:ext cx="3635640" cy="106560"/>
+            </p14:xfrm>
+          </p:contentPart>
+        </mc:Choice>
+        <mc:Fallback>
+          <p:pic>
+            <p:nvPicPr>
+              <p:cNvPr id="10" name="Ink 9">
+                <a:extLst>
+                  <a:ext uri="{FF2B5EF4-FFF2-40B4-BE49-F238E27FC236}">
+                    <a16:creationId xmlns:a16="http://schemas.microsoft.com/office/drawing/2014/main" id="{C58EB705-4331-494E-8863-B7B3F6EF85F8}"/>
+                  </a:ext>
+                </a:extLst>
+              </p:cNvPr>
+              <p:cNvPicPr/>
+              <p:nvPr/>
+            </p:nvPicPr>
+            <p:blipFill>
+              <a:blip r:embed="rId7"/>
+              <a:stretch>
+                <a:fillRect/>
+              </a:stretch>
+            </p:blipFill>
+            <p:spPr>
+              <a:xfrm>
+                <a:off x="6533620" y="2903060"/>
+                <a:ext cx="3743280" cy="322200"/>
+              </a:xfrm>
+              <a:prstGeom prst="rect">
+                <a:avLst/>
+              </a:prstGeom>
+            </p:spPr>
+          </p:pic>
+        </mc:Fallback>
+      </mc:AlternateContent>
+      <mc:AlternateContent xmlns:mc="http://schemas.openxmlformats.org/markup-compatibility/2006">
+        <mc:Choice xmlns:p14="http://schemas.microsoft.com/office/powerpoint/2010/main" Requires="p14">
+          <p:contentPart p14:bwMode="auto" r:id="rId8">
+            <p14:nvContentPartPr>
+              <p14:cNvPr id="11" name="Ink 10">
+                <a:extLst>
+                  <a:ext uri="{FF2B5EF4-FFF2-40B4-BE49-F238E27FC236}">
+                    <a16:creationId xmlns:a16="http://schemas.microsoft.com/office/drawing/2014/main" id="{40688764-CE5E-5945-8E9E-39CA65DE4945}"/>
+                  </a:ext>
+                </a:extLst>
+              </p14:cNvPr>
+              <p14:cNvContentPartPr/>
+              <p14:nvPr/>
+            </p14:nvContentPartPr>
+            <p14:xfrm>
+              <a:off x="6570700" y="3387260"/>
+              <a:ext cx="4395240" cy="88560"/>
+            </p14:xfrm>
+          </p:contentPart>
+        </mc:Choice>
+        <mc:Fallback>
+          <p:pic>
+            <p:nvPicPr>
+              <p:cNvPr id="11" name="Ink 10">
+                <a:extLst>
+                  <a:ext uri="{FF2B5EF4-FFF2-40B4-BE49-F238E27FC236}">
+                    <a16:creationId xmlns:a16="http://schemas.microsoft.com/office/drawing/2014/main" id="{40688764-CE5E-5945-8E9E-39CA65DE4945}"/>
+                  </a:ext>
+                </a:extLst>
+              </p:cNvPr>
+              <p:cNvPicPr/>
+              <p:nvPr/>
+            </p:nvPicPr>
+            <p:blipFill>
+              <a:blip r:embed="rId9"/>
+              <a:stretch>
+                <a:fillRect/>
+              </a:stretch>
+            </p:blipFill>
+            <p:spPr>
+              <a:xfrm>
+                <a:off x="6517060" y="3279620"/>
+                <a:ext cx="4502880" cy="304200"/>
+              </a:xfrm>
+              <a:prstGeom prst="rect">
+                <a:avLst/>
+              </a:prstGeom>
+            </p:spPr>
+          </p:pic>
+        </mc:Fallback>
+      </mc:AlternateContent>
+      <mc:AlternateContent xmlns:mc="http://schemas.openxmlformats.org/markup-compatibility/2006">
+        <mc:Choice xmlns:p14="http://schemas.microsoft.com/office/powerpoint/2010/main" Requires="p14">
+          <p:contentPart p14:bwMode="auto" r:id="rId10">
+            <p14:nvContentPartPr>
+              <p14:cNvPr id="12" name="Ink 11">
+                <a:extLst>
+                  <a:ext uri="{FF2B5EF4-FFF2-40B4-BE49-F238E27FC236}">
+                    <a16:creationId xmlns:a16="http://schemas.microsoft.com/office/drawing/2014/main" id="{D7F4388B-1645-934E-9A65-0F5289A96990}"/>
+                  </a:ext>
+                </a:extLst>
+              </p14:cNvPr>
+              <p14:cNvContentPartPr/>
+              <p14:nvPr/>
+            </p14:nvContentPartPr>
+            <p14:xfrm>
+              <a:off x="6585820" y="3725660"/>
+              <a:ext cx="2488680" cy="51120"/>
+            </p14:xfrm>
+          </p:contentPart>
+        </mc:Choice>
+        <mc:Fallback>
+          <p:pic>
+            <p:nvPicPr>
+              <p:cNvPr id="12" name="Ink 11">
+                <a:extLst>
+                  <a:ext uri="{FF2B5EF4-FFF2-40B4-BE49-F238E27FC236}">
+                    <a16:creationId xmlns:a16="http://schemas.microsoft.com/office/drawing/2014/main" id="{D7F4388B-1645-934E-9A65-0F5289A96990}"/>
+                  </a:ext>
+                </a:extLst>
+              </p:cNvPr>
+              <p:cNvPicPr/>
+              <p:nvPr/>
+            </p:nvPicPr>
+            <p:blipFill>
+              <a:blip r:embed="rId11"/>
+              <a:stretch>
+                <a:fillRect/>
+              </a:stretch>
+            </p:blipFill>
+            <p:spPr>
+              <a:xfrm>
+                <a:off x="6532180" y="3618020"/>
+                <a:ext cx="2596320" cy="266760"/>
+              </a:xfrm>
+              <a:prstGeom prst="rect">
+                <a:avLst/>
+              </a:prstGeom>
+            </p:spPr>
+          </p:pic>
+        </mc:Fallback>
+      </mc:AlternateContent>
+      <mc:AlternateContent xmlns:mc="http://schemas.openxmlformats.org/markup-compatibility/2006">
+        <mc:Choice xmlns:p14="http://schemas.microsoft.com/office/powerpoint/2010/main" Requires="p14">
+          <p:contentPart p14:bwMode="auto" r:id="rId12">
+            <p14:nvContentPartPr>
+              <p14:cNvPr id="14" name="Ink 13">
+                <a:extLst>
+                  <a:ext uri="{FF2B5EF4-FFF2-40B4-BE49-F238E27FC236}">
+                    <a16:creationId xmlns:a16="http://schemas.microsoft.com/office/drawing/2014/main" id="{FAB7FDBE-F6F2-324F-B8F7-D2994F6911BA}"/>
+                  </a:ext>
+                </a:extLst>
+              </p14:cNvPr>
+              <p14:cNvContentPartPr/>
+              <p14:nvPr/>
+            </p14:nvContentPartPr>
+            <p14:xfrm>
+              <a:off x="6610660" y="4068020"/>
+              <a:ext cx="6316200" cy="159840"/>
+            </p14:xfrm>
+          </p:contentPart>
+        </mc:Choice>
+        <mc:Fallback>
+          <p:pic>
+            <p:nvPicPr>
+              <p:cNvPr id="14" name="Ink 13">
+                <a:extLst>
+                  <a:ext uri="{FF2B5EF4-FFF2-40B4-BE49-F238E27FC236}">
+                    <a16:creationId xmlns:a16="http://schemas.microsoft.com/office/drawing/2014/main" id="{FAB7FDBE-F6F2-324F-B8F7-D2994F6911BA}"/>
+                  </a:ext>
+                </a:extLst>
+              </p:cNvPr>
+              <p:cNvPicPr/>
+              <p:nvPr/>
+            </p:nvPicPr>
+            <p:blipFill>
+              <a:blip r:embed="rId13"/>
+              <a:stretch>
+                <a:fillRect/>
+              </a:stretch>
+            </p:blipFill>
+            <p:spPr>
+              <a:xfrm>
+                <a:off x="6556660" y="3960380"/>
+                <a:ext cx="6423840" cy="375480"/>
+              </a:xfrm>
+              <a:prstGeom prst="rect">
+                <a:avLst/>
+              </a:prstGeom>
+            </p:spPr>
+          </p:pic>
+        </mc:Fallback>
+      </mc:AlternateContent>
+      <p:sp>
+        <p:nvSpPr>
+          <p:cNvPr id="15" name="TextBox 14">
+            <a:extLst>
+              <a:ext uri="{FF2B5EF4-FFF2-40B4-BE49-F238E27FC236}">
+                <a16:creationId xmlns:a16="http://schemas.microsoft.com/office/drawing/2014/main" id="{77679A31-C76A-8045-AA41-8353A1DC36F3}"/>
+              </a:ext>
+            </a:extLst>
+          </p:cNvPr>
+          <p:cNvSpPr txBox="1"/>
+          <p:nvPr/>
+        </p:nvSpPr>
+        <p:spPr>
+          <a:xfrm>
+            <a:off x="4966957" y="6089390"/>
+            <a:ext cx="8215085" cy="400110"/>
+          </a:xfrm>
+          <a:prstGeom prst="rect">
+            <a:avLst/>
+          </a:prstGeom>
+          <a:noFill/>
+        </p:spPr>
+        <p:txBody>
+          <a:bodyPr wrap="square">
+            <a:spAutoFit/>
+          </a:bodyPr>
+          <a:lstStyle/>
+          <a:p>
+            <a:pPr marL="0" marR="0" lvl="0" indent="0" algn="l" defTabSz="914400" rtl="0" eaLnBrk="0" fontAlgn="base" latinLnBrk="0" hangingPunct="0">
+              <a:lnSpc>
+                <a:spcPct val="100000"/>
+              </a:lnSpc>
+              <a:spcBef>
+                <a:spcPct val="0"/>
+              </a:spcBef>
+              <a:spcAft>
+                <a:spcPct val="0"/>
+              </a:spcAft>
+              <a:buClrTx/>
+              <a:buSzTx/>
+              <a:buFontTx/>
+              <a:buNone/>
+              <a:tabLst/>
+            </a:pPr>
+            <a:r>
+              <a:rPr kumimoji="0" lang="en-US" altLang="en-US" sz="2000" b="0" i="0" u="none" strike="noStrike" cap="none" normalizeH="0" baseline="0" dirty="0">
+                <a:ln>
+                  <a:noFill/>
+                </a:ln>
+                <a:solidFill>
+                  <a:srgbClr val="000000"/>
+                </a:solidFill>
+                <a:effectLst/>
+                <a:latin typeface="JetBrains Mono"/>
+              </a:rPr>
+              <a:t>Data,Row1,Row2,Row3\navery,20,30,40\nalice,15,20,30\nhatter,29,19,21</a:t>
+            </a:r>
+            <a:endParaRPr kumimoji="0" lang="en-US" altLang="en-US" sz="2000" b="0" i="0" u="none" strike="noStrike" cap="none" normalizeH="0" baseline="0" dirty="0">
+              <a:ln>
+                <a:noFill/>
+              </a:ln>
+              <a:solidFill>
+                <a:schemeClr val="tx1"/>
+              </a:solidFill>
+              <a:effectLst/>
+              <a:latin typeface="Arial" panose="020B0604020202020204" pitchFamily="34" charset="0"/>
+            </a:endParaRPr>
+          </a:p>
+        </p:txBody>
+      </p:sp>
+      <p:sp>
+        <p:nvSpPr>
+          <p:cNvPr id="17" name="TextBox 16">
+            <a:extLst>
+              <a:ext uri="{FF2B5EF4-FFF2-40B4-BE49-F238E27FC236}">
+                <a16:creationId xmlns:a16="http://schemas.microsoft.com/office/drawing/2014/main" id="{2A14E82F-CA16-B341-A656-4E387907ECA6}"/>
+              </a:ext>
+            </a:extLst>
+          </p:cNvPr>
+          <p:cNvSpPr txBox="1"/>
+          <p:nvPr/>
+        </p:nvSpPr>
+        <p:spPr>
+          <a:xfrm>
+            <a:off x="7638531" y="6326236"/>
+            <a:ext cx="5169458" cy="400110"/>
+          </a:xfrm>
+          <a:prstGeom prst="rect">
+            <a:avLst/>
+          </a:prstGeom>
+          <a:noFill/>
+        </p:spPr>
+        <p:txBody>
+          <a:bodyPr wrap="square">
+            <a:spAutoFit/>
+          </a:bodyPr>
+          <a:lstStyle/>
+          <a:p>
+            <a:r>
+              <a:rPr kumimoji="0" lang="en-US" altLang="en-US" sz="2000" b="0" i="0" u="none" strike="noStrike" cap="none" normalizeH="0" baseline="0" dirty="0">
+                <a:ln>
+                  <a:noFill/>
+                </a:ln>
+                <a:solidFill>
+                  <a:srgbClr val="000000"/>
+                </a:solidFill>
+                <a:effectLst/>
+                <a:latin typeface="JetBrains Mono"/>
+              </a:rPr>
+              <a:t>avery,20,30,40\nalice,15,20,30\nhatter,29,19,21</a:t>
+            </a:r>
+            <a:endParaRPr lang="en-US" dirty="0"/>
+          </a:p>
+        </p:txBody>
+      </p:sp>
+      <p:sp>
+        <p:nvSpPr>
+          <p:cNvPr id="19" name="TextBox 18">
+            <a:extLst>
+              <a:ext uri="{FF2B5EF4-FFF2-40B4-BE49-F238E27FC236}">
+                <a16:creationId xmlns:a16="http://schemas.microsoft.com/office/drawing/2014/main" id="{56C26011-76BD-F443-989B-5CBB85C16846}"/>
+              </a:ext>
+            </a:extLst>
+          </p:cNvPr>
+          <p:cNvSpPr txBox="1"/>
+          <p:nvPr/>
+        </p:nvSpPr>
+        <p:spPr>
+          <a:xfrm>
+            <a:off x="9144078" y="6609850"/>
+            <a:ext cx="3663911" cy="400110"/>
+          </a:xfrm>
+          <a:prstGeom prst="rect">
+            <a:avLst/>
+          </a:prstGeom>
+          <a:noFill/>
+        </p:spPr>
+        <p:txBody>
+          <a:bodyPr wrap="square">
+            <a:spAutoFit/>
+          </a:bodyPr>
+          <a:lstStyle/>
+          <a:p>
+            <a:r>
+              <a:rPr kumimoji="0" lang="en-US" altLang="en-US" sz="2000" b="0" i="0" u="none" strike="noStrike" cap="none" normalizeH="0" baseline="0" dirty="0">
+                <a:ln>
+                  <a:noFill/>
+                </a:ln>
+                <a:solidFill>
+                  <a:srgbClr val="000000"/>
+                </a:solidFill>
+                <a:effectLst/>
+                <a:latin typeface="JetBrains Mono"/>
+              </a:rPr>
+              <a:t>\nalice,15,20,30\nhatter,29,19,21</a:t>
+            </a:r>
+            <a:endParaRPr lang="en-US" dirty="0"/>
+          </a:p>
+        </p:txBody>
+      </p:sp>
+      <p:sp>
+        <p:nvSpPr>
+          <p:cNvPr id="21" name="TextBox 20">
+            <a:extLst>
+              <a:ext uri="{FF2B5EF4-FFF2-40B4-BE49-F238E27FC236}">
+                <a16:creationId xmlns:a16="http://schemas.microsoft.com/office/drawing/2014/main" id="{28A33219-994D-7546-AD5E-44FAF46343BD}"/>
+              </a:ext>
+            </a:extLst>
+          </p:cNvPr>
+          <p:cNvSpPr txBox="1"/>
+          <p:nvPr/>
+        </p:nvSpPr>
+        <p:spPr>
+          <a:xfrm>
+            <a:off x="9353589" y="6930255"/>
+            <a:ext cx="3454400" cy="400110"/>
+          </a:xfrm>
+          <a:prstGeom prst="rect">
+            <a:avLst/>
+          </a:prstGeom>
+          <a:noFill/>
+        </p:spPr>
+        <p:txBody>
+          <a:bodyPr wrap="square">
+            <a:spAutoFit/>
+          </a:bodyPr>
+          <a:lstStyle/>
+          <a:p>
+            <a:r>
+              <a:rPr kumimoji="0" lang="en-US" altLang="en-US" sz="2000" b="0" i="0" u="none" strike="noStrike" cap="none" normalizeH="0" baseline="0" dirty="0">
+                <a:ln>
+                  <a:noFill/>
+                </a:ln>
+                <a:solidFill>
+                  <a:srgbClr val="000000"/>
+                </a:solidFill>
+                <a:effectLst/>
+                <a:latin typeface="JetBrains Mono"/>
+              </a:rPr>
+              <a:t>alice,15,20,30\nhatter,29,19,21</a:t>
+            </a:r>
+            <a:endParaRPr lang="en-US" dirty="0"/>
+          </a:p>
+        </p:txBody>
+      </p:sp>
+    </p:spTree>
+    <p:extLst>
+      <p:ext uri="{BB962C8B-B14F-4D97-AF65-F5344CB8AC3E}">
+        <p14:creationId xmlns:p14="http://schemas.microsoft.com/office/powerpoint/2010/main" val="1000916135"/>
+      </p:ext>
+    </p:extLst>
+  </p:cSld>
+  <p:clrMapOvr>
+    <a:masterClrMapping/>
+  </p:clrMapOvr>
+  <mc:AlternateContent xmlns:mc="http://schemas.openxmlformats.org/markup-compatibility/2006" xmlns:p14="http://schemas.microsoft.com/office/powerpoint/2010/main">
+    <mc:Choice Requires="p14">
+      <p:transition p14:dur="300">
+        <p:fade/>
+      </p:transition>
+    </mc:Choice>
+    <mc:Fallback xmlns="">
+      <p:transition>
+        <p:fade/>
+      </p:transition>
+    </mc:Fallback>
+  </mc:AlternateContent>
+  <p:timing>
+    <p:tnLst>
+      <p:par>
+        <p:cTn id="1" dur="indefinite" restart="never" nodeType="tmRoot">
+          <p:childTnLst>
+            <p:seq concurrent="1" nextAc="seek">
+              <p:cTn id="2" dur="indefinite" nodeType="mainSeq">
+                <p:childTnLst>
+                  <p:par>
+                    <p:cTn id="3" fill="hold">
+                      <p:stCondLst>
+                        <p:cond delay="indefinite"/>
+                      </p:stCondLst>
+                      <p:childTnLst>
+                        <p:par>
+                          <p:cTn id="4" fill="hold">
+                            <p:stCondLst>
+                              <p:cond delay="0"/>
+                            </p:stCondLst>
+                            <p:childTnLst>
+                              <p:par>
+                                <p:cTn id="5" presetID="63" presetClass="entr" presetSubtype="0" fill="hold" nodeType="clickEffect">
+                                  <p:stCondLst>
+                                    <p:cond delay="0"/>
+                                  </p:stCondLst>
+                                  <p:childTnLst>
+                                    <p:set>
+                                      <p:cBhvr>
+                                        <p:cTn id="6" dur="1" fill="hold">
+                                          <p:stCondLst>
+                                            <p:cond delay="0"/>
+                                          </p:stCondLst>
+                                        </p:cTn>
+                                        <p:tgtEl>
+                                          <p:spTgt spid="7"/>
+                                        </p:tgtEl>
+                                        <p:attrNameLst>
+                                          <p:attrName>style.visibility</p:attrName>
+                                        </p:attrNameLst>
+                                      </p:cBhvr>
+                                      <p:to>
+                                        <p:strVal val="visible"/>
+                                      </p:to>
+                                    </p:set>
+                                    <p:anim calcmode="lin" valueType="num">
+                                      <p:cBhvr>
+                                        <p:cTn id="7" dur="2000" fill="hold"/>
+                                        <p:tgtEl>
+                                          <p:spTgt spid="7"/>
+                                        </p:tgtEl>
+                                        <p:attrNameLst>
+                                          <p:attrName>drawProgress</p:attrName>
+                                        </p:attrNameLst>
+                                      </p:cBhvr>
+                                      <p:tavLst>
+                                        <p:tav tm="0">
+                                          <p:val>
+                                            <p:fltVal val="0"/>
+                                          </p:val>
+                                        </p:tav>
+                                        <p:tav tm="100000">
+                                          <p:val>
+                                            <p:fltVal val="1"/>
+                                          </p:val>
+                                        </p:tav>
+                                      </p:tavLst>
+                                    </p:anim>
+                                  </p:childTnLst>
+                                </p:cTn>
+                              </p:par>
+                            </p:childTnLst>
+                          </p:cTn>
+                        </p:par>
+                      </p:childTnLst>
+                    </p:cTn>
+                  </p:par>
+                  <p:par>
+                    <p:cTn id="8" fill="hold">
+                      <p:stCondLst>
+                        <p:cond delay="indefinite"/>
+                      </p:stCondLst>
+                      <p:childTnLst>
+                        <p:par>
+                          <p:cTn id="9" fill="hold">
+                            <p:stCondLst>
+                              <p:cond delay="0"/>
+                            </p:stCondLst>
+                            <p:childTnLst>
+                              <p:par>
+                                <p:cTn id="10" presetID="1" presetClass="exit" presetSubtype="0" fill="hold" nodeType="clickEffect">
+                                  <p:stCondLst>
+                                    <p:cond delay="0"/>
+                                  </p:stCondLst>
+                                  <p:childTnLst>
+                                    <p:set>
+                                      <p:cBhvr>
+                                        <p:cTn id="11" dur="1" fill="hold">
+                                          <p:stCondLst>
+                                            <p:cond delay="0"/>
+                                          </p:stCondLst>
+                                        </p:cTn>
+                                        <p:tgtEl>
+                                          <p:spTgt spid="7"/>
+                                        </p:tgtEl>
+                                        <p:attrNameLst>
+                                          <p:attrName>style.visibility</p:attrName>
+                                        </p:attrNameLst>
+                                      </p:cBhvr>
+                                      <p:to>
+                                        <p:strVal val="hidden"/>
+                                      </p:to>
+                                    </p:set>
+                                  </p:childTnLst>
+                                </p:cTn>
+                              </p:par>
+                              <p:par>
+                                <p:cTn id="12" presetID="63" presetClass="entr" presetSubtype="0" fill="hold" nodeType="withEffect">
+                                  <p:stCondLst>
+                                    <p:cond delay="0"/>
+                                  </p:stCondLst>
+                                  <p:childTnLst>
+                                    <p:set>
+                                      <p:cBhvr>
+                                        <p:cTn id="13" dur="1" fill="hold">
+                                          <p:stCondLst>
+                                            <p:cond delay="0"/>
+                                          </p:stCondLst>
+                                        </p:cTn>
+                                        <p:tgtEl>
+                                          <p:spTgt spid="9"/>
+                                        </p:tgtEl>
+                                        <p:attrNameLst>
+                                          <p:attrName>style.visibility</p:attrName>
+                                        </p:attrNameLst>
+                                      </p:cBhvr>
+                                      <p:to>
+                                        <p:strVal val="visible"/>
+                                      </p:to>
+                                    </p:set>
+                                    <p:anim calcmode="lin" valueType="num">
+                                      <p:cBhvr>
+                                        <p:cTn id="14" dur="2000" fill="hold"/>
+                                        <p:tgtEl>
+                                          <p:spTgt spid="9"/>
+                                        </p:tgtEl>
+                                        <p:attrNameLst>
+                                          <p:attrName>drawProgress</p:attrName>
+                                        </p:attrNameLst>
+                                      </p:cBhvr>
+                                      <p:tavLst>
+                                        <p:tav tm="0">
+                                          <p:val>
+                                            <p:fltVal val="0"/>
+                                          </p:val>
+                                        </p:tav>
+                                        <p:tav tm="100000">
+                                          <p:val>
+                                            <p:fltVal val="1"/>
+                                          </p:val>
+                                        </p:tav>
+                                      </p:tavLst>
+                                    </p:anim>
+                                  </p:childTnLst>
+                                </p:cTn>
+                              </p:par>
+                            </p:childTnLst>
+                          </p:cTn>
+                        </p:par>
+                      </p:childTnLst>
+                    </p:cTn>
+                  </p:par>
+                  <p:par>
+                    <p:cTn id="15" fill="hold">
+                      <p:stCondLst>
+                        <p:cond delay="indefinite"/>
+                      </p:stCondLst>
+                      <p:childTnLst>
+                        <p:par>
+                          <p:cTn id="16" fill="hold">
+                            <p:stCondLst>
+                              <p:cond delay="0"/>
+                            </p:stCondLst>
+                            <p:childTnLst>
+                              <p:par>
+                                <p:cTn id="17" presetID="9" presetClass="entr" presetSubtype="0" fill="hold" grpId="0" nodeType="clickEffect">
+                                  <p:stCondLst>
+                                    <p:cond delay="0"/>
+                                  </p:stCondLst>
+                                  <p:childTnLst>
+                                    <p:set>
+                                      <p:cBhvr>
+                                        <p:cTn id="18" dur="1" fill="hold">
+                                          <p:stCondLst>
+                                            <p:cond delay="0"/>
+                                          </p:stCondLst>
+                                        </p:cTn>
+                                        <p:tgtEl>
+                                          <p:spTgt spid="17"/>
+                                        </p:tgtEl>
+                                        <p:attrNameLst>
+                                          <p:attrName>style.visibility</p:attrName>
+                                        </p:attrNameLst>
+                                      </p:cBhvr>
+                                      <p:to>
+                                        <p:strVal val="visible"/>
+                                      </p:to>
+                                    </p:set>
+                                    <p:animEffect transition="in" filter="dissolve">
+                                      <p:cBhvr>
+                                        <p:cTn id="19" dur="500"/>
+                                        <p:tgtEl>
+                                          <p:spTgt spid="17"/>
+                                        </p:tgtEl>
+                                      </p:cBhvr>
+                                    </p:animEffect>
+                                  </p:childTnLst>
+                                </p:cTn>
+                              </p:par>
+                            </p:childTnLst>
+                          </p:cTn>
+                        </p:par>
+                      </p:childTnLst>
+                    </p:cTn>
+                  </p:par>
+                  <p:par>
+                    <p:cTn id="20" fill="hold">
+                      <p:stCondLst>
+                        <p:cond delay="indefinite"/>
+                      </p:stCondLst>
+                      <p:childTnLst>
+                        <p:par>
+                          <p:cTn id="21" fill="hold">
+                            <p:stCondLst>
+                              <p:cond delay="0"/>
+                            </p:stCondLst>
+                            <p:childTnLst>
+                              <p:par>
+                                <p:cTn id="22" presetID="1" presetClass="exit" presetSubtype="0" fill="hold" nodeType="clickEffect">
+                                  <p:stCondLst>
+                                    <p:cond delay="0"/>
+                                  </p:stCondLst>
+                                  <p:childTnLst>
+                                    <p:set>
+                                      <p:cBhvr>
+                                        <p:cTn id="23" dur="1" fill="hold">
+                                          <p:stCondLst>
+                                            <p:cond delay="0"/>
+                                          </p:stCondLst>
+                                        </p:cTn>
+                                        <p:tgtEl>
+                                          <p:spTgt spid="9"/>
+                                        </p:tgtEl>
+                                        <p:attrNameLst>
+                                          <p:attrName>style.visibility</p:attrName>
+                                        </p:attrNameLst>
+                                      </p:cBhvr>
+                                      <p:to>
+                                        <p:strVal val="hidden"/>
+                                      </p:to>
+                                    </p:set>
+                                  </p:childTnLst>
+                                </p:cTn>
+                              </p:par>
+                              <p:par>
+                                <p:cTn id="24" presetID="63" presetClass="entr" presetSubtype="0" fill="hold" nodeType="withEffect">
+                                  <p:stCondLst>
+                                    <p:cond delay="0"/>
+                                  </p:stCondLst>
+                                  <p:childTnLst>
+                                    <p:set>
+                                      <p:cBhvr>
+                                        <p:cTn id="25" dur="1" fill="hold">
+                                          <p:stCondLst>
+                                            <p:cond delay="0"/>
+                                          </p:stCondLst>
+                                        </p:cTn>
+                                        <p:tgtEl>
+                                          <p:spTgt spid="10"/>
+                                        </p:tgtEl>
+                                        <p:attrNameLst>
+                                          <p:attrName>style.visibility</p:attrName>
+                                        </p:attrNameLst>
+                                      </p:cBhvr>
+                                      <p:to>
+                                        <p:strVal val="visible"/>
+                                      </p:to>
+                                    </p:set>
+                                    <p:anim calcmode="lin" valueType="num">
+                                      <p:cBhvr>
+                                        <p:cTn id="26" dur="2000" fill="hold"/>
+                                        <p:tgtEl>
+                                          <p:spTgt spid="10"/>
+                                        </p:tgtEl>
+                                        <p:attrNameLst>
+                                          <p:attrName>drawProgress</p:attrName>
+                                        </p:attrNameLst>
+                                      </p:cBhvr>
+                                      <p:tavLst>
+                                        <p:tav tm="0">
+                                          <p:val>
+                                            <p:fltVal val="0"/>
+                                          </p:val>
+                                        </p:tav>
+                                        <p:tav tm="100000">
+                                          <p:val>
+                                            <p:fltVal val="1"/>
+                                          </p:val>
+                                        </p:tav>
+                                      </p:tavLst>
+                                    </p:anim>
+                                  </p:childTnLst>
+                                </p:cTn>
+                              </p:par>
+                            </p:childTnLst>
+                          </p:cTn>
+                        </p:par>
+                      </p:childTnLst>
+                    </p:cTn>
+                  </p:par>
+                  <p:par>
+                    <p:cTn id="27" fill="hold">
+                      <p:stCondLst>
+                        <p:cond delay="indefinite"/>
+                      </p:stCondLst>
+                      <p:childTnLst>
+                        <p:par>
+                          <p:cTn id="28" fill="hold">
+                            <p:stCondLst>
+                              <p:cond delay="0"/>
+                            </p:stCondLst>
+                            <p:childTnLst>
+                              <p:par>
+                                <p:cTn id="29" presetID="9" presetClass="exit" presetSubtype="0" fill="hold" nodeType="clickEffect">
+                                  <p:stCondLst>
+                                    <p:cond delay="0"/>
+                                  </p:stCondLst>
+                                  <p:childTnLst>
+                                    <p:animEffect transition="out" filter="dissolve">
+                                      <p:cBhvr>
+                                        <p:cTn id="30" dur="500"/>
+                                        <p:tgtEl>
+                                          <p:spTgt spid="10"/>
+                                        </p:tgtEl>
+                                      </p:cBhvr>
+                                    </p:animEffect>
+                                    <p:set>
+                                      <p:cBhvr>
+                                        <p:cTn id="31" dur="1" fill="hold">
+                                          <p:stCondLst>
+                                            <p:cond delay="499"/>
+                                          </p:stCondLst>
+                                        </p:cTn>
+                                        <p:tgtEl>
+                                          <p:spTgt spid="10"/>
+                                        </p:tgtEl>
+                                        <p:attrNameLst>
+                                          <p:attrName>style.visibility</p:attrName>
+                                        </p:attrNameLst>
+                                      </p:cBhvr>
+                                      <p:to>
+                                        <p:strVal val="hidden"/>
+                                      </p:to>
+                                    </p:set>
+                                  </p:childTnLst>
+                                </p:cTn>
+                              </p:par>
+                              <p:par>
+                                <p:cTn id="32" presetID="63" presetClass="entr" presetSubtype="0" fill="hold" nodeType="withEffect">
+                                  <p:stCondLst>
+                                    <p:cond delay="0"/>
+                                  </p:stCondLst>
+                                  <p:childTnLst>
+                                    <p:set>
+                                      <p:cBhvr>
+                                        <p:cTn id="33" dur="1" fill="hold">
+                                          <p:stCondLst>
+                                            <p:cond delay="0"/>
+                                          </p:stCondLst>
+                                        </p:cTn>
+                                        <p:tgtEl>
+                                          <p:spTgt spid="11"/>
+                                        </p:tgtEl>
+                                        <p:attrNameLst>
+                                          <p:attrName>style.visibility</p:attrName>
+                                        </p:attrNameLst>
+                                      </p:cBhvr>
+                                      <p:to>
+                                        <p:strVal val="visible"/>
+                                      </p:to>
+                                    </p:set>
+                                    <p:anim calcmode="lin" valueType="num">
+                                      <p:cBhvr>
+                                        <p:cTn id="34" dur="2000" fill="hold"/>
+                                        <p:tgtEl>
+                                          <p:spTgt spid="11"/>
+                                        </p:tgtEl>
+                                        <p:attrNameLst>
+                                          <p:attrName>drawProgress</p:attrName>
+                                        </p:attrNameLst>
+                                      </p:cBhvr>
+                                      <p:tavLst>
+                                        <p:tav tm="0">
+                                          <p:val>
+                                            <p:fltVal val="0"/>
+                                          </p:val>
+                                        </p:tav>
+                                        <p:tav tm="100000">
+                                          <p:val>
+                                            <p:fltVal val="1"/>
+                                          </p:val>
+                                        </p:tav>
+                                      </p:tavLst>
+                                    </p:anim>
+                                  </p:childTnLst>
+                                </p:cTn>
+                              </p:par>
+                            </p:childTnLst>
+                          </p:cTn>
+                        </p:par>
+                      </p:childTnLst>
+                    </p:cTn>
+                  </p:par>
+                  <p:par>
+                    <p:cTn id="35" fill="hold">
+                      <p:stCondLst>
+                        <p:cond delay="indefinite"/>
+                      </p:stCondLst>
+                      <p:childTnLst>
+                        <p:par>
+                          <p:cTn id="36" fill="hold">
+                            <p:stCondLst>
+                              <p:cond delay="0"/>
+                            </p:stCondLst>
+                            <p:childTnLst>
+                              <p:par>
+                                <p:cTn id="37" presetID="9" presetClass="entr" presetSubtype="0" fill="hold" grpId="0" nodeType="clickEffect">
+                                  <p:stCondLst>
+                                    <p:cond delay="0"/>
+                                  </p:stCondLst>
+                                  <p:childTnLst>
+                                    <p:set>
+                                      <p:cBhvr>
+                                        <p:cTn id="38" dur="1" fill="hold">
+                                          <p:stCondLst>
+                                            <p:cond delay="0"/>
+                                          </p:stCondLst>
+                                        </p:cTn>
+                                        <p:tgtEl>
+                                          <p:spTgt spid="19"/>
+                                        </p:tgtEl>
+                                        <p:attrNameLst>
+                                          <p:attrName>style.visibility</p:attrName>
+                                        </p:attrNameLst>
+                                      </p:cBhvr>
+                                      <p:to>
+                                        <p:strVal val="visible"/>
+                                      </p:to>
+                                    </p:set>
+                                    <p:animEffect transition="in" filter="dissolve">
+                                      <p:cBhvr>
+                                        <p:cTn id="39" dur="500"/>
+                                        <p:tgtEl>
+                                          <p:spTgt spid="19"/>
+                                        </p:tgtEl>
+                                      </p:cBhvr>
+                                    </p:animEffect>
+                                  </p:childTnLst>
+                                </p:cTn>
+                              </p:par>
+                            </p:childTnLst>
+                          </p:cTn>
+                        </p:par>
+                      </p:childTnLst>
+                    </p:cTn>
+                  </p:par>
+                  <p:par>
+                    <p:cTn id="40" fill="hold">
+                      <p:stCondLst>
+                        <p:cond delay="indefinite"/>
+                      </p:stCondLst>
+                      <p:childTnLst>
+                        <p:par>
+                          <p:cTn id="41" fill="hold">
+                            <p:stCondLst>
+                              <p:cond delay="0"/>
+                            </p:stCondLst>
+                            <p:childTnLst>
+                              <p:par>
+                                <p:cTn id="42" presetID="9" presetClass="exit" presetSubtype="0" fill="hold" nodeType="clickEffect">
+                                  <p:stCondLst>
+                                    <p:cond delay="0"/>
+                                  </p:stCondLst>
+                                  <p:childTnLst>
+                                    <p:animEffect transition="out" filter="dissolve">
+                                      <p:cBhvr>
+                                        <p:cTn id="43" dur="500"/>
+                                        <p:tgtEl>
+                                          <p:spTgt spid="11"/>
+                                        </p:tgtEl>
+                                      </p:cBhvr>
+                                    </p:animEffect>
+                                    <p:set>
+                                      <p:cBhvr>
+                                        <p:cTn id="44" dur="1" fill="hold">
+                                          <p:stCondLst>
+                                            <p:cond delay="499"/>
+                                          </p:stCondLst>
+                                        </p:cTn>
+                                        <p:tgtEl>
+                                          <p:spTgt spid="11"/>
+                                        </p:tgtEl>
+                                        <p:attrNameLst>
+                                          <p:attrName>style.visibility</p:attrName>
+                                        </p:attrNameLst>
+                                      </p:cBhvr>
+                                      <p:to>
+                                        <p:strVal val="hidden"/>
+                                      </p:to>
+                                    </p:set>
+                                  </p:childTnLst>
+                                </p:cTn>
+                              </p:par>
+                              <p:par>
+                                <p:cTn id="45" presetID="63" presetClass="entr" presetSubtype="0" fill="hold" nodeType="withEffect">
+                                  <p:stCondLst>
+                                    <p:cond delay="0"/>
+                                  </p:stCondLst>
+                                  <p:childTnLst>
+                                    <p:set>
+                                      <p:cBhvr>
+                                        <p:cTn id="46" dur="1" fill="hold">
+                                          <p:stCondLst>
+                                            <p:cond delay="0"/>
+                                          </p:stCondLst>
+                                        </p:cTn>
+                                        <p:tgtEl>
+                                          <p:spTgt spid="12"/>
+                                        </p:tgtEl>
+                                        <p:attrNameLst>
+                                          <p:attrName>style.visibility</p:attrName>
+                                        </p:attrNameLst>
+                                      </p:cBhvr>
+                                      <p:to>
+                                        <p:strVal val="visible"/>
+                                      </p:to>
+                                    </p:set>
+                                    <p:anim calcmode="lin" valueType="num">
+                                      <p:cBhvr>
+                                        <p:cTn id="47" dur="2000" fill="hold"/>
+                                        <p:tgtEl>
+                                          <p:spTgt spid="12"/>
+                                        </p:tgtEl>
+                                        <p:attrNameLst>
+                                          <p:attrName>drawProgress</p:attrName>
+                                        </p:attrNameLst>
+                                      </p:cBhvr>
+                                      <p:tavLst>
+                                        <p:tav tm="0">
+                                          <p:val>
+                                            <p:fltVal val="0"/>
+                                          </p:val>
+                                        </p:tav>
+                                        <p:tav tm="100000">
+                                          <p:val>
+                                            <p:fltVal val="1"/>
+                                          </p:val>
+                                        </p:tav>
+                                      </p:tavLst>
+                                    </p:anim>
+                                  </p:childTnLst>
+                                </p:cTn>
+                              </p:par>
+                            </p:childTnLst>
+                          </p:cTn>
+                        </p:par>
+                      </p:childTnLst>
+                    </p:cTn>
+                  </p:par>
+                  <p:par>
+                    <p:cTn id="48" fill="hold">
+                      <p:stCondLst>
+                        <p:cond delay="indefinite"/>
+                      </p:stCondLst>
+                      <p:childTnLst>
+                        <p:par>
+                          <p:cTn id="49" fill="hold">
+                            <p:stCondLst>
+                              <p:cond delay="0"/>
+                            </p:stCondLst>
+                            <p:childTnLst>
+                              <p:par>
+                                <p:cTn id="50" presetID="9" presetClass="entr" presetSubtype="0" fill="hold" grpId="0" nodeType="clickEffect">
+                                  <p:stCondLst>
+                                    <p:cond delay="0"/>
+                                  </p:stCondLst>
+                                  <p:childTnLst>
+                                    <p:set>
+                                      <p:cBhvr>
+                                        <p:cTn id="51" dur="1" fill="hold">
+                                          <p:stCondLst>
+                                            <p:cond delay="0"/>
+                                          </p:stCondLst>
+                                        </p:cTn>
+                                        <p:tgtEl>
+                                          <p:spTgt spid="21"/>
+                                        </p:tgtEl>
+                                        <p:attrNameLst>
+                                          <p:attrName>style.visibility</p:attrName>
+                                        </p:attrNameLst>
+                                      </p:cBhvr>
+                                      <p:to>
+                                        <p:strVal val="visible"/>
+                                      </p:to>
+                                    </p:set>
+                                    <p:animEffect transition="in" filter="dissolve">
+                                      <p:cBhvr>
+                                        <p:cTn id="52" dur="500"/>
+                                        <p:tgtEl>
+                                          <p:spTgt spid="21"/>
+                                        </p:tgtEl>
+                                      </p:cBhvr>
+                                    </p:animEffect>
+                                  </p:childTnLst>
+                                </p:cTn>
+                              </p:par>
+                            </p:childTnLst>
+                          </p:cTn>
+                        </p:par>
+                      </p:childTnLst>
+                    </p:cTn>
+                  </p:par>
+                  <p:par>
+                    <p:cTn id="53" fill="hold">
+                      <p:stCondLst>
+                        <p:cond delay="indefinite"/>
+                      </p:stCondLst>
+                      <p:childTnLst>
+                        <p:par>
+                          <p:cTn id="54" fill="hold">
+                            <p:stCondLst>
+                              <p:cond delay="0"/>
+                            </p:stCondLst>
+                            <p:childTnLst>
+                              <p:par>
+                                <p:cTn id="55" presetID="1" presetClass="exit" presetSubtype="0" fill="hold" nodeType="clickEffect">
+                                  <p:stCondLst>
+                                    <p:cond delay="0"/>
+                                  </p:stCondLst>
+                                  <p:childTnLst>
+                                    <p:set>
+                                      <p:cBhvr>
+                                        <p:cTn id="56" dur="1" fill="hold">
+                                          <p:stCondLst>
+                                            <p:cond delay="0"/>
+                                          </p:stCondLst>
+                                        </p:cTn>
+                                        <p:tgtEl>
+                                          <p:spTgt spid="12"/>
+                                        </p:tgtEl>
+                                        <p:attrNameLst>
+                                          <p:attrName>style.visibility</p:attrName>
+                                        </p:attrNameLst>
+                                      </p:cBhvr>
+                                      <p:to>
+                                        <p:strVal val="hidden"/>
+                                      </p:to>
+                                    </p:set>
+                                  </p:childTnLst>
+                                </p:cTn>
+                              </p:par>
+                              <p:par>
+                                <p:cTn id="57" presetID="63" presetClass="entr" presetSubtype="0" fill="hold" nodeType="withEffect">
+                                  <p:stCondLst>
+                                    <p:cond delay="0"/>
+                                  </p:stCondLst>
+                                  <p:childTnLst>
+                                    <p:set>
+                                      <p:cBhvr>
+                                        <p:cTn id="58" dur="1" fill="hold">
+                                          <p:stCondLst>
+                                            <p:cond delay="0"/>
+                                          </p:stCondLst>
+                                        </p:cTn>
+                                        <p:tgtEl>
+                                          <p:spTgt spid="14"/>
+                                        </p:tgtEl>
+                                        <p:attrNameLst>
+                                          <p:attrName>style.visibility</p:attrName>
+                                        </p:attrNameLst>
+                                      </p:cBhvr>
+                                      <p:to>
+                                        <p:strVal val="visible"/>
+                                      </p:to>
+                                    </p:set>
+                                    <p:anim calcmode="lin" valueType="num">
+                                      <p:cBhvr>
+                                        <p:cTn id="59" dur="2000" fill="hold"/>
+                                        <p:tgtEl>
+                                          <p:spTgt spid="14"/>
+                                        </p:tgtEl>
+                                        <p:attrNameLst>
+                                          <p:attrName>drawProgress</p:attrName>
+                                        </p:attrNameLst>
+                                      </p:cBhvr>
+                                      <p:tavLst>
+                                        <p:tav tm="0">
+                                          <p:val>
+                                            <p:fltVal val="0"/>
+                                          </p:val>
+                                        </p:tav>
+                                        <p:tav tm="100000">
+                                          <p:val>
+                                            <p:fltVal val="1"/>
+                                          </p:val>
+                                        </p:tav>
+                                      </p:tavLst>
+                                    </p:anim>
+                                  </p:childTnLst>
+                                </p:cTn>
+                              </p:par>
+                            </p:childTnLst>
+                          </p:cTn>
+                        </p:par>
+                      </p:childTnLst>
+                    </p:cTn>
+                  </p:par>
+                  <p:par>
+                    <p:cTn id="60" fill="hold">
+                      <p:stCondLst>
+                        <p:cond delay="indefinite"/>
+                      </p:stCondLst>
+                      <p:childTnLst>
+                        <p:par>
+                          <p:cTn id="61" fill="hold">
+                            <p:stCondLst>
+                              <p:cond delay="0"/>
+                            </p:stCondLst>
+                            <p:childTnLst>
+                              <p:par>
+                                <p:cTn id="62" presetID="1" presetClass="exit" presetSubtype="0" fill="hold" nodeType="clickEffect">
+                                  <p:stCondLst>
+                                    <p:cond delay="0"/>
+                                  </p:stCondLst>
+                                  <p:childTnLst>
+                                    <p:set>
+                                      <p:cBhvr>
+                                        <p:cTn id="63" dur="1" fill="hold">
+                                          <p:stCondLst>
+                                            <p:cond delay="0"/>
+                                          </p:stCondLst>
+                                        </p:cTn>
+                                        <p:tgtEl>
+                                          <p:spTgt spid="14"/>
+                                        </p:tgtEl>
+                                        <p:attrNameLst>
+                                          <p:attrName>style.visibility</p:attrName>
+                                        </p:attrNameLst>
+                                      </p:cBhvr>
+                                      <p:to>
+                                        <p:strVal val="hidden"/>
+                                      </p:to>
+                                    </p:set>
+                                  </p:childTnLst>
+                                </p:cTn>
+                              </p:par>
+                            </p:childTnLst>
+                          </p:cTn>
+                        </p:par>
+                      </p:childTnLst>
+                    </p:cTn>
+                  </p:par>
+                </p:childTnLst>
+              </p:cTn>
+              <p:prevCondLst>
+                <p:cond evt="onPrev" delay="0">
+                  <p:tgtEl>
+                    <p:sldTgt/>
+                  </p:tgtEl>
+                </p:cond>
+              </p:prevCondLst>
+              <p:nextCondLst>
+                <p:cond evt="onNext" delay="0">
+                  <p:tgtEl>
+                    <p:sldTgt/>
+                  </p:tgtEl>
+                </p:cond>
+              </p:nextCondLst>
+            </p:seq>
+          </p:childTnLst>
+        </p:cTn>
+      </p:par>
+    </p:tnLst>
+    <p:bldLst>
+      <p:bldP spid="17" grpId="0"/>
+      <p:bldP spid="19" grpId="0"/>
+      <p:bldP spid="21" grpId="0"/>
+    </p:bldLst>
+  </p:timing>
+</p:sld>
+</file>
+
+<file path=ppt/slides/slide12.xml><?xml version="1.0" encoding="utf-8"?>
+<p:sld xmlns:a="http://schemas.openxmlformats.org/drawingml/2006/main" xmlns:r="http://schemas.openxmlformats.org/officeDocument/2006/relationships" xmlns:p="http://schemas.openxmlformats.org/presentationml/2006/main">
+  <p:cSld>
+    <p:spTree>
+      <p:nvGrpSpPr>
+        <p:cNvPr id="1" name=""/>
+        <p:cNvGrpSpPr/>
+        <p:nvPr/>
+      </p:nvGrpSpPr>
+      <p:grpSpPr>
+        <a:xfrm>
+          <a:off x="0" y="0"/>
+          <a:ext cx="0" cy="0"/>
+          <a:chOff x="0" y="0"/>
+          <a:chExt cx="0" cy="0"/>
+        </a:xfrm>
+      </p:grpSpPr>
+      <p:sp>
+        <p:nvSpPr>
+          <p:cNvPr id="2" name="Title 1">
+            <a:extLst>
+              <a:ext uri="{FF2B5EF4-FFF2-40B4-BE49-F238E27FC236}">
+                <a16:creationId xmlns:a16="http://schemas.microsoft.com/office/drawing/2014/main" id="{46B726D8-5A95-7E4C-8F20-BDC1365D852E}"/>
+              </a:ext>
+            </a:extLst>
+          </p:cNvPr>
+          <p:cNvSpPr>
+            <a:spLocks noGrp="1"/>
+          </p:cNvSpPr>
+          <p:nvPr>
+            <p:ph type="title"/>
+          </p:nvPr>
+        </p:nvSpPr>
+        <p:spPr/>
+        <p:txBody>
+          <a:bodyPr/>
+          <a:lstStyle/>
+          <a:p>
+            <a:r>
+              <a:rPr lang="en-US" dirty="0"/>
+              <a:t>Overall</a:t>
+            </a:r>
+          </a:p>
+        </p:txBody>
+      </p:sp>
+      <p:sp>
+        <p:nvSpPr>
+          <p:cNvPr id="3" name="Text Placeholder 2">
+            <a:extLst>
+              <a:ext uri="{FF2B5EF4-FFF2-40B4-BE49-F238E27FC236}">
+                <a16:creationId xmlns:a16="http://schemas.microsoft.com/office/drawing/2014/main" id="{50A071F3-F330-474B-8D86-8012F4B3E956}"/>
+              </a:ext>
+            </a:extLst>
+          </p:cNvPr>
+          <p:cNvSpPr>
+            <a:spLocks noGrp="1"/>
+          </p:cNvSpPr>
+          <p:nvPr>
+            <p:ph type="body" sz="quarter" idx="10"/>
+          </p:nvPr>
+        </p:nvSpPr>
+        <p:spPr>
+          <a:xfrm>
+            <a:off x="628075" y="1776683"/>
+            <a:ext cx="12561453" cy="4402487"/>
+          </a:xfrm>
+        </p:spPr>
+        <p:txBody>
+          <a:bodyPr/>
+          <a:lstStyle/>
+          <a:p>
+            <a:r>
+              <a:rPr lang="en-US" dirty="0"/>
+              <a:t>You got this!</a:t>
+            </a:r>
+          </a:p>
+          <a:p>
+            <a:endParaRPr lang="en-US" dirty="0"/>
+          </a:p>
+          <a:p>
+            <a:r>
+              <a:rPr lang="en-US" dirty="0"/>
+              <a:t>Just keep asking questions, form study groups, go over concepts</a:t>
+            </a:r>
+          </a:p>
+          <a:p>
+            <a:pPr lvl="1"/>
+            <a:r>
+              <a:rPr lang="en-US" dirty="0"/>
+              <a:t>On study groups, we can setup  a private team channel for you…</a:t>
+            </a:r>
+          </a:p>
+          <a:p>
+            <a:pPr lvl="1"/>
+            <a:endParaRPr lang="en-US" dirty="0"/>
+          </a:p>
+          <a:p>
+            <a:r>
+              <a:rPr lang="en-US" dirty="0"/>
+              <a:t>Next Unit, will continue to  go over these topics</a:t>
+            </a:r>
+          </a:p>
+          <a:p>
+            <a:pPr lvl="1"/>
+            <a:r>
+              <a:rPr lang="en-US" dirty="0"/>
+              <a:t>especially arrays and files. </a:t>
+            </a:r>
+          </a:p>
+          <a:p>
+            <a:pPr lvl="1"/>
+            <a:endParaRPr lang="en-US" dirty="0"/>
+          </a:p>
+          <a:p>
+            <a:r>
+              <a:rPr lang="en-US" dirty="0"/>
+              <a:t>For now:</a:t>
+            </a:r>
+          </a:p>
+          <a:p>
+            <a:pPr lvl="1"/>
+            <a:r>
+              <a:rPr lang="en-US" dirty="0"/>
+              <a:t>Focus on knowledge checks, catching up, and the exams. </a:t>
+            </a:r>
+          </a:p>
+        </p:txBody>
+      </p:sp>
+    </p:spTree>
+    <p:extLst>
+      <p:ext uri="{BB962C8B-B14F-4D97-AF65-F5344CB8AC3E}">
+        <p14:creationId xmlns:p14="http://schemas.microsoft.com/office/powerpoint/2010/main" val="1095106966"/>
       </p:ext>
     </p:extLst>
   </p:cSld>
@@ -12397,8 +15091,8 @@
           </a:p>
         </p:txBody>
       </p:sp>
-      <mc:AlternateContent xmlns:mc="http://schemas.openxmlformats.org/markup-compatibility/2006">
-        <mc:Choice xmlns:p14="http://schemas.microsoft.com/office/powerpoint/2010/main" Requires="p14">
+      <mc:AlternateContent xmlns:mc="http://schemas.openxmlformats.org/markup-compatibility/2006" xmlns:p14="http://schemas.microsoft.com/office/powerpoint/2010/main">
+        <mc:Choice Requires="p14">
           <p:contentPart p14:bwMode="auto" r:id="rId2">
             <p14:nvContentPartPr>
               <p14:cNvPr id="7" name="Ink 6">
@@ -12417,7 +15111,7 @@
             </p14:xfrm>
           </p:contentPart>
         </mc:Choice>
-        <mc:Fallback>
+        <mc:Fallback xmlns="">
           <p:pic>
             <p:nvPicPr>
               <p:cNvPr id="7" name="Ink 6">
@@ -12448,8 +15142,8 @@
           </p:pic>
         </mc:Fallback>
       </mc:AlternateContent>
-      <mc:AlternateContent xmlns:mc="http://schemas.openxmlformats.org/markup-compatibility/2006">
-        <mc:Choice xmlns:p14="http://schemas.microsoft.com/office/powerpoint/2010/main" Requires="p14">
+      <mc:AlternateContent xmlns:mc="http://schemas.openxmlformats.org/markup-compatibility/2006" xmlns:p14="http://schemas.microsoft.com/office/powerpoint/2010/main">
+        <mc:Choice Requires="p14">
           <p:contentPart p14:bwMode="auto" r:id="rId4">
             <p14:nvContentPartPr>
               <p14:cNvPr id="10" name="Ink 9">
@@ -12468,7 +15162,7 @@
             </p14:xfrm>
           </p:contentPart>
         </mc:Choice>
-        <mc:Fallback>
+        <mc:Fallback xmlns="">
           <p:pic>
             <p:nvPicPr>
               <p:cNvPr id="10" name="Ink 9">
@@ -12499,8 +15193,8 @@
           </p:pic>
         </mc:Fallback>
       </mc:AlternateContent>
-      <mc:AlternateContent xmlns:mc="http://schemas.openxmlformats.org/markup-compatibility/2006">
-        <mc:Choice xmlns:p14="http://schemas.microsoft.com/office/powerpoint/2010/main" Requires="p14">
+      <mc:AlternateContent xmlns:mc="http://schemas.openxmlformats.org/markup-compatibility/2006" xmlns:p14="http://schemas.microsoft.com/office/powerpoint/2010/main">
+        <mc:Choice Requires="p14">
           <p:contentPart p14:bwMode="auto" r:id="rId6">
             <p14:nvContentPartPr>
               <p14:cNvPr id="11" name="Ink 10">
@@ -12519,7 +15213,7 @@
             </p14:xfrm>
           </p:contentPart>
         </mc:Choice>
-        <mc:Fallback>
+        <mc:Fallback xmlns="">
           <p:pic>
             <p:nvPicPr>
               <p:cNvPr id="11" name="Ink 10">
@@ -13854,7 +16548,7 @@
           <a:p>
             <a:r>
               <a:rPr lang="en-US" dirty="0"/>
-              <a:t>Which method grabs all values from that point, until it sees newline()?</a:t>
+              <a:t>Which method grabs all values from that point, until it sees newline, which it removes?</a:t>
             </a:r>
           </a:p>
           <a:p>
@@ -13924,13 +16618,13 @@
             <a:pPr lvl="1"/>
             <a:r>
               <a:rPr lang="en-US" dirty="0"/>
-              <a:t>B. A series of invisible characters plus a single space \t\n\f\r </a:t>
+              <a:t>B. A series of possible invisible characters (\t\n\f\r) plus a single space </a:t>
             </a:r>
           </a:p>
           <a:p>
             <a:r>
               <a:rPr lang="en-US" dirty="0"/>
-              <a:t>While you view a file two dimensionally, it is actually just a single line with \n between our lines</a:t>
+              <a:t>While you view a file two dimensionally, it is just a single line (stream) with \n between our lines</a:t>
             </a:r>
           </a:p>
         </p:txBody>
@@ -13957,6 +16651,541 @@
       </p:transition>
     </mc:Fallback>
   </mc:AlternateContent>
+  <p:timing>
+    <p:tnLst>
+      <p:par>
+        <p:cTn id="1" dur="indefinite" restart="never" nodeType="tmRoot">
+          <p:childTnLst>
+            <p:seq concurrent="1" nextAc="seek">
+              <p:cTn id="2" dur="indefinite" nodeType="mainSeq">
+                <p:childTnLst>
+                  <p:par>
+                    <p:cTn id="3" fill="hold">
+                      <p:stCondLst>
+                        <p:cond delay="indefinite"/>
+                      </p:stCondLst>
+                      <p:childTnLst>
+                        <p:par>
+                          <p:cTn id="4" fill="hold">
+                            <p:stCondLst>
+                              <p:cond delay="0"/>
+                            </p:stCondLst>
+                            <p:childTnLst>
+                              <p:par>
+                                <p:cTn id="5" presetID="9" presetClass="entr" presetSubtype="0" fill="hold" grpId="0" nodeType="clickEffect">
+                                  <p:stCondLst>
+                                    <p:cond delay="0"/>
+                                  </p:stCondLst>
+                                  <p:childTnLst>
+                                    <p:set>
+                                      <p:cBhvr>
+                                        <p:cTn id="6" dur="1" fill="hold">
+                                          <p:stCondLst>
+                                            <p:cond delay="0"/>
+                                          </p:stCondLst>
+                                        </p:cTn>
+                                        <p:tgtEl>
+                                          <p:spTgt spid="3">
+                                            <p:txEl>
+                                              <p:pRg st="0" end="0"/>
+                                            </p:txEl>
+                                          </p:spTgt>
+                                        </p:tgtEl>
+                                        <p:attrNameLst>
+                                          <p:attrName>style.visibility</p:attrName>
+                                        </p:attrNameLst>
+                                      </p:cBhvr>
+                                      <p:to>
+                                        <p:strVal val="visible"/>
+                                      </p:to>
+                                    </p:set>
+                                    <p:animEffect transition="in" filter="dissolve">
+                                      <p:cBhvr>
+                                        <p:cTn id="7" dur="500"/>
+                                        <p:tgtEl>
+                                          <p:spTgt spid="3">
+                                            <p:txEl>
+                                              <p:pRg st="0" end="0"/>
+                                            </p:txEl>
+                                          </p:spTgt>
+                                        </p:tgtEl>
+                                      </p:cBhvr>
+                                    </p:animEffect>
+                                  </p:childTnLst>
+                                </p:cTn>
+                              </p:par>
+                              <p:par>
+                                <p:cTn id="8" presetID="9" presetClass="entr" presetSubtype="0" fill="hold" grpId="0" nodeType="withEffect">
+                                  <p:stCondLst>
+                                    <p:cond delay="0"/>
+                                  </p:stCondLst>
+                                  <p:childTnLst>
+                                    <p:set>
+                                      <p:cBhvr>
+                                        <p:cTn id="9" dur="1" fill="hold">
+                                          <p:stCondLst>
+                                            <p:cond delay="0"/>
+                                          </p:stCondLst>
+                                        </p:cTn>
+                                        <p:tgtEl>
+                                          <p:spTgt spid="3">
+                                            <p:txEl>
+                                              <p:pRg st="1" end="1"/>
+                                            </p:txEl>
+                                          </p:spTgt>
+                                        </p:tgtEl>
+                                        <p:attrNameLst>
+                                          <p:attrName>style.visibility</p:attrName>
+                                        </p:attrNameLst>
+                                      </p:cBhvr>
+                                      <p:to>
+                                        <p:strVal val="visible"/>
+                                      </p:to>
+                                    </p:set>
+                                    <p:animEffect transition="in" filter="dissolve">
+                                      <p:cBhvr>
+                                        <p:cTn id="10" dur="500"/>
+                                        <p:tgtEl>
+                                          <p:spTgt spid="3">
+                                            <p:txEl>
+                                              <p:pRg st="1" end="1"/>
+                                            </p:txEl>
+                                          </p:spTgt>
+                                        </p:tgtEl>
+                                      </p:cBhvr>
+                                    </p:animEffect>
+                                  </p:childTnLst>
+                                </p:cTn>
+                              </p:par>
+                              <p:par>
+                                <p:cTn id="11" presetID="9" presetClass="entr" presetSubtype="0" fill="hold" grpId="0" nodeType="withEffect">
+                                  <p:stCondLst>
+                                    <p:cond delay="0"/>
+                                  </p:stCondLst>
+                                  <p:childTnLst>
+                                    <p:set>
+                                      <p:cBhvr>
+                                        <p:cTn id="12" dur="1" fill="hold">
+                                          <p:stCondLst>
+                                            <p:cond delay="0"/>
+                                          </p:stCondLst>
+                                        </p:cTn>
+                                        <p:tgtEl>
+                                          <p:spTgt spid="3">
+                                            <p:txEl>
+                                              <p:pRg st="2" end="2"/>
+                                            </p:txEl>
+                                          </p:spTgt>
+                                        </p:tgtEl>
+                                        <p:attrNameLst>
+                                          <p:attrName>style.visibility</p:attrName>
+                                        </p:attrNameLst>
+                                      </p:cBhvr>
+                                      <p:to>
+                                        <p:strVal val="visible"/>
+                                      </p:to>
+                                    </p:set>
+                                    <p:animEffect transition="in" filter="dissolve">
+                                      <p:cBhvr>
+                                        <p:cTn id="13" dur="500"/>
+                                        <p:tgtEl>
+                                          <p:spTgt spid="3">
+                                            <p:txEl>
+                                              <p:pRg st="2" end="2"/>
+                                            </p:txEl>
+                                          </p:spTgt>
+                                        </p:tgtEl>
+                                      </p:cBhvr>
+                                    </p:animEffect>
+                                  </p:childTnLst>
+                                </p:cTn>
+                              </p:par>
+                            </p:childTnLst>
+                          </p:cTn>
+                        </p:par>
+                      </p:childTnLst>
+                    </p:cTn>
+                  </p:par>
+                  <p:par>
+                    <p:cTn id="14" fill="hold">
+                      <p:stCondLst>
+                        <p:cond delay="indefinite"/>
+                      </p:stCondLst>
+                      <p:childTnLst>
+                        <p:par>
+                          <p:cTn id="15" fill="hold">
+                            <p:stCondLst>
+                              <p:cond delay="0"/>
+                            </p:stCondLst>
+                            <p:childTnLst>
+                              <p:par>
+                                <p:cTn id="16" presetID="9" presetClass="entr" presetSubtype="0" fill="hold" grpId="0" nodeType="clickEffect">
+                                  <p:stCondLst>
+                                    <p:cond delay="0"/>
+                                  </p:stCondLst>
+                                  <p:childTnLst>
+                                    <p:set>
+                                      <p:cBhvr>
+                                        <p:cTn id="17" dur="1" fill="hold">
+                                          <p:stCondLst>
+                                            <p:cond delay="0"/>
+                                          </p:stCondLst>
+                                        </p:cTn>
+                                        <p:tgtEl>
+                                          <p:spTgt spid="3">
+                                            <p:txEl>
+                                              <p:pRg st="3" end="3"/>
+                                            </p:txEl>
+                                          </p:spTgt>
+                                        </p:tgtEl>
+                                        <p:attrNameLst>
+                                          <p:attrName>style.visibility</p:attrName>
+                                        </p:attrNameLst>
+                                      </p:cBhvr>
+                                      <p:to>
+                                        <p:strVal val="visible"/>
+                                      </p:to>
+                                    </p:set>
+                                    <p:animEffect transition="in" filter="dissolve">
+                                      <p:cBhvr>
+                                        <p:cTn id="18" dur="500"/>
+                                        <p:tgtEl>
+                                          <p:spTgt spid="3">
+                                            <p:txEl>
+                                              <p:pRg st="3" end="3"/>
+                                            </p:txEl>
+                                          </p:spTgt>
+                                        </p:tgtEl>
+                                      </p:cBhvr>
+                                    </p:animEffect>
+                                  </p:childTnLst>
+                                </p:cTn>
+                              </p:par>
+                              <p:par>
+                                <p:cTn id="19" presetID="9" presetClass="entr" presetSubtype="0" fill="hold" grpId="0" nodeType="withEffect">
+                                  <p:stCondLst>
+                                    <p:cond delay="0"/>
+                                  </p:stCondLst>
+                                  <p:childTnLst>
+                                    <p:set>
+                                      <p:cBhvr>
+                                        <p:cTn id="20" dur="1" fill="hold">
+                                          <p:stCondLst>
+                                            <p:cond delay="0"/>
+                                          </p:stCondLst>
+                                        </p:cTn>
+                                        <p:tgtEl>
+                                          <p:spTgt spid="3">
+                                            <p:txEl>
+                                              <p:pRg st="4" end="4"/>
+                                            </p:txEl>
+                                          </p:spTgt>
+                                        </p:tgtEl>
+                                        <p:attrNameLst>
+                                          <p:attrName>style.visibility</p:attrName>
+                                        </p:attrNameLst>
+                                      </p:cBhvr>
+                                      <p:to>
+                                        <p:strVal val="visible"/>
+                                      </p:to>
+                                    </p:set>
+                                    <p:animEffect transition="in" filter="dissolve">
+                                      <p:cBhvr>
+                                        <p:cTn id="21" dur="500"/>
+                                        <p:tgtEl>
+                                          <p:spTgt spid="3">
+                                            <p:txEl>
+                                              <p:pRg st="4" end="4"/>
+                                            </p:txEl>
+                                          </p:spTgt>
+                                        </p:tgtEl>
+                                      </p:cBhvr>
+                                    </p:animEffect>
+                                  </p:childTnLst>
+                                </p:cTn>
+                              </p:par>
+                              <p:par>
+                                <p:cTn id="22" presetID="9" presetClass="entr" presetSubtype="0" fill="hold" grpId="0" nodeType="withEffect">
+                                  <p:stCondLst>
+                                    <p:cond delay="0"/>
+                                  </p:stCondLst>
+                                  <p:childTnLst>
+                                    <p:set>
+                                      <p:cBhvr>
+                                        <p:cTn id="23" dur="1" fill="hold">
+                                          <p:stCondLst>
+                                            <p:cond delay="0"/>
+                                          </p:stCondLst>
+                                        </p:cTn>
+                                        <p:tgtEl>
+                                          <p:spTgt spid="3">
+                                            <p:txEl>
+                                              <p:pRg st="5" end="5"/>
+                                            </p:txEl>
+                                          </p:spTgt>
+                                        </p:tgtEl>
+                                        <p:attrNameLst>
+                                          <p:attrName>style.visibility</p:attrName>
+                                        </p:attrNameLst>
+                                      </p:cBhvr>
+                                      <p:to>
+                                        <p:strVal val="visible"/>
+                                      </p:to>
+                                    </p:set>
+                                    <p:animEffect transition="in" filter="dissolve">
+                                      <p:cBhvr>
+                                        <p:cTn id="24" dur="500"/>
+                                        <p:tgtEl>
+                                          <p:spTgt spid="3">
+                                            <p:txEl>
+                                              <p:pRg st="5" end="5"/>
+                                            </p:txEl>
+                                          </p:spTgt>
+                                        </p:tgtEl>
+                                      </p:cBhvr>
+                                    </p:animEffect>
+                                  </p:childTnLst>
+                                </p:cTn>
+                              </p:par>
+                            </p:childTnLst>
+                          </p:cTn>
+                        </p:par>
+                      </p:childTnLst>
+                    </p:cTn>
+                  </p:par>
+                  <p:par>
+                    <p:cTn id="25" fill="hold">
+                      <p:stCondLst>
+                        <p:cond delay="indefinite"/>
+                      </p:stCondLst>
+                      <p:childTnLst>
+                        <p:par>
+                          <p:cTn id="26" fill="hold">
+                            <p:stCondLst>
+                              <p:cond delay="0"/>
+                            </p:stCondLst>
+                            <p:childTnLst>
+                              <p:par>
+                                <p:cTn id="27" presetID="9" presetClass="entr" presetSubtype="0" fill="hold" grpId="0" nodeType="clickEffect">
+                                  <p:stCondLst>
+                                    <p:cond delay="0"/>
+                                  </p:stCondLst>
+                                  <p:childTnLst>
+                                    <p:set>
+                                      <p:cBhvr>
+                                        <p:cTn id="28" dur="1" fill="hold">
+                                          <p:stCondLst>
+                                            <p:cond delay="0"/>
+                                          </p:stCondLst>
+                                        </p:cTn>
+                                        <p:tgtEl>
+                                          <p:spTgt spid="3">
+                                            <p:txEl>
+                                              <p:pRg st="6" end="6"/>
+                                            </p:txEl>
+                                          </p:spTgt>
+                                        </p:tgtEl>
+                                        <p:attrNameLst>
+                                          <p:attrName>style.visibility</p:attrName>
+                                        </p:attrNameLst>
+                                      </p:cBhvr>
+                                      <p:to>
+                                        <p:strVal val="visible"/>
+                                      </p:to>
+                                    </p:set>
+                                    <p:animEffect transition="in" filter="dissolve">
+                                      <p:cBhvr>
+                                        <p:cTn id="29" dur="500"/>
+                                        <p:tgtEl>
+                                          <p:spTgt spid="3">
+                                            <p:txEl>
+                                              <p:pRg st="6" end="6"/>
+                                            </p:txEl>
+                                          </p:spTgt>
+                                        </p:tgtEl>
+                                      </p:cBhvr>
+                                    </p:animEffect>
+                                  </p:childTnLst>
+                                </p:cTn>
+                              </p:par>
+                              <p:par>
+                                <p:cTn id="30" presetID="9" presetClass="entr" presetSubtype="0" fill="hold" grpId="0" nodeType="withEffect">
+                                  <p:stCondLst>
+                                    <p:cond delay="0"/>
+                                  </p:stCondLst>
+                                  <p:childTnLst>
+                                    <p:set>
+                                      <p:cBhvr>
+                                        <p:cTn id="31" dur="1" fill="hold">
+                                          <p:stCondLst>
+                                            <p:cond delay="0"/>
+                                          </p:stCondLst>
+                                        </p:cTn>
+                                        <p:tgtEl>
+                                          <p:spTgt spid="3">
+                                            <p:txEl>
+                                              <p:pRg st="7" end="7"/>
+                                            </p:txEl>
+                                          </p:spTgt>
+                                        </p:tgtEl>
+                                        <p:attrNameLst>
+                                          <p:attrName>style.visibility</p:attrName>
+                                        </p:attrNameLst>
+                                      </p:cBhvr>
+                                      <p:to>
+                                        <p:strVal val="visible"/>
+                                      </p:to>
+                                    </p:set>
+                                    <p:animEffect transition="in" filter="dissolve">
+                                      <p:cBhvr>
+                                        <p:cTn id="32" dur="500"/>
+                                        <p:tgtEl>
+                                          <p:spTgt spid="3">
+                                            <p:txEl>
+                                              <p:pRg st="7" end="7"/>
+                                            </p:txEl>
+                                          </p:spTgt>
+                                        </p:tgtEl>
+                                      </p:cBhvr>
+                                    </p:animEffect>
+                                  </p:childTnLst>
+                                </p:cTn>
+                              </p:par>
+                              <p:par>
+                                <p:cTn id="33" presetID="9" presetClass="entr" presetSubtype="0" fill="hold" grpId="0" nodeType="withEffect">
+                                  <p:stCondLst>
+                                    <p:cond delay="0"/>
+                                  </p:stCondLst>
+                                  <p:childTnLst>
+                                    <p:set>
+                                      <p:cBhvr>
+                                        <p:cTn id="34" dur="1" fill="hold">
+                                          <p:stCondLst>
+                                            <p:cond delay="0"/>
+                                          </p:stCondLst>
+                                        </p:cTn>
+                                        <p:tgtEl>
+                                          <p:spTgt spid="3">
+                                            <p:txEl>
+                                              <p:pRg st="8" end="8"/>
+                                            </p:txEl>
+                                          </p:spTgt>
+                                        </p:tgtEl>
+                                        <p:attrNameLst>
+                                          <p:attrName>style.visibility</p:attrName>
+                                        </p:attrNameLst>
+                                      </p:cBhvr>
+                                      <p:to>
+                                        <p:strVal val="visible"/>
+                                      </p:to>
+                                    </p:set>
+                                    <p:animEffect transition="in" filter="dissolve">
+                                      <p:cBhvr>
+                                        <p:cTn id="35" dur="500"/>
+                                        <p:tgtEl>
+                                          <p:spTgt spid="3">
+                                            <p:txEl>
+                                              <p:pRg st="8" end="8"/>
+                                            </p:txEl>
+                                          </p:spTgt>
+                                        </p:tgtEl>
+                                      </p:cBhvr>
+                                    </p:animEffect>
+                                  </p:childTnLst>
+                                </p:cTn>
+                              </p:par>
+                            </p:childTnLst>
+                          </p:cTn>
+                        </p:par>
+                      </p:childTnLst>
+                    </p:cTn>
+                  </p:par>
+                  <p:par>
+                    <p:cTn id="36" fill="hold">
+                      <p:stCondLst>
+                        <p:cond delay="indefinite"/>
+                      </p:stCondLst>
+                      <p:childTnLst>
+                        <p:par>
+                          <p:cTn id="37" fill="hold">
+                            <p:stCondLst>
+                              <p:cond delay="0"/>
+                            </p:stCondLst>
+                            <p:childTnLst>
+                              <p:par>
+                                <p:cTn id="38" presetID="9" presetClass="entr" presetSubtype="0" fill="hold" grpId="0" nodeType="clickEffect">
+                                  <p:stCondLst>
+                                    <p:cond delay="0"/>
+                                  </p:stCondLst>
+                                  <p:childTnLst>
+                                    <p:set>
+                                      <p:cBhvr>
+                                        <p:cTn id="39" dur="1" fill="hold">
+                                          <p:stCondLst>
+                                            <p:cond delay="0"/>
+                                          </p:stCondLst>
+                                        </p:cTn>
+                                        <p:tgtEl>
+                                          <p:spTgt spid="3">
+                                            <p:txEl>
+                                              <p:pRg st="9" end="9"/>
+                                            </p:txEl>
+                                          </p:spTgt>
+                                        </p:tgtEl>
+                                        <p:attrNameLst>
+                                          <p:attrName>style.visibility</p:attrName>
+                                        </p:attrNameLst>
+                                      </p:cBhvr>
+                                      <p:to>
+                                        <p:strVal val="visible"/>
+                                      </p:to>
+                                    </p:set>
+                                    <p:animEffect transition="in" filter="dissolve">
+                                      <p:cBhvr>
+                                        <p:cTn id="40" dur="500"/>
+                                        <p:tgtEl>
+                                          <p:spTgt spid="3">
+                                            <p:txEl>
+                                              <p:pRg st="9" end="9"/>
+                                            </p:txEl>
+                                          </p:spTgt>
+                                        </p:tgtEl>
+                                      </p:cBhvr>
+                                    </p:animEffect>
+                                  </p:childTnLst>
+                                </p:cTn>
+                              </p:par>
+                            </p:childTnLst>
+                          </p:cTn>
+                        </p:par>
+                      </p:childTnLst>
+                    </p:cTn>
+                  </p:par>
+                </p:childTnLst>
+              </p:cTn>
+              <p:prevCondLst>
+                <p:cond evt="onPrev" delay="0">
+                  <p:tgtEl>
+                    <p:sldTgt/>
+                  </p:tgtEl>
+                </p:cond>
+              </p:prevCondLst>
+              <p:nextCondLst>
+                <p:cond evt="onNext" delay="0">
+                  <p:tgtEl>
+                    <p:sldTgt/>
+                  </p:tgtEl>
+                </p:cond>
+              </p:nextCondLst>
+            </p:seq>
+          </p:childTnLst>
+        </p:cTn>
+      </p:par>
+    </p:tnLst>
+    <p:bldLst>
+      <p:bldP spid="3" grpId="0" build="p"/>
+    </p:bldLst>
+  </p:timing>
 </p:sld>
 </file>
 
@@ -14883,18 +18112,18 @@
 </file>
 
 <file path=customXml/item1.xml><?xml version="1.0" encoding="utf-8"?>
+<p:properties xmlns:p="http://schemas.microsoft.com/office/2006/metadata/properties" xmlns:xsi="http://www.w3.org/2001/XMLSchema-instance" xmlns:pc="http://schemas.microsoft.com/office/infopath/2007/PartnerControls">
+  <documentManagement/>
+</p:properties>
+</file>
+
+<file path=customXml/item2.xml><?xml version="1.0" encoding="utf-8"?>
 <?mso-contentType ?>
 <FormTemplates xmlns="http://schemas.microsoft.com/sharepoint/v3/contenttype/forms">
   <Display>DocumentLibraryForm</Display>
   <Edit>DocumentLibraryForm</Edit>
   <New>DocumentLibraryForm</New>
 </FormTemplates>
-</file>
-
-<file path=customXml/item2.xml><?xml version="1.0" encoding="utf-8"?>
-<p:properties xmlns:p="http://schemas.microsoft.com/office/2006/metadata/properties" xmlns:xsi="http://www.w3.org/2001/XMLSchema-instance" xmlns:pc="http://schemas.microsoft.com/office/infopath/2007/PartnerControls">
-  <documentManagement/>
-</p:properties>
 </file>
 
 <file path=customXml/item3.xml><?xml version="1.0" encoding="utf-8"?>
@@ -15127,14 +18356,6 @@
 </file>
 
 <file path=customXml/itemProps1.xml><?xml version="1.0" encoding="utf-8"?>
-<ds:datastoreItem xmlns:ds="http://schemas.openxmlformats.org/officeDocument/2006/customXml" ds:itemID="{859D3A98-3522-4EE5-94F5-88815D34F733}">
-  <ds:schemaRefs>
-    <ds:schemaRef ds:uri="http://schemas.microsoft.com/sharepoint/v3/contenttype/forms"/>
-  </ds:schemaRefs>
-</ds:datastoreItem>
-</file>
-
-<file path=customXml/itemProps2.xml><?xml version="1.0" encoding="utf-8"?>
 <ds:datastoreItem xmlns:ds="http://schemas.openxmlformats.org/officeDocument/2006/customXml" ds:itemID="{E7B4BED8-6587-430C-8C6E-C226A7D33E25}">
   <ds:schemaRefs>
     <ds:schemaRef ds:uri="http://schemas.openxmlformats.org/package/2006/metadata/core-properties"/>
@@ -15147,6 +18368,14 @@
     <ds:schemaRef ds:uri="92c41bee-f0ee-4aa6-9399-a35fbb883510"/>
     <ds:schemaRef ds:uri="http://schemas.microsoft.com/office/2006/metadata/properties"/>
     <ds:schemaRef ds:uri="http://www.w3.org/XML/1998/namespace"/>
+  </ds:schemaRefs>
+</ds:datastoreItem>
+</file>
+
+<file path=customXml/itemProps2.xml><?xml version="1.0" encoding="utf-8"?>
+<ds:datastoreItem xmlns:ds="http://schemas.openxmlformats.org/officeDocument/2006/customXml" ds:itemID="{859D3A98-3522-4EE5-94F5-88815D34F733}">
+  <ds:schemaRefs>
+    <ds:schemaRef ds:uri="http://schemas.microsoft.com/sharepoint/v3/contenttype/forms"/>
   </ds:schemaRefs>
 </ds:datastoreItem>
 </file>

</xml_diff>